<commit_message>
benchmarking gui erweitert, refactoring
</commit_message>
<xml_diff>
--- a/dokumentation/vortrag.pptx
+++ b/dokumentation/vortrag.pptx
@@ -7,8 +7,10 @@
   <p:sldIdLst>
     <p:sldId id="259" r:id="rId2"/>
     <p:sldId id="260" r:id="rId3"/>
-    <p:sldId id="257" r:id="rId4"/>
-    <p:sldId id="261" r:id="rId5"/>
+    <p:sldId id="261" r:id="rId4"/>
+    <p:sldId id="262" r:id="rId5"/>
+    <p:sldId id="263" r:id="rId6"/>
+    <p:sldId id="257" r:id="rId7"/>
   </p:sldIdLst>
   <p:sldSz cx="12192000" cy="6858000"/>
   <p:notesSz cx="6858000" cy="9144000"/>
@@ -798,10 +800,21 @@
             <p:ph type="title"/>
           </p:nvPr>
         </p:nvSpPr>
-        <p:spPr/>
-        <p:txBody>
-          <a:bodyPr/>
-          <a:lstStyle/>
+        <p:spPr>
+          <a:xfrm>
+            <a:off x="838200" y="211015"/>
+            <a:ext cx="10515600" cy="1325563"/>
+          </a:xfrm>
+        </p:spPr>
+        <p:txBody>
+          <a:bodyPr>
+            <a:normAutofit/>
+          </a:bodyPr>
+          <a:lstStyle>
+            <a:lvl1pPr>
+              <a:defRPr sz="4000"/>
+            </a:lvl1pPr>
+          </a:lstStyle>
           <a:p>
             <a:r>
               <a:rPr lang="de-DE" smtClean="0"/>
@@ -821,7 +834,12 @@
             <p:ph idx="1"/>
           </p:nvPr>
         </p:nvSpPr>
-        <p:spPr/>
+        <p:spPr>
+          <a:xfrm>
+            <a:off x="838200" y="1684962"/>
+            <a:ext cx="10515600" cy="4492001"/>
+          </a:xfrm>
+        </p:spPr>
         <p:txBody>
           <a:bodyPr/>
           <a:lstStyle/>
@@ -1264,7 +1282,7 @@
 </file>
 
 <file path=ppt/slideLayouts/slideLayout4.xml><?xml version="1.0" encoding="utf-8"?>
-<p:sldLayout xmlns:a="http://schemas.openxmlformats.org/drawingml/2006/main" xmlns:r="http://schemas.openxmlformats.org/officeDocument/2006/relationships" xmlns:p="http://schemas.openxmlformats.org/presentationml/2006/main" type="twoObj" preserve="1">
+<p:sldLayout xmlns:a="http://schemas.openxmlformats.org/drawingml/2006/main" xmlns:r="http://schemas.openxmlformats.org/officeDocument/2006/relationships" xmlns:p="http://schemas.openxmlformats.org/presentationml/2006/main" preserve="1" userDrawn="1">
   <p:cSld name="Zwei Inhalte">
     <p:spTree>
       <p:nvGrpSpPr>
@@ -1280,29 +1298,6 @@
           <a:chExt cx="0" cy="0"/>
         </a:xfrm>
       </p:grpSpPr>
-      <p:sp>
-        <p:nvSpPr>
-          <p:cNvPr id="2" name="Titel 1"/>
-          <p:cNvSpPr>
-            <a:spLocks noGrp="1"/>
-          </p:cNvSpPr>
-          <p:nvPr>
-            <p:ph type="title"/>
-          </p:nvPr>
-        </p:nvSpPr>
-        <p:spPr/>
-        <p:txBody>
-          <a:bodyPr/>
-          <a:lstStyle/>
-          <a:p>
-            <a:r>
-              <a:rPr lang="de-DE" smtClean="0"/>
-              <a:t>Titelmasterformat durch Klicken bearbeiten</a:t>
-            </a:r>
-            <a:endParaRPr lang="de-DE"/>
-          </a:p>
-        </p:txBody>
-      </p:sp>
       <p:sp>
         <p:nvSpPr>
           <p:cNvPr id="3" name="Inhaltsplatzhalter 2"/>
@@ -1513,6 +1508,40 @@
           </a:extLst>
         </p:spPr>
       </p:pic>
+      <p:sp>
+        <p:nvSpPr>
+          <p:cNvPr id="9" name="Titel 1"/>
+          <p:cNvSpPr>
+            <a:spLocks noGrp="1"/>
+          </p:cNvSpPr>
+          <p:nvPr>
+            <p:ph type="title"/>
+          </p:nvPr>
+        </p:nvSpPr>
+        <p:spPr>
+          <a:xfrm>
+            <a:off x="838200" y="211015"/>
+            <a:ext cx="10515600" cy="1325563"/>
+          </a:xfrm>
+        </p:spPr>
+        <p:txBody>
+          <a:bodyPr>
+            <a:normAutofit/>
+          </a:bodyPr>
+          <a:lstStyle>
+            <a:lvl1pPr>
+              <a:defRPr sz="4000"/>
+            </a:lvl1pPr>
+          </a:lstStyle>
+          <a:p>
+            <a:r>
+              <a:rPr lang="de-DE" smtClean="0"/>
+              <a:t>Titelmasterformat durch Klicken bearbeiten</a:t>
+            </a:r>
+            <a:endParaRPr lang="de-DE"/>
+          </a:p>
+        </p:txBody>
+      </p:sp>
     </p:spTree>
     <p:extLst>
       <p:ext uri="{BB962C8B-B14F-4D97-AF65-F5344CB8AC3E}">
@@ -1534,7 +1563,7 @@
 </file>
 
 <file path=ppt/slideLayouts/slideLayout5.xml><?xml version="1.0" encoding="utf-8"?>
-<p:sldLayout xmlns:a="http://schemas.openxmlformats.org/drawingml/2006/main" xmlns:r="http://schemas.openxmlformats.org/officeDocument/2006/relationships" xmlns:p="http://schemas.openxmlformats.org/presentationml/2006/main" type="twoTxTwoObj" preserve="1">
+<p:sldLayout xmlns:a="http://schemas.openxmlformats.org/drawingml/2006/main" xmlns:r="http://schemas.openxmlformats.org/officeDocument/2006/relationships" xmlns:p="http://schemas.openxmlformats.org/presentationml/2006/main" preserve="1" userDrawn="1">
   <p:cSld name="Vergleich">
     <p:spTree>
       <p:nvGrpSpPr>
@@ -1550,34 +1579,6 @@
           <a:chExt cx="0" cy="0"/>
         </a:xfrm>
       </p:grpSpPr>
-      <p:sp>
-        <p:nvSpPr>
-          <p:cNvPr id="2" name="Titel 1"/>
-          <p:cNvSpPr>
-            <a:spLocks noGrp="1"/>
-          </p:cNvSpPr>
-          <p:nvPr>
-            <p:ph type="title"/>
-          </p:nvPr>
-        </p:nvSpPr>
-        <p:spPr>
-          <a:xfrm>
-            <a:off x="839788" y="365125"/>
-            <a:ext cx="10515600" cy="1325563"/>
-          </a:xfrm>
-        </p:spPr>
-        <p:txBody>
-          <a:bodyPr/>
-          <a:lstStyle/>
-          <a:p>
-            <a:r>
-              <a:rPr lang="de-DE" smtClean="0"/>
-              <a:t>Titelmasterformat durch Klicken bearbeiten</a:t>
-            </a:r>
-            <a:endParaRPr lang="de-DE"/>
-          </a:p>
-        </p:txBody>
-      </p:sp>
       <p:sp>
         <p:nvSpPr>
           <p:cNvPr id="3" name="Textplatzhalter 2"/>
@@ -1918,6 +1919,40 @@
           </a:extLst>
         </p:spPr>
       </p:pic>
+      <p:sp>
+        <p:nvSpPr>
+          <p:cNvPr id="11" name="Titel 1"/>
+          <p:cNvSpPr>
+            <a:spLocks noGrp="1"/>
+          </p:cNvSpPr>
+          <p:nvPr>
+            <p:ph type="title"/>
+          </p:nvPr>
+        </p:nvSpPr>
+        <p:spPr>
+          <a:xfrm>
+            <a:off x="838200" y="211015"/>
+            <a:ext cx="10515600" cy="1325563"/>
+          </a:xfrm>
+        </p:spPr>
+        <p:txBody>
+          <a:bodyPr>
+            <a:normAutofit/>
+          </a:bodyPr>
+          <a:lstStyle>
+            <a:lvl1pPr>
+              <a:defRPr sz="4000"/>
+            </a:lvl1pPr>
+          </a:lstStyle>
+          <a:p>
+            <a:r>
+              <a:rPr lang="de-DE" smtClean="0"/>
+              <a:t>Titelmasterformat durch Klicken bearbeiten</a:t>
+            </a:r>
+            <a:endParaRPr lang="de-DE"/>
+          </a:p>
+        </p:txBody>
+      </p:sp>
     </p:spTree>
     <p:extLst>
       <p:ext uri="{BB962C8B-B14F-4D97-AF65-F5344CB8AC3E}">
@@ -1939,7 +1974,7 @@
 </file>
 
 <file path=ppt/slideLayouts/slideLayout6.xml><?xml version="1.0" encoding="utf-8"?>
-<p:sldLayout xmlns:a="http://schemas.openxmlformats.org/drawingml/2006/main" xmlns:r="http://schemas.openxmlformats.org/officeDocument/2006/relationships" xmlns:p="http://schemas.openxmlformats.org/presentationml/2006/main" type="titleOnly" preserve="1">
+<p:sldLayout xmlns:a="http://schemas.openxmlformats.org/drawingml/2006/main" xmlns:r="http://schemas.openxmlformats.org/officeDocument/2006/relationships" xmlns:p="http://schemas.openxmlformats.org/presentationml/2006/main" preserve="1" userDrawn="1">
   <p:cSld name="Nur Titel">
     <p:spTree>
       <p:nvGrpSpPr>
@@ -1955,29 +1990,6 @@
           <a:chExt cx="0" cy="0"/>
         </a:xfrm>
       </p:grpSpPr>
-      <p:sp>
-        <p:nvSpPr>
-          <p:cNvPr id="2" name="Titel 1"/>
-          <p:cNvSpPr>
-            <a:spLocks noGrp="1"/>
-          </p:cNvSpPr>
-          <p:nvPr>
-            <p:ph type="title"/>
-          </p:nvPr>
-        </p:nvSpPr>
-        <p:spPr/>
-        <p:txBody>
-          <a:bodyPr/>
-          <a:lstStyle/>
-          <a:p>
-            <a:r>
-              <a:rPr lang="de-DE" smtClean="0"/>
-              <a:t>Titelmasterformat durch Klicken bearbeiten</a:t>
-            </a:r>
-            <a:endParaRPr lang="de-DE"/>
-          </a:p>
-        </p:txBody>
-      </p:sp>
       <p:sp>
         <p:nvSpPr>
           <p:cNvPr id="4" name="Fußzeilenplatzhalter 3"/>
@@ -2074,6 +2086,40 @@
           </a:extLst>
         </p:spPr>
       </p:pic>
+      <p:sp>
+        <p:nvSpPr>
+          <p:cNvPr id="7" name="Titel 1"/>
+          <p:cNvSpPr>
+            <a:spLocks noGrp="1"/>
+          </p:cNvSpPr>
+          <p:nvPr>
+            <p:ph type="title"/>
+          </p:nvPr>
+        </p:nvSpPr>
+        <p:spPr>
+          <a:xfrm>
+            <a:off x="838200" y="211015"/>
+            <a:ext cx="10515600" cy="1325563"/>
+          </a:xfrm>
+        </p:spPr>
+        <p:txBody>
+          <a:bodyPr>
+            <a:normAutofit/>
+          </a:bodyPr>
+          <a:lstStyle>
+            <a:lvl1pPr>
+              <a:defRPr sz="4000"/>
+            </a:lvl1pPr>
+          </a:lstStyle>
+          <a:p>
+            <a:r>
+              <a:rPr lang="de-DE" smtClean="0"/>
+              <a:t>Titelmasterformat durch Klicken bearbeiten</a:t>
+            </a:r>
+            <a:endParaRPr lang="de-DE"/>
+          </a:p>
+        </p:txBody>
+      </p:sp>
     </p:spTree>
     <p:extLst>
       <p:ext uri="{BB962C8B-B14F-4D97-AF65-F5344CB8AC3E}">
@@ -2985,7 +3031,7 @@
           <a:p>
             <a:fld id="{620CDD3C-54BF-419E-B218-513BAD7E9405}" type="datetimeFigureOut">
               <a:rPr lang="de-DE" smtClean="0"/>
-              <a:t>17.11.2016</a:t>
+              <a:t>27.11.2016</a:t>
             </a:fld>
             <a:endParaRPr lang="de-DE"/>
           </a:p>
@@ -3451,11 +3497,7 @@
             </a:r>
             <a:r>
               <a:rPr lang="de-DE" altLang="de-DE" dirty="0" smtClean="0"/>
-              <a:t>, </a:t>
-            </a:r>
-            <a:r>
-              <a:rPr lang="de-DE" altLang="de-DE" dirty="0" smtClean="0"/>
-              <a:t>Felix </a:t>
+              <a:t>, Felix </a:t>
             </a:r>
             <a:r>
               <a:rPr lang="de-DE" altLang="de-DE" dirty="0" err="1" smtClean="0"/>
@@ -3463,15 +3505,7 @@
             </a:r>
             <a:r>
               <a:rPr lang="de-DE" altLang="de-DE" dirty="0" smtClean="0"/>
-              <a:t>, </a:t>
-            </a:r>
-            <a:r>
-              <a:rPr lang="de-DE" altLang="de-DE" dirty="0" smtClean="0"/>
-              <a:t>David Sautter, Maximilian </a:t>
-            </a:r>
-            <a:r>
-              <a:rPr lang="de-DE" altLang="de-DE" dirty="0" smtClean="0"/>
-              <a:t>Auch</a:t>
+              <a:t>, David Sautter, Maximilian Auch</a:t>
             </a:r>
           </a:p>
           <a:p>
@@ -3479,7 +3513,6 @@
               <a:rPr lang="de-DE" altLang="de-DE" dirty="0" smtClean="0"/>
               <a:t>31.12.2016</a:t>
             </a:r>
-            <a:endParaRPr lang="de-DE" altLang="de-DE" dirty="0" smtClean="0"/>
           </a:p>
         </p:txBody>
       </p:sp>
@@ -3569,6 +3602,10 @@
               <a:rPr lang="de-DE" dirty="0"/>
               <a:t> </a:t>
             </a:r>
+            <a:r>
+              <a:rPr lang="de-DE" dirty="0" smtClean="0"/>
+              <a:t>Message-Service-Architektur</a:t>
+            </a:r>
             <a:endParaRPr lang="de-DE" dirty="0" smtClean="0"/>
           </a:p>
           <a:p>
@@ -3583,6 +3620,10 @@
               <a:rPr lang="de-DE" dirty="0"/>
               <a:t> </a:t>
             </a:r>
+            <a:r>
+              <a:rPr lang="de-DE" dirty="0" smtClean="0"/>
+              <a:t>Vergleich alte und neue Implementierung</a:t>
+            </a:r>
             <a:endParaRPr lang="de-DE" dirty="0" smtClean="0"/>
           </a:p>
           <a:p>
@@ -3603,6 +3644,10 @@
             <a:r>
               <a:rPr lang="de-DE" dirty="0"/>
               <a:t> </a:t>
+            </a:r>
+            <a:r>
+              <a:rPr lang="de-DE" dirty="0" smtClean="0"/>
+              <a:t>Monitoring für Administratoren</a:t>
             </a:r>
             <a:endParaRPr lang="de-DE" dirty="0" smtClean="0"/>
           </a:p>
@@ -3664,8 +3709,8 @@
           <a:lstStyle/>
           <a:p>
             <a:r>
-              <a:rPr lang="de-DE" dirty="0" err="1"/>
-              <a:t>Refactoring</a:t>
+              <a:rPr lang="de-DE" dirty="0" smtClean="0"/>
+              <a:t>Message-Service-Architektur</a:t>
             </a:r>
             <a:endParaRPr lang="de-DE" dirty="0"/>
           </a:p>
@@ -3684,77 +3729,134 @@
         <p:spPr/>
         <p:txBody>
           <a:bodyPr>
-            <a:normAutofit/>
+            <a:normAutofit fontScale="55000" lnSpcReduction="20000"/>
           </a:bodyPr>
           <a:lstStyle/>
           <a:p>
-            <a:pPr marL="285750" indent="-285750">
-              <a:buFontTx/>
-              <a:buChar char="-"/>
+            <a:pPr marL="0" indent="0">
+              <a:buNone/>
             </a:pPr>
             <a:r>
               <a:rPr lang="de-DE" dirty="0"/>
-              <a:t>Verteilung der Chatanwendung</a:t>
-            </a:r>
-          </a:p>
-          <a:p>
-            <a:pPr marL="285750" indent="-285750">
-              <a:buFontTx/>
-              <a:buChar char="-"/>
+              <a:t>Kriterien für die Anwendung</a:t>
+            </a:r>
+          </a:p>
+          <a:p>
+            <a:pPr lvl="0"/>
+            <a:r>
+              <a:rPr lang="de-DE" dirty="0"/>
+              <a:t>Erzeuger (Sender) von Nachrichten benötigt für die weitere Verarbeitung keine synchrone Antwort (</a:t>
+            </a:r>
+            <a:r>
+              <a:rPr lang="de-DE" dirty="0" err="1"/>
+              <a:t>fire</a:t>
+            </a:r>
+            <a:r>
+              <a:rPr lang="de-DE" dirty="0"/>
+              <a:t>-and-</a:t>
+            </a:r>
+            <a:r>
+              <a:rPr lang="de-DE" dirty="0" err="1"/>
+              <a:t>forget</a:t>
+            </a:r>
+            <a:r>
+              <a:rPr lang="de-DE" dirty="0"/>
+              <a:t>).</a:t>
+            </a:r>
+          </a:p>
+          <a:p>
+            <a:pPr lvl="0"/>
+            <a:r>
+              <a:rPr lang="de-DE" dirty="0"/>
+              <a:t>Integrationsszenarien: Es müssen mehrere unterschiedliche Systeme zusammenarbeiten.</a:t>
+            </a:r>
+          </a:p>
+          <a:p>
+            <a:pPr lvl="0"/>
+            <a:r>
+              <a:rPr lang="de-DE" dirty="0"/>
+              <a:t>Sender erzeugt Nachrichten erheblich schneller, als sie von Empfängern verarbeitet werden können. Eine Message-Queue als Puffer kann hier ausgleichen.</a:t>
+            </a:r>
+          </a:p>
+          <a:p>
+            <a:pPr marL="0" indent="0">
+              <a:buNone/>
             </a:pPr>
             <a:r>
               <a:rPr lang="de-DE" dirty="0"/>
-              <a:t>Auflösung von zirkulären Abhängigkeiten</a:t>
-            </a:r>
-          </a:p>
-          <a:p>
-            <a:pPr marL="285750" indent="-285750">
-              <a:buFontTx/>
-              <a:buChar char="-"/>
+              <a:t>Vorteile</a:t>
+            </a:r>
+          </a:p>
+          <a:p>
+            <a:pPr lvl="0"/>
+            <a:r>
+              <a:rPr lang="de-DE" dirty="0"/>
+              <a:t>Sender und Empfänger von Nachrichten können in völlig unterschiedliche Technologien und Programmiersprachen erstellt werden.</a:t>
+            </a:r>
+          </a:p>
+          <a:p>
+            <a:pPr lvl="0"/>
+            <a:r>
+              <a:rPr lang="de-DE" dirty="0"/>
+              <a:t>Message-Queues, insbesondere solche mit zuverlässiger Zustellung (</a:t>
+            </a:r>
+            <a:r>
+              <a:rPr lang="de-DE" dirty="0" err="1"/>
+              <a:t>reliable</a:t>
+            </a:r>
+            <a:r>
+              <a:rPr lang="de-DE" dirty="0"/>
+              <a:t> </a:t>
+            </a:r>
+            <a:r>
+              <a:rPr lang="de-DE" dirty="0" err="1"/>
+              <a:t>messaging</a:t>
+            </a:r>
+            <a:r>
+              <a:rPr lang="de-DE" dirty="0"/>
+              <a:t>), können die Verfügbarkeit und </a:t>
+            </a:r>
+            <a:r>
+              <a:rPr lang="de-DE" dirty="0" err="1"/>
+              <a:t>Rubstheit</a:t>
+            </a:r>
+            <a:r>
+              <a:rPr lang="de-DE" dirty="0"/>
+              <a:t> von Systemen erheblich steigern. Aus diesem Grund werden MQ-Systeme insbesondere im Bereich Finanz- und Kontodaten häufig eingesetzt.</a:t>
+            </a:r>
+          </a:p>
+          <a:p>
+            <a:pPr marL="0" indent="0">
+              <a:buNone/>
             </a:pPr>
             <a:r>
               <a:rPr lang="de-DE" dirty="0"/>
-              <a:t>Entwicklung von Integrationstests</a:t>
-            </a:r>
-          </a:p>
-          <a:p>
-            <a:pPr marL="285750" indent="-285750">
-              <a:buFontTx/>
-              <a:buChar char="-"/>
-            </a:pPr>
+              <a:t>Nachteile</a:t>
+            </a:r>
+          </a:p>
+          <a:p>
+            <a:pPr lvl="0"/>
             <a:r>
               <a:rPr lang="de-DE" dirty="0"/>
-              <a:t>Einsatz von </a:t>
+              <a:t>Message-Queues (ob kommerziell oder Open-Source) sind in sich komplexe Systeme mit teilweise hohem Einführungs- und Administrationsaufwand.</a:t>
+            </a:r>
+          </a:p>
+          <a:p>
+            <a:pPr lvl="0"/>
+            <a:r>
+              <a:rPr lang="de-DE" dirty="0"/>
+              <a:t>Asynchrone und nachrichtenbasierte Programmierung ist signifikant aufwendiger als einfacher </a:t>
             </a:r>
             <a:r>
               <a:rPr lang="de-DE" dirty="0" err="1"/>
-              <a:t>Dependency</a:t>
+              <a:t>call</a:t>
             </a:r>
             <a:r>
               <a:rPr lang="de-DE" dirty="0"/>
-              <a:t> Management</a:t>
-            </a:r>
-          </a:p>
-          <a:p>
-            <a:pPr marL="285750" indent="-285750">
-              <a:buFontTx/>
-              <a:buChar char="-"/>
-            </a:pPr>
-            <a:r>
-              <a:rPr lang="de-DE" dirty="0"/>
-              <a:t>Update der teilw. offiziell schon nicht mehr unterstützten </a:t>
-            </a:r>
-            <a:r>
-              <a:rPr lang="de-DE" dirty="0" err="1"/>
-              <a:t>Frameworkversionen</a:t>
-            </a:r>
-            <a:endParaRPr lang="de-DE" dirty="0"/>
-          </a:p>
-          <a:p>
-            <a:pPr marL="285750" indent="-285750">
-              <a:buFontTx/>
-              <a:buChar char="-"/>
-            </a:pPr>
+              <a:t>-and-return-Stil. Fehlversuche in asynchronen Systemen kann aufwendig sein.</a:t>
+            </a:r>
+          </a:p>
+          <a:p>
             <a:endParaRPr lang="de-DE" dirty="0"/>
           </a:p>
         </p:txBody>
@@ -3762,7 +3864,7 @@
     </p:spTree>
     <p:extLst>
       <p:ext uri="{BB962C8B-B14F-4D97-AF65-F5344CB8AC3E}">
-        <p14:creationId xmlns:p14="http://schemas.microsoft.com/office/powerpoint/2010/main" val="3432204887"/>
+        <p14:creationId xmlns:p14="http://schemas.microsoft.com/office/powerpoint/2010/main" val="336828123"/>
       </p:ext>
     </p:extLst>
   </p:cSld>
@@ -3813,161 +3915,285 @@
           <a:p>
             <a:r>
               <a:rPr lang="de-DE" dirty="0" smtClean="0"/>
-              <a:t>Message-Service-Architektur</a:t>
+              <a:t>Vergleich alte/neue Implementierung - Architektur</a:t>
             </a:r>
             <a:endParaRPr lang="de-DE" dirty="0"/>
           </a:p>
         </p:txBody>
       </p:sp>
-      <p:sp>
-        <p:nvSpPr>
-          <p:cNvPr id="3" name="Inhaltsplatzhalter 2"/>
-          <p:cNvSpPr>
-            <a:spLocks noGrp="1"/>
-          </p:cNvSpPr>
+      <p:pic>
+        <p:nvPicPr>
+          <p:cNvPr id="4" name="Inhaltsplatzhalter 3"/>
+          <p:cNvPicPr>
+            <a:picLocks noGrp="1" noChangeAspect="1"/>
+          </p:cNvPicPr>
           <p:nvPr>
             <p:ph idx="1"/>
           </p:nvPr>
-        </p:nvSpPr>
-        <p:spPr/>
-        <p:txBody>
-          <a:bodyPr>
-            <a:normAutofit fontScale="55000" lnSpcReduction="20000"/>
-          </a:bodyPr>
-          <a:lstStyle/>
-          <a:p>
-            <a:pPr marL="0" indent="0">
-              <a:buNone/>
-            </a:pPr>
-            <a:r>
-              <a:rPr lang="de-DE" dirty="0"/>
-              <a:t>Kriterien für die Anwendung</a:t>
-            </a:r>
-          </a:p>
-          <a:p>
-            <a:pPr lvl="0"/>
-            <a:r>
-              <a:rPr lang="de-DE" dirty="0"/>
-              <a:t>Erzeuger (Sender) von Nachrichten benötigt für die weitere Verarbeitung keine synchrone Antwort (</a:t>
-            </a:r>
-            <a:r>
-              <a:rPr lang="de-DE" dirty="0" err="1"/>
-              <a:t>fire</a:t>
-            </a:r>
-            <a:r>
-              <a:rPr lang="de-DE" dirty="0"/>
-              <a:t>-and-</a:t>
-            </a:r>
-            <a:r>
-              <a:rPr lang="de-DE" dirty="0" err="1"/>
-              <a:t>forget</a:t>
-            </a:r>
-            <a:r>
-              <a:rPr lang="de-DE" dirty="0"/>
-              <a:t>).</a:t>
-            </a:r>
-          </a:p>
-          <a:p>
-            <a:pPr lvl="0"/>
-            <a:r>
-              <a:rPr lang="de-DE" dirty="0"/>
-              <a:t>Integrationsszenarien: Es müssen mehrere unterschiedliche Systeme zusammenarbeiten.</a:t>
-            </a:r>
-          </a:p>
-          <a:p>
-            <a:pPr lvl="0"/>
-            <a:r>
-              <a:rPr lang="de-DE" dirty="0"/>
-              <a:t>Sender erzeugt Nachrichten erheblich schneller, als sie von Empfängern verarbeitet werden können. Eine Message-Queue als Puffer kann hier ausgleichen.</a:t>
-            </a:r>
-          </a:p>
-          <a:p>
-            <a:pPr marL="0" indent="0">
-              <a:buNone/>
-            </a:pPr>
-            <a:r>
-              <a:rPr lang="de-DE" dirty="0"/>
-              <a:t>Vorteile</a:t>
-            </a:r>
-          </a:p>
-          <a:p>
-            <a:pPr lvl="0"/>
-            <a:r>
-              <a:rPr lang="de-DE" dirty="0"/>
-              <a:t>Sender und Empfänger von Nachrichten können in völlig unterschiedliche Technologien und Programmiersprachen erstellt werden.</a:t>
-            </a:r>
-          </a:p>
-          <a:p>
-            <a:pPr lvl="0"/>
-            <a:r>
-              <a:rPr lang="de-DE" dirty="0"/>
-              <a:t>Message-Queues, insbesondere solche mit zuverlässiger Zustellung (</a:t>
-            </a:r>
-            <a:r>
-              <a:rPr lang="de-DE" dirty="0" err="1"/>
-              <a:t>reliable</a:t>
-            </a:r>
-            <a:r>
-              <a:rPr lang="de-DE" dirty="0"/>
-              <a:t> </a:t>
-            </a:r>
-            <a:r>
-              <a:rPr lang="de-DE" dirty="0" err="1"/>
-              <a:t>messaging</a:t>
-            </a:r>
-            <a:r>
-              <a:rPr lang="de-DE" dirty="0"/>
-              <a:t>), können die Verfügbarkeit und </a:t>
-            </a:r>
-            <a:r>
-              <a:rPr lang="de-DE" dirty="0" err="1"/>
-              <a:t>Rubstheit</a:t>
-            </a:r>
-            <a:r>
-              <a:rPr lang="de-DE" dirty="0"/>
-              <a:t> von Systemen erheblich steigern. Aus diesem Grund werden MQ-Systeme insbesondere im Bereich Finanz- und Kontodaten häufig eingesetzt.</a:t>
-            </a:r>
-          </a:p>
-          <a:p>
-            <a:pPr marL="0" indent="0">
-              <a:buNone/>
-            </a:pPr>
-            <a:r>
-              <a:rPr lang="de-DE" dirty="0"/>
-              <a:t>Nachteile</a:t>
-            </a:r>
-          </a:p>
-          <a:p>
-            <a:pPr lvl="0"/>
-            <a:r>
-              <a:rPr lang="de-DE" dirty="0"/>
-              <a:t>Message-Queues (ob kommerziell oder Open-Source) sind in sich komplexe Systeme mit teilweise hohem Einführungs- und Administrationsaufwand.</a:t>
-            </a:r>
-          </a:p>
-          <a:p>
-            <a:pPr lvl="0"/>
-            <a:r>
-              <a:rPr lang="de-DE" dirty="0"/>
-              <a:t>Asynchrone und nachrichtenbasierte Programmierung ist signifikant aufwendiger als einfacher </a:t>
-            </a:r>
-            <a:r>
-              <a:rPr lang="de-DE" dirty="0" err="1"/>
-              <a:t>call</a:t>
-            </a:r>
-            <a:r>
-              <a:rPr lang="de-DE" dirty="0"/>
-              <a:t>-and-return-Stil. Fehlversuche in asynchronen Systemen kann aufwendig sein.</a:t>
-            </a:r>
-          </a:p>
-          <a:p>
-            <a:endParaRPr lang="de-DE" dirty="0"/>
-          </a:p>
-        </p:txBody>
-      </p:sp>
+        </p:nvPicPr>
+        <p:blipFill rotWithShape="1">
+          <a:blip r:embed="rId2">
+            <a:extLst>
+              <a:ext uri="{28A0092B-C50C-407E-A947-70E740481C1C}">
+                <a14:useLocalDpi xmlns:a14="http://schemas.microsoft.com/office/drawing/2010/main" val="0"/>
+              </a:ext>
+            </a:extLst>
+          </a:blip>
+          <a:srcRect l="1381" t="3585" r="1561" b="2603"/>
+          <a:stretch/>
+        </p:blipFill>
+        <p:spPr>
+          <a:xfrm>
+            <a:off x="3345872" y="1555605"/>
+            <a:ext cx="8537864" cy="5184521"/>
+          </a:xfrm>
+        </p:spPr>
+      </p:pic>
     </p:spTree>
     <p:extLst>
       <p:ext uri="{BB962C8B-B14F-4D97-AF65-F5344CB8AC3E}">
-        <p14:creationId xmlns:p14="http://schemas.microsoft.com/office/powerpoint/2010/main" val="336828123"/>
+        <p14:creationId xmlns:p14="http://schemas.microsoft.com/office/powerpoint/2010/main" val="4205535577"/>
+      </p:ext>
+    </p:extLst>
+  </p:cSld>
+  <p:clrMapOvr>
+    <a:masterClrMapping/>
+  </p:clrMapOvr>
+  <p:timing>
+    <p:tnLst>
+      <p:par>
+        <p:cTn id="1" dur="indefinite" restart="never" nodeType="tmRoot"/>
+      </p:par>
+    </p:tnLst>
+  </p:timing>
+</p:sld>
+</file>
+
+<file path=ppt/slides/slide5.xml><?xml version="1.0" encoding="utf-8"?>
+<p:sld xmlns:a="http://schemas.openxmlformats.org/drawingml/2006/main" xmlns:r="http://schemas.openxmlformats.org/officeDocument/2006/relationships" xmlns:p="http://schemas.openxmlformats.org/presentationml/2006/main">
+  <p:cSld>
+    <p:spTree>
+      <p:nvGrpSpPr>
+        <p:cNvPr id="1" name=""/>
+        <p:cNvGrpSpPr/>
+        <p:nvPr/>
+      </p:nvGrpSpPr>
+      <p:grpSpPr>
+        <a:xfrm>
+          <a:off x="0" y="0"/>
+          <a:ext cx="0" cy="0"/>
+          <a:chOff x="0" y="0"/>
+          <a:chExt cx="0" cy="0"/>
+        </a:xfrm>
+      </p:grpSpPr>
+      <p:sp>
+        <p:nvSpPr>
+          <p:cNvPr id="2" name="Titel 1"/>
+          <p:cNvSpPr>
+            <a:spLocks noGrp="1"/>
+          </p:cNvSpPr>
+          <p:nvPr>
+            <p:ph type="title"/>
+          </p:nvPr>
+        </p:nvSpPr>
+        <p:spPr/>
+        <p:txBody>
+          <a:bodyPr/>
+          <a:lstStyle/>
+          <a:p>
+            <a:r>
+              <a:rPr lang="de-DE" dirty="0" smtClean="0"/>
+              <a:t>Vergleich alte/neue Implementierung - Architektur</a:t>
+            </a:r>
+            <a:endParaRPr lang="de-DE" dirty="0"/>
+          </a:p>
+        </p:txBody>
+      </p:sp>
+      <p:pic>
+        <p:nvPicPr>
+          <p:cNvPr id="4" name="Inhaltsplatzhalter 3"/>
+          <p:cNvPicPr>
+            <a:picLocks noGrp="1" noChangeAspect="1"/>
+          </p:cNvPicPr>
+          <p:nvPr>
+            <p:ph idx="1"/>
+          </p:nvPr>
+        </p:nvPicPr>
+        <p:blipFill>
+          <a:blip r:embed="rId2">
+            <a:extLst>
+              <a:ext uri="{28A0092B-C50C-407E-A947-70E740481C1C}">
+                <a14:useLocalDpi xmlns:a14="http://schemas.microsoft.com/office/drawing/2010/main" val="0"/>
+              </a:ext>
+            </a:extLst>
+          </a:blip>
+          <a:stretch>
+            <a:fillRect/>
+          </a:stretch>
+        </p:blipFill>
+        <p:spPr>
+          <a:xfrm>
+            <a:off x="4954825" y="1555605"/>
+            <a:ext cx="5319957" cy="5184521"/>
+          </a:xfrm>
+        </p:spPr>
+      </p:pic>
+    </p:spTree>
+    <p:extLst>
+      <p:ext uri="{BB962C8B-B14F-4D97-AF65-F5344CB8AC3E}">
+        <p14:creationId xmlns:p14="http://schemas.microsoft.com/office/powerpoint/2010/main" val="1670476676"/>
+      </p:ext>
+    </p:extLst>
+  </p:cSld>
+  <p:clrMapOvr>
+    <a:masterClrMapping/>
+  </p:clrMapOvr>
+  <p:timing>
+    <p:tnLst>
+      <p:par>
+        <p:cTn id="1" dur="indefinite" restart="never" nodeType="tmRoot"/>
+      </p:par>
+    </p:tnLst>
+  </p:timing>
+</p:sld>
+</file>
+
+<file path=ppt/slides/slide6.xml><?xml version="1.0" encoding="utf-8"?>
+<p:sld xmlns:a="http://schemas.openxmlformats.org/drawingml/2006/main" xmlns:r="http://schemas.openxmlformats.org/officeDocument/2006/relationships" xmlns:p="http://schemas.openxmlformats.org/presentationml/2006/main">
+  <p:cSld>
+    <p:spTree>
+      <p:nvGrpSpPr>
+        <p:cNvPr id="1" name=""/>
+        <p:cNvGrpSpPr/>
+        <p:nvPr/>
+      </p:nvGrpSpPr>
+      <p:grpSpPr>
+        <a:xfrm>
+          <a:off x="0" y="0"/>
+          <a:ext cx="0" cy="0"/>
+          <a:chOff x="0" y="0"/>
+          <a:chExt cx="0" cy="0"/>
+        </a:xfrm>
+      </p:grpSpPr>
+      <p:sp>
+        <p:nvSpPr>
+          <p:cNvPr id="2" name="Titel 1"/>
+          <p:cNvSpPr>
+            <a:spLocks noGrp="1"/>
+          </p:cNvSpPr>
+          <p:nvPr>
+            <p:ph type="title"/>
+          </p:nvPr>
+        </p:nvSpPr>
+        <p:spPr/>
+        <p:txBody>
+          <a:bodyPr/>
+          <a:lstStyle/>
+          <a:p>
+            <a:r>
+              <a:rPr lang="de-DE" dirty="0" smtClean="0"/>
+              <a:t>Vergleich alte/neue Implementierung - </a:t>
+            </a:r>
+            <a:r>
+              <a:rPr lang="de-DE" dirty="0" err="1" smtClean="0"/>
+              <a:t>Refactoring</a:t>
+            </a:r>
+            <a:endParaRPr lang="de-DE" dirty="0"/>
+          </a:p>
+        </p:txBody>
+      </p:sp>
+      <p:sp>
+        <p:nvSpPr>
+          <p:cNvPr id="3" name="Inhaltsplatzhalter 2"/>
+          <p:cNvSpPr>
+            <a:spLocks noGrp="1"/>
+          </p:cNvSpPr>
+          <p:nvPr>
+            <p:ph idx="1"/>
+          </p:nvPr>
+        </p:nvSpPr>
+        <p:spPr/>
+        <p:txBody>
+          <a:bodyPr>
+            <a:normAutofit/>
+          </a:bodyPr>
+          <a:lstStyle/>
+          <a:p>
+            <a:pPr marL="285750" indent="-285750">
+              <a:buFontTx/>
+              <a:buChar char="-"/>
+            </a:pPr>
+            <a:r>
+              <a:rPr lang="de-DE" dirty="0"/>
+              <a:t>Verteilung der Chatanwendung</a:t>
+            </a:r>
+          </a:p>
+          <a:p>
+            <a:pPr marL="285750" indent="-285750">
+              <a:buFontTx/>
+              <a:buChar char="-"/>
+            </a:pPr>
+            <a:r>
+              <a:rPr lang="de-DE" dirty="0"/>
+              <a:t>Auflösung von zirkulären Abhängigkeiten</a:t>
+            </a:r>
+          </a:p>
+          <a:p>
+            <a:pPr marL="285750" indent="-285750">
+              <a:buFontTx/>
+              <a:buChar char="-"/>
+            </a:pPr>
+            <a:r>
+              <a:rPr lang="de-DE" dirty="0"/>
+              <a:t>Entwicklung von Integrationstests</a:t>
+            </a:r>
+          </a:p>
+          <a:p>
+            <a:pPr marL="285750" indent="-285750">
+              <a:buFontTx/>
+              <a:buChar char="-"/>
+            </a:pPr>
+            <a:r>
+              <a:rPr lang="de-DE" dirty="0"/>
+              <a:t>Einsatz von </a:t>
+            </a:r>
+            <a:r>
+              <a:rPr lang="de-DE" dirty="0" err="1"/>
+              <a:t>Dependency</a:t>
+            </a:r>
+            <a:r>
+              <a:rPr lang="de-DE" dirty="0"/>
+              <a:t> Management</a:t>
+            </a:r>
+          </a:p>
+          <a:p>
+            <a:pPr marL="285750" indent="-285750">
+              <a:buFontTx/>
+              <a:buChar char="-"/>
+            </a:pPr>
+            <a:r>
+              <a:rPr lang="de-DE" dirty="0"/>
+              <a:t>Update der teilw. offiziell schon nicht mehr unterstützten </a:t>
+            </a:r>
+            <a:r>
+              <a:rPr lang="de-DE" dirty="0" err="1"/>
+              <a:t>Frameworkversionen</a:t>
+            </a:r>
+            <a:endParaRPr lang="de-DE" dirty="0"/>
+          </a:p>
+          <a:p>
+            <a:pPr marL="285750" indent="-285750">
+              <a:buFontTx/>
+              <a:buChar char="-"/>
+            </a:pPr>
+            <a:endParaRPr lang="de-DE" dirty="0"/>
+          </a:p>
+        </p:txBody>
+      </p:sp>
+    </p:spTree>
+    <p:extLst>
+      <p:ext uri="{BB962C8B-B14F-4D97-AF65-F5344CB8AC3E}">
+        <p14:creationId xmlns:p14="http://schemas.microsoft.com/office/powerpoint/2010/main" val="3432204887"/>
       </p:ext>
     </p:extLst>
   </p:cSld>

</xml_diff>

<commit_message>
studienarbeit weitergeschrieben und einige Abschnitte umgeworfen & hinzugefuegt
</commit_message>
<xml_diff>
--- a/dokumentation/vortrag.pptx
+++ b/dokumentation/vortrag.pptx
@@ -160,10 +160,9 @@
           </a:lstStyle>
           <a:p>
             <a:r>
-              <a:rPr lang="de-DE" smtClean="0"/>
+              <a:rPr lang="de-DE"/>
               <a:t>Titelmasterformat durch Klicken bearbeiten</a:t>
             </a:r>
-            <a:endParaRPr lang="de-DE"/>
           </a:p>
         </p:txBody>
       </p:sp>
@@ -225,10 +224,9 @@
           </a:lstStyle>
           <a:p>
             <a:r>
-              <a:rPr lang="de-DE" smtClean="0"/>
+              <a:rPr lang="de-DE"/>
               <a:t>Formatvorlage des Untertitelmasters durch Klicken bearbeiten</a:t>
             </a:r>
-            <a:endParaRPr lang="de-DE"/>
           </a:p>
         </p:txBody>
       </p:sp>
@@ -338,13 +336,6 @@
   <p:clrMapOvr>
     <a:masterClrMapping/>
   </p:clrMapOvr>
-  <p:timing>
-    <p:tnLst>
-      <p:par>
-        <p:cTn id="1" dur="indefinite" restart="never" nodeType="tmRoot"/>
-      </p:par>
-    </p:tnLst>
-  </p:timing>
 </p:sldLayout>
 </file>
 
@@ -381,10 +372,9 @@
           <a:lstStyle/>
           <a:p>
             <a:r>
-              <a:rPr lang="de-DE" smtClean="0"/>
+              <a:rPr lang="de-DE"/>
               <a:t>Titelmasterformat durch Klicken bearbeiten</a:t>
             </a:r>
-            <a:endParaRPr lang="de-DE"/>
           </a:p>
         </p:txBody>
       </p:sp>
@@ -405,38 +395,37 @@
           <a:p>
             <a:pPr lvl="0"/>
             <a:r>
-              <a:rPr lang="de-DE" smtClean="0"/>
+              <a:rPr lang="de-DE"/>
               <a:t>Textmasterformat bearbeiten</a:t>
             </a:r>
           </a:p>
           <a:p>
             <a:pPr lvl="1"/>
             <a:r>
-              <a:rPr lang="de-DE" smtClean="0"/>
+              <a:rPr lang="de-DE"/>
               <a:t>Zweite Ebene</a:t>
             </a:r>
           </a:p>
           <a:p>
             <a:pPr lvl="2"/>
             <a:r>
-              <a:rPr lang="de-DE" smtClean="0"/>
+              <a:rPr lang="de-DE"/>
               <a:t>Dritte Ebene</a:t>
             </a:r>
           </a:p>
           <a:p>
             <a:pPr lvl="3"/>
             <a:r>
-              <a:rPr lang="de-DE" smtClean="0"/>
+              <a:rPr lang="de-DE"/>
               <a:t>Vierte Ebene</a:t>
             </a:r>
           </a:p>
           <a:p>
             <a:pPr lvl="4"/>
             <a:r>
-              <a:rPr lang="de-DE" smtClean="0"/>
+              <a:rPr lang="de-DE"/>
               <a:t>Fünfte Ebene</a:t>
             </a:r>
-            <a:endParaRPr lang="de-DE"/>
           </a:p>
         </p:txBody>
       </p:sp>
@@ -546,13 +535,6 @@
   <p:clrMapOvr>
     <a:masterClrMapping/>
   </p:clrMapOvr>
-  <p:timing>
-    <p:tnLst>
-      <p:par>
-        <p:cTn id="1" dur="indefinite" restart="never" nodeType="tmRoot"/>
-      </p:par>
-    </p:tnLst>
-  </p:timing>
 </p:sldLayout>
 </file>
 
@@ -594,10 +576,9 @@
           <a:lstStyle/>
           <a:p>
             <a:r>
-              <a:rPr lang="de-DE" smtClean="0"/>
+              <a:rPr lang="de-DE"/>
               <a:t>Titelmasterformat durch Klicken bearbeiten</a:t>
             </a:r>
-            <a:endParaRPr lang="de-DE"/>
           </a:p>
         </p:txBody>
       </p:sp>
@@ -623,38 +604,37 @@
           <a:p>
             <a:pPr lvl="0"/>
             <a:r>
-              <a:rPr lang="de-DE" smtClean="0"/>
+              <a:rPr lang="de-DE"/>
               <a:t>Textmasterformat bearbeiten</a:t>
             </a:r>
           </a:p>
           <a:p>
             <a:pPr lvl="1"/>
             <a:r>
-              <a:rPr lang="de-DE" smtClean="0"/>
+              <a:rPr lang="de-DE"/>
               <a:t>Zweite Ebene</a:t>
             </a:r>
           </a:p>
           <a:p>
             <a:pPr lvl="2"/>
             <a:r>
-              <a:rPr lang="de-DE" smtClean="0"/>
+              <a:rPr lang="de-DE"/>
               <a:t>Dritte Ebene</a:t>
             </a:r>
           </a:p>
           <a:p>
             <a:pPr lvl="3"/>
             <a:r>
-              <a:rPr lang="de-DE" smtClean="0"/>
+              <a:rPr lang="de-DE"/>
               <a:t>Vierte Ebene</a:t>
             </a:r>
           </a:p>
           <a:p>
             <a:pPr lvl="4"/>
             <a:r>
-              <a:rPr lang="de-DE" smtClean="0"/>
+              <a:rPr lang="de-DE"/>
               <a:t>Fünfte Ebene</a:t>
             </a:r>
-            <a:endParaRPr lang="de-DE"/>
           </a:p>
         </p:txBody>
       </p:sp>
@@ -764,13 +744,6 @@
   <p:clrMapOvr>
     <a:masterClrMapping/>
   </p:clrMapOvr>
-  <p:timing>
-    <p:tnLst>
-      <p:par>
-        <p:cTn id="1" dur="indefinite" restart="never" nodeType="tmRoot"/>
-      </p:par>
-    </p:tnLst>
-  </p:timing>
 </p:sldLayout>
 </file>
 
@@ -818,10 +791,9 @@
           </a:lstStyle>
           <a:p>
             <a:r>
-              <a:rPr lang="de-DE" smtClean="0"/>
+              <a:rPr lang="de-DE"/>
               <a:t>Titelmasterformat durch Klicken bearbeiten</a:t>
             </a:r>
-            <a:endParaRPr lang="de-DE"/>
           </a:p>
         </p:txBody>
       </p:sp>
@@ -847,38 +819,37 @@
           <a:p>
             <a:pPr lvl="0"/>
             <a:r>
-              <a:rPr lang="de-DE" smtClean="0"/>
+              <a:rPr lang="de-DE"/>
               <a:t>Textmasterformat bearbeiten</a:t>
             </a:r>
           </a:p>
           <a:p>
             <a:pPr lvl="1"/>
             <a:r>
-              <a:rPr lang="de-DE" smtClean="0"/>
+              <a:rPr lang="de-DE"/>
               <a:t>Zweite Ebene</a:t>
             </a:r>
           </a:p>
           <a:p>
             <a:pPr lvl="2"/>
             <a:r>
-              <a:rPr lang="de-DE" smtClean="0"/>
+              <a:rPr lang="de-DE"/>
               <a:t>Dritte Ebene</a:t>
             </a:r>
           </a:p>
           <a:p>
             <a:pPr lvl="3"/>
             <a:r>
-              <a:rPr lang="de-DE" smtClean="0"/>
+              <a:rPr lang="de-DE"/>
               <a:t>Vierte Ebene</a:t>
             </a:r>
           </a:p>
           <a:p>
             <a:pPr lvl="4"/>
             <a:r>
-              <a:rPr lang="de-DE" smtClean="0"/>
+              <a:rPr lang="de-DE"/>
               <a:t>Fünfte Ebene</a:t>
             </a:r>
-            <a:endParaRPr lang="de-DE"/>
           </a:p>
         </p:txBody>
       </p:sp>
@@ -988,13 +959,6 @@
   <p:clrMapOvr>
     <a:masterClrMapping/>
   </p:clrMapOvr>
-  <p:timing>
-    <p:tnLst>
-      <p:par>
-        <p:cTn id="1" dur="indefinite" restart="never" nodeType="tmRoot"/>
-      </p:par>
-    </p:tnLst>
-  </p:timing>
 </p:sldLayout>
 </file>
 
@@ -1040,10 +1004,9 @@
           </a:lstStyle>
           <a:p>
             <a:r>
-              <a:rPr lang="de-DE" smtClean="0"/>
+              <a:rPr lang="de-DE"/>
               <a:t>Titelmasterformat durch Klicken bearbeiten</a:t>
             </a:r>
-            <a:endParaRPr lang="de-DE"/>
           </a:p>
         </p:txBody>
       </p:sp>
@@ -1160,7 +1123,7 @@
           <a:p>
             <a:pPr lvl="0"/>
             <a:r>
-              <a:rPr lang="de-DE" smtClean="0"/>
+              <a:rPr lang="de-DE"/>
               <a:t>Textmasterformat bearbeiten</a:t>
             </a:r>
           </a:p>
@@ -1272,13 +1235,6 @@
   <p:clrMapOvr>
     <a:masterClrMapping/>
   </p:clrMapOvr>
-  <p:timing>
-    <p:tnLst>
-      <p:par>
-        <p:cTn id="1" dur="indefinite" restart="never" nodeType="tmRoot"/>
-      </p:par>
-    </p:tnLst>
-  </p:timing>
 </p:sldLayout>
 </file>
 
@@ -1321,38 +1277,37 @@
           <a:p>
             <a:pPr lvl="0"/>
             <a:r>
-              <a:rPr lang="de-DE" smtClean="0"/>
+              <a:rPr lang="de-DE"/>
               <a:t>Textmasterformat bearbeiten</a:t>
             </a:r>
           </a:p>
           <a:p>
             <a:pPr lvl="1"/>
             <a:r>
-              <a:rPr lang="de-DE" smtClean="0"/>
+              <a:rPr lang="de-DE"/>
               <a:t>Zweite Ebene</a:t>
             </a:r>
           </a:p>
           <a:p>
             <a:pPr lvl="2"/>
             <a:r>
-              <a:rPr lang="de-DE" smtClean="0"/>
+              <a:rPr lang="de-DE"/>
               <a:t>Dritte Ebene</a:t>
             </a:r>
           </a:p>
           <a:p>
             <a:pPr lvl="3"/>
             <a:r>
-              <a:rPr lang="de-DE" smtClean="0"/>
+              <a:rPr lang="de-DE"/>
               <a:t>Vierte Ebene</a:t>
             </a:r>
           </a:p>
           <a:p>
             <a:pPr lvl="4"/>
             <a:r>
-              <a:rPr lang="de-DE" smtClean="0"/>
+              <a:rPr lang="de-DE"/>
               <a:t>Fünfte Ebene</a:t>
             </a:r>
-            <a:endParaRPr lang="de-DE"/>
           </a:p>
         </p:txBody>
       </p:sp>
@@ -1378,38 +1333,37 @@
           <a:p>
             <a:pPr lvl="0"/>
             <a:r>
-              <a:rPr lang="de-DE" smtClean="0"/>
+              <a:rPr lang="de-DE"/>
               <a:t>Textmasterformat bearbeiten</a:t>
             </a:r>
           </a:p>
           <a:p>
             <a:pPr lvl="1"/>
             <a:r>
-              <a:rPr lang="de-DE" smtClean="0"/>
+              <a:rPr lang="de-DE"/>
               <a:t>Zweite Ebene</a:t>
             </a:r>
           </a:p>
           <a:p>
             <a:pPr lvl="2"/>
             <a:r>
-              <a:rPr lang="de-DE" smtClean="0"/>
+              <a:rPr lang="de-DE"/>
               <a:t>Dritte Ebene</a:t>
             </a:r>
           </a:p>
           <a:p>
             <a:pPr lvl="3"/>
             <a:r>
-              <a:rPr lang="de-DE" smtClean="0"/>
+              <a:rPr lang="de-DE"/>
               <a:t>Vierte Ebene</a:t>
             </a:r>
           </a:p>
           <a:p>
             <a:pPr lvl="4"/>
             <a:r>
-              <a:rPr lang="de-DE" smtClean="0"/>
+              <a:rPr lang="de-DE"/>
               <a:t>Fünfte Ebene</a:t>
             </a:r>
-            <a:endParaRPr lang="de-DE"/>
           </a:p>
         </p:txBody>
       </p:sp>
@@ -1536,10 +1490,9 @@
           </a:lstStyle>
           <a:p>
             <a:r>
-              <a:rPr lang="de-DE" smtClean="0"/>
+              <a:rPr lang="de-DE"/>
               <a:t>Titelmasterformat durch Klicken bearbeiten</a:t>
             </a:r>
-            <a:endParaRPr lang="de-DE"/>
           </a:p>
         </p:txBody>
       </p:sp>
@@ -1553,13 +1506,6 @@
   <p:clrMapOvr>
     <a:masterClrMapping/>
   </p:clrMapOvr>
-  <p:timing>
-    <p:tnLst>
-      <p:par>
-        <p:cTn id="1" dur="indefinite" restart="never" nodeType="tmRoot"/>
-      </p:par>
-    </p:tnLst>
-  </p:timing>
 </p:sldLayout>
 </file>
 
@@ -1639,7 +1585,7 @@
           <a:p>
             <a:pPr lvl="0"/>
             <a:r>
-              <a:rPr lang="de-DE" smtClean="0"/>
+              <a:rPr lang="de-DE"/>
               <a:t>Textmasterformat bearbeiten</a:t>
             </a:r>
           </a:p>
@@ -1667,38 +1613,37 @@
           <a:p>
             <a:pPr lvl="0"/>
             <a:r>
-              <a:rPr lang="de-DE" smtClean="0"/>
+              <a:rPr lang="de-DE"/>
               <a:t>Textmasterformat bearbeiten</a:t>
             </a:r>
           </a:p>
           <a:p>
             <a:pPr lvl="1"/>
             <a:r>
-              <a:rPr lang="de-DE" smtClean="0"/>
+              <a:rPr lang="de-DE"/>
               <a:t>Zweite Ebene</a:t>
             </a:r>
           </a:p>
           <a:p>
             <a:pPr lvl="2"/>
             <a:r>
-              <a:rPr lang="de-DE" smtClean="0"/>
+              <a:rPr lang="de-DE"/>
               <a:t>Dritte Ebene</a:t>
             </a:r>
           </a:p>
           <a:p>
             <a:pPr lvl="3"/>
             <a:r>
-              <a:rPr lang="de-DE" smtClean="0"/>
+              <a:rPr lang="de-DE"/>
               <a:t>Vierte Ebene</a:t>
             </a:r>
           </a:p>
           <a:p>
             <a:pPr lvl="4"/>
             <a:r>
-              <a:rPr lang="de-DE" smtClean="0"/>
+              <a:rPr lang="de-DE"/>
               <a:t>Fünfte Ebene</a:t>
             </a:r>
-            <a:endParaRPr lang="de-DE"/>
           </a:p>
         </p:txBody>
       </p:sp>
@@ -1761,7 +1706,7 @@
           <a:p>
             <a:pPr lvl="0"/>
             <a:r>
-              <a:rPr lang="de-DE" smtClean="0"/>
+              <a:rPr lang="de-DE"/>
               <a:t>Textmasterformat bearbeiten</a:t>
             </a:r>
           </a:p>
@@ -1789,38 +1734,37 @@
           <a:p>
             <a:pPr lvl="0"/>
             <a:r>
-              <a:rPr lang="de-DE" smtClean="0"/>
+              <a:rPr lang="de-DE"/>
               <a:t>Textmasterformat bearbeiten</a:t>
             </a:r>
           </a:p>
           <a:p>
             <a:pPr lvl="1"/>
             <a:r>
-              <a:rPr lang="de-DE" smtClean="0"/>
+              <a:rPr lang="de-DE"/>
               <a:t>Zweite Ebene</a:t>
             </a:r>
           </a:p>
           <a:p>
             <a:pPr lvl="2"/>
             <a:r>
-              <a:rPr lang="de-DE" smtClean="0"/>
+              <a:rPr lang="de-DE"/>
               <a:t>Dritte Ebene</a:t>
             </a:r>
           </a:p>
           <a:p>
             <a:pPr lvl="3"/>
             <a:r>
-              <a:rPr lang="de-DE" smtClean="0"/>
+              <a:rPr lang="de-DE"/>
               <a:t>Vierte Ebene</a:t>
             </a:r>
           </a:p>
           <a:p>
             <a:pPr lvl="4"/>
             <a:r>
-              <a:rPr lang="de-DE" smtClean="0"/>
+              <a:rPr lang="de-DE"/>
               <a:t>Fünfte Ebene</a:t>
             </a:r>
-            <a:endParaRPr lang="de-DE"/>
           </a:p>
         </p:txBody>
       </p:sp>
@@ -1947,10 +1891,9 @@
           </a:lstStyle>
           <a:p>
             <a:r>
-              <a:rPr lang="de-DE" smtClean="0"/>
+              <a:rPr lang="de-DE"/>
               <a:t>Titelmasterformat durch Klicken bearbeiten</a:t>
             </a:r>
-            <a:endParaRPr lang="de-DE"/>
           </a:p>
         </p:txBody>
       </p:sp>
@@ -1964,13 +1907,6 @@
   <p:clrMapOvr>
     <a:masterClrMapping/>
   </p:clrMapOvr>
-  <p:timing>
-    <p:tnLst>
-      <p:par>
-        <p:cTn id="1" dur="indefinite" restart="never" nodeType="tmRoot"/>
-      </p:par>
-    </p:tnLst>
-  </p:timing>
 </p:sldLayout>
 </file>
 
@@ -2114,10 +2050,9 @@
           </a:lstStyle>
           <a:p>
             <a:r>
-              <a:rPr lang="de-DE" smtClean="0"/>
+              <a:rPr lang="de-DE"/>
               <a:t>Titelmasterformat durch Klicken bearbeiten</a:t>
             </a:r>
-            <a:endParaRPr lang="de-DE"/>
           </a:p>
         </p:txBody>
       </p:sp>
@@ -2131,13 +2066,6 @@
   <p:clrMapOvr>
     <a:masterClrMapping/>
   </p:clrMapOvr>
-  <p:timing>
-    <p:tnLst>
-      <p:par>
-        <p:cTn id="1" dur="indefinite" restart="never" nodeType="tmRoot"/>
-      </p:par>
-    </p:tnLst>
-  </p:timing>
 </p:sldLayout>
 </file>
 
@@ -2264,13 +2192,6 @@
   <p:clrMapOvr>
     <a:masterClrMapping/>
   </p:clrMapOvr>
-  <p:timing>
-    <p:tnLst>
-      <p:par>
-        <p:cTn id="1" dur="indefinite" restart="never" nodeType="tmRoot"/>
-      </p:par>
-    </p:tnLst>
-  </p:timing>
 </p:sldLayout>
 </file>
 
@@ -2316,10 +2237,9 @@
           </a:lstStyle>
           <a:p>
             <a:r>
-              <a:rPr lang="de-DE" smtClean="0"/>
+              <a:rPr lang="de-DE"/>
               <a:t>Titelmasterformat durch Klicken bearbeiten</a:t>
             </a:r>
-            <a:endParaRPr lang="de-DE"/>
           </a:p>
         </p:txBody>
       </p:sp>
@@ -2373,38 +2293,37 @@
           <a:p>
             <a:pPr lvl="0"/>
             <a:r>
-              <a:rPr lang="de-DE" smtClean="0"/>
+              <a:rPr lang="de-DE"/>
               <a:t>Textmasterformat bearbeiten</a:t>
             </a:r>
           </a:p>
           <a:p>
             <a:pPr lvl="1"/>
             <a:r>
-              <a:rPr lang="de-DE" smtClean="0"/>
+              <a:rPr lang="de-DE"/>
               <a:t>Zweite Ebene</a:t>
             </a:r>
           </a:p>
           <a:p>
             <a:pPr lvl="2"/>
             <a:r>
-              <a:rPr lang="de-DE" smtClean="0"/>
+              <a:rPr lang="de-DE"/>
               <a:t>Dritte Ebene</a:t>
             </a:r>
           </a:p>
           <a:p>
             <a:pPr lvl="3"/>
             <a:r>
-              <a:rPr lang="de-DE" smtClean="0"/>
+              <a:rPr lang="de-DE"/>
               <a:t>Vierte Ebene</a:t>
             </a:r>
           </a:p>
           <a:p>
             <a:pPr lvl="4"/>
             <a:r>
-              <a:rPr lang="de-DE" smtClean="0"/>
+              <a:rPr lang="de-DE"/>
               <a:t>Fünfte Ebene</a:t>
             </a:r>
-            <a:endParaRPr lang="de-DE"/>
           </a:p>
         </p:txBody>
       </p:sp>
@@ -2467,7 +2386,7 @@
           <a:p>
             <a:pPr lvl="0"/>
             <a:r>
-              <a:rPr lang="de-DE" smtClean="0"/>
+              <a:rPr lang="de-DE"/>
               <a:t>Textmasterformat bearbeiten</a:t>
             </a:r>
           </a:p>
@@ -2579,13 +2498,6 @@
   <p:clrMapOvr>
     <a:masterClrMapping/>
   </p:clrMapOvr>
-  <p:timing>
-    <p:tnLst>
-      <p:par>
-        <p:cTn id="1" dur="indefinite" restart="never" nodeType="tmRoot"/>
-      </p:par>
-    </p:tnLst>
-  </p:timing>
 </p:sldLayout>
 </file>
 
@@ -2631,10 +2543,9 @@
           </a:lstStyle>
           <a:p>
             <a:r>
-              <a:rPr lang="de-DE" smtClean="0"/>
+              <a:rPr lang="de-DE"/>
               <a:t>Titelmasterformat durch Klicken bearbeiten</a:t>
             </a:r>
-            <a:endParaRPr lang="de-DE"/>
           </a:p>
         </p:txBody>
       </p:sp>
@@ -2758,7 +2669,7 @@
           <a:p>
             <a:pPr lvl="0"/>
             <a:r>
-              <a:rPr lang="de-DE" smtClean="0"/>
+              <a:rPr lang="de-DE"/>
               <a:t>Textmasterformat bearbeiten</a:t>
             </a:r>
           </a:p>
@@ -2870,13 +2781,6 @@
   <p:clrMapOvr>
     <a:masterClrMapping/>
   </p:clrMapOvr>
-  <p:timing>
-    <p:tnLst>
-      <p:par>
-        <p:cTn id="1" dur="indefinite" restart="never" nodeType="tmRoot"/>
-      </p:par>
-    </p:tnLst>
-  </p:timing>
 </p:sldLayout>
 </file>
 
@@ -2928,10 +2832,9 @@
           <a:lstStyle/>
           <a:p>
             <a:r>
-              <a:rPr lang="de-DE" smtClean="0"/>
+              <a:rPr lang="de-DE"/>
               <a:t>Titelmasterformat durch Klicken bearbeiten</a:t>
             </a:r>
-            <a:endParaRPr lang="de-DE"/>
           </a:p>
         </p:txBody>
       </p:sp>
@@ -2962,38 +2865,37 @@
           <a:p>
             <a:pPr lvl="0"/>
             <a:r>
-              <a:rPr lang="de-DE" smtClean="0"/>
+              <a:rPr lang="de-DE"/>
               <a:t>Textmasterformat bearbeiten</a:t>
             </a:r>
           </a:p>
           <a:p>
             <a:pPr lvl="1"/>
             <a:r>
-              <a:rPr lang="de-DE" smtClean="0"/>
+              <a:rPr lang="de-DE"/>
               <a:t>Zweite Ebene</a:t>
             </a:r>
           </a:p>
           <a:p>
             <a:pPr lvl="2"/>
             <a:r>
-              <a:rPr lang="de-DE" smtClean="0"/>
+              <a:rPr lang="de-DE"/>
               <a:t>Dritte Ebene</a:t>
             </a:r>
           </a:p>
           <a:p>
             <a:pPr lvl="3"/>
             <a:r>
-              <a:rPr lang="de-DE" smtClean="0"/>
+              <a:rPr lang="de-DE"/>
               <a:t>Vierte Ebene</a:t>
             </a:r>
           </a:p>
           <a:p>
             <a:pPr lvl="4"/>
             <a:r>
-              <a:rPr lang="de-DE" smtClean="0"/>
+              <a:rPr lang="de-DE"/>
               <a:t>Fünfte Ebene</a:t>
             </a:r>
-            <a:endParaRPr lang="de-DE"/>
           </a:p>
         </p:txBody>
       </p:sp>
@@ -3032,7 +2934,7 @@
           <a:p>
             <a:fld id="{620CDD3C-54BF-419E-B218-513BAD7E9405}" type="datetimeFigureOut">
               <a:rPr lang="de-DE" smtClean="0"/>
-              <a:t>01.12.2016</a:t>
+              <a:t>13.12.2016</a:t>
             </a:fld>
             <a:endParaRPr lang="de-DE"/>
           </a:p>
@@ -3137,13 +3039,6 @@
     <p:sldLayoutId id="2147483658" r:id="rId10"/>
     <p:sldLayoutId id="2147483659" r:id="rId11"/>
   </p:sldLayoutIdLst>
-  <p:timing>
-    <p:tnLst>
-      <p:par>
-        <p:cTn id="1" dur="indefinite" restart="never" nodeType="tmRoot"/>
-      </p:par>
-    </p:tnLst>
-  </p:timing>
   <p:txStyles>
     <p:titleStyle>
       <a:lvl1pPr algn="l" defTabSz="914400" rtl="0" eaLnBrk="1" latinLnBrk="0" hangingPunct="1">
@@ -3460,10 +3355,9 @@
           <a:lstStyle/>
           <a:p>
             <a:r>
-              <a:rPr lang="de-DE" dirty="0" smtClean="0"/>
+              <a:rPr lang="de-DE" dirty="0"/>
               <a:t>Verteilte Systeme</a:t>
             </a:r>
-            <a:endParaRPr lang="de-DE" dirty="0"/>
           </a:p>
         </p:txBody>
       </p:sp>
@@ -3483,35 +3377,35 @@
           <a:lstStyle/>
           <a:p>
             <a:r>
-              <a:rPr lang="de-DE" altLang="de-DE" dirty="0" smtClean="0"/>
+              <a:rPr lang="de-DE" altLang="de-DE" dirty="0"/>
               <a:t>IN 1</a:t>
             </a:r>
           </a:p>
           <a:p>
             <a:r>
-              <a:rPr lang="de-DE" altLang="de-DE" dirty="0" smtClean="0"/>
+              <a:rPr lang="de-DE" altLang="de-DE" dirty="0"/>
               <a:t>Christina </a:t>
             </a:r>
             <a:r>
-              <a:rPr lang="de-DE" altLang="de-DE" dirty="0" err="1" smtClean="0"/>
+              <a:rPr lang="de-DE" altLang="de-DE" dirty="0" err="1"/>
               <a:t>Eidelloth</a:t>
             </a:r>
             <a:r>
-              <a:rPr lang="de-DE" altLang="de-DE" dirty="0" smtClean="0"/>
+              <a:rPr lang="de-DE" altLang="de-DE" dirty="0"/>
               <a:t>, Felix </a:t>
             </a:r>
             <a:r>
-              <a:rPr lang="de-DE" altLang="de-DE" dirty="0" err="1" smtClean="0"/>
+              <a:rPr lang="de-DE" altLang="de-DE" dirty="0" err="1"/>
               <a:t>Stützinger</a:t>
             </a:r>
             <a:r>
-              <a:rPr lang="de-DE" altLang="de-DE" dirty="0" smtClean="0"/>
+              <a:rPr lang="de-DE" altLang="de-DE" dirty="0"/>
               <a:t>, David Sautter, Maximilian Auch</a:t>
             </a:r>
           </a:p>
           <a:p>
             <a:r>
-              <a:rPr lang="de-DE" altLang="de-DE" dirty="0" smtClean="0"/>
+              <a:rPr lang="de-DE" altLang="de-DE" dirty="0"/>
               <a:t>31.12.2016</a:t>
             </a:r>
           </a:p>
@@ -3527,13 +3421,6 @@
   <p:clrMapOvr>
     <a:masterClrMapping/>
   </p:clrMapOvr>
-  <p:timing>
-    <p:tnLst>
-      <p:par>
-        <p:cTn id="1" dur="indefinite" restart="never" nodeType="tmRoot"/>
-      </p:par>
-    </p:tnLst>
-  </p:timing>
 </p:sld>
 </file>
 
@@ -3570,10 +3457,9 @@
           <a:lstStyle/>
           <a:p>
             <a:r>
-              <a:rPr lang="de-DE" dirty="0" smtClean="0"/>
+              <a:rPr lang="de-DE" dirty="0"/>
               <a:t>Agenda</a:t>
             </a:r>
-            <a:endParaRPr lang="de-DE" dirty="0"/>
           </a:p>
         </p:txBody>
       </p:sp>
@@ -3601,11 +3487,7 @@
           <a:p>
             <a:r>
               <a:rPr lang="de-DE" dirty="0"/>
-              <a:t> </a:t>
-            </a:r>
-            <a:r>
-              <a:rPr lang="de-DE" dirty="0" smtClean="0"/>
-              <a:t>Message-Service-Architektur</a:t>
+              <a:t> Message-Service-Architektur</a:t>
             </a:r>
           </a:p>
           <a:p>
@@ -3614,47 +3496,37 @@
               <a:t> </a:t>
             </a:r>
             <a:r>
-              <a:rPr lang="de-DE" dirty="0" err="1" smtClean="0"/>
+              <a:rPr lang="de-DE" dirty="0" err="1"/>
               <a:t>Featureliste</a:t>
             </a:r>
-            <a:endParaRPr lang="de-DE" dirty="0" smtClean="0"/>
+            <a:endParaRPr lang="de-DE" dirty="0"/>
+          </a:p>
+          <a:p>
+            <a:r>
+              <a:rPr lang="de-DE" dirty="0"/>
+              <a:t> Vergleich alte und neue Implementierung</a:t>
+            </a:r>
           </a:p>
           <a:p>
             <a:r>
               <a:rPr lang="de-DE" dirty="0"/>
               <a:t> </a:t>
             </a:r>
-            <a:r>
-              <a:rPr lang="de-DE" dirty="0" smtClean="0"/>
-              <a:t>Vergleich alte und neue Implementierung</a:t>
-            </a:r>
           </a:p>
           <a:p>
             <a:r>
               <a:rPr lang="de-DE" dirty="0"/>
               <a:t> </a:t>
             </a:r>
-            <a:endParaRPr lang="de-DE" dirty="0" smtClean="0"/>
           </a:p>
           <a:p>
             <a:r>
               <a:rPr lang="de-DE" dirty="0"/>
-              <a:t> </a:t>
-            </a:r>
-            <a:endParaRPr lang="de-DE" dirty="0" smtClean="0"/>
-          </a:p>
-          <a:p>
-            <a:r>
-              <a:rPr lang="de-DE" dirty="0"/>
-              <a:t> </a:t>
-            </a:r>
-            <a:r>
-              <a:rPr lang="de-DE" dirty="0" smtClean="0"/>
-              <a:t>Monitoring für Administratoren</a:t>
-            </a:r>
-          </a:p>
-          <a:p>
-            <a:endParaRPr lang="de-DE" dirty="0" smtClean="0"/>
+              <a:t> Monitoring für Administratoren</a:t>
+            </a:r>
+          </a:p>
+          <a:p>
+            <a:endParaRPr lang="de-DE" dirty="0"/>
           </a:p>
         </p:txBody>
       </p:sp>
@@ -3668,13 +3540,6 @@
   <p:clrMapOvr>
     <a:masterClrMapping/>
   </p:clrMapOvr>
-  <p:timing>
-    <p:tnLst>
-      <p:par>
-        <p:cTn id="1" dur="indefinite" restart="never" nodeType="tmRoot"/>
-      </p:par>
-    </p:tnLst>
-  </p:timing>
 </p:sld>
 </file>
 
@@ -3711,10 +3576,9 @@
           <a:lstStyle/>
           <a:p>
             <a:r>
-              <a:rPr lang="de-DE" dirty="0" smtClean="0"/>
+              <a:rPr lang="de-DE" dirty="0"/>
               <a:t>Message-Service-Architektur</a:t>
             </a:r>
-            <a:endParaRPr lang="de-DE" dirty="0"/>
           </a:p>
         </p:txBody>
       </p:sp>
@@ -3873,13 +3737,6 @@
   <p:clrMapOvr>
     <a:masterClrMapping/>
   </p:clrMapOvr>
-  <p:timing>
-    <p:tnLst>
-      <p:par>
-        <p:cTn id="1" dur="indefinite" restart="never" nodeType="tmRoot"/>
-      </p:par>
-    </p:tnLst>
-  </p:timing>
 </p:sld>
 </file>
 
@@ -3916,7 +3773,7 @@
           <a:lstStyle/>
           <a:p>
             <a:r>
-              <a:rPr lang="de-DE" dirty="0" err="1" smtClean="0"/>
+              <a:rPr lang="de-DE" dirty="0" err="1"/>
               <a:t>Featureliste</a:t>
             </a:r>
             <a:endParaRPr lang="de-DE" dirty="0"/>
@@ -3936,7 +3793,7 @@
         <p:spPr/>
         <p:txBody>
           <a:bodyPr>
-            <a:normAutofit/>
+            <a:normAutofit fontScale="92500"/>
           </a:bodyPr>
           <a:lstStyle/>
           <a:p>
@@ -3945,7 +3802,7 @@
               <a:buChar char="-"/>
             </a:pPr>
             <a:r>
-              <a:rPr lang="de-DE" dirty="0" smtClean="0"/>
+              <a:rPr lang="de-DE" dirty="0"/>
               <a:t>6 austauschbare Projekte mit sehr wenig Abhängigkeiten</a:t>
             </a:r>
           </a:p>
@@ -3955,14 +3812,14 @@
               <a:buChar char="-"/>
             </a:pPr>
             <a:r>
-              <a:rPr lang="de-DE" dirty="0" smtClean="0"/>
+              <a:rPr lang="de-DE" dirty="0"/>
               <a:t>Automatische Generierung nativer .exe-Anwendungen zur </a:t>
             </a:r>
             <a:r>
-              <a:rPr lang="de-DE" dirty="0" err="1" smtClean="0"/>
+              <a:rPr lang="de-DE" dirty="0" err="1"/>
               <a:t>Buildzeit</a:t>
             </a:r>
-            <a:endParaRPr lang="de-DE" dirty="0" smtClean="0"/>
+            <a:endParaRPr lang="de-DE" dirty="0"/>
           </a:p>
           <a:p>
             <a:pPr>
@@ -3970,15 +3827,15 @@
               <a:buChar char="-"/>
             </a:pPr>
             <a:r>
-              <a:rPr lang="de-DE" dirty="0" smtClean="0"/>
+              <a:rPr lang="de-DE" dirty="0"/>
               <a:t>Setzt auf neusten </a:t>
             </a:r>
             <a:r>
-              <a:rPr lang="de-DE" dirty="0" err="1" smtClean="0"/>
+              <a:rPr lang="de-DE" dirty="0" err="1"/>
               <a:t>Applikationserver</a:t>
             </a:r>
             <a:r>
-              <a:rPr lang="de-DE" dirty="0" smtClean="0"/>
+              <a:rPr lang="de-DE" dirty="0"/>
               <a:t> (EAP7) und Bibliotheken</a:t>
             </a:r>
           </a:p>
@@ -3988,16 +3845,8 @@
               <a:buChar char="-"/>
             </a:pPr>
             <a:r>
-              <a:rPr lang="de-DE" dirty="0" smtClean="0"/>
-              <a:t>Skalierbares, </a:t>
-            </a:r>
-            <a:r>
-              <a:rPr lang="de-DE" dirty="0" err="1" smtClean="0"/>
-              <a:t>performantes</a:t>
-            </a:r>
-            <a:r>
-              <a:rPr lang="de-DE" dirty="0" smtClean="0"/>
-              <a:t> Backend</a:t>
+              <a:rPr lang="de-DE" dirty="0"/>
+              <a:t>Skalierbares, performance-optimiertes Backend</a:t>
             </a:r>
           </a:p>
           <a:p>
@@ -4006,8 +3855,8 @@
               <a:buChar char="-"/>
             </a:pPr>
             <a:r>
-              <a:rPr lang="de-DE" dirty="0" smtClean="0"/>
-              <a:t>Überarbeitete UI</a:t>
+              <a:rPr lang="de-DE" dirty="0"/>
+              <a:t>Überarbeitete, benutzerfreundliche und moderne UIs</a:t>
             </a:r>
           </a:p>
           <a:p>
@@ -4016,22 +3865,14 @@
               <a:buChar char="-"/>
             </a:pPr>
             <a:r>
-              <a:rPr lang="de-DE" dirty="0" smtClean="0"/>
-              <a:t>Automatisierte </a:t>
-            </a:r>
-            <a:r>
-              <a:rPr lang="de-DE" dirty="0" smtClean="0"/>
-              <a:t>Unit- und Integrationstests </a:t>
-            </a:r>
-            <a:r>
-              <a:rPr lang="de-DE" dirty="0" smtClean="0"/>
-              <a:t>zur </a:t>
-            </a:r>
-            <a:r>
-              <a:rPr lang="de-DE" dirty="0" err="1" smtClean="0"/>
+              <a:rPr lang="de-DE" dirty="0"/>
+              <a:t>Automatisierte Unit- und Integrationstests zur </a:t>
+            </a:r>
+            <a:r>
+              <a:rPr lang="de-DE" dirty="0" err="1"/>
               <a:t>Buildzeit</a:t>
             </a:r>
-            <a:endParaRPr lang="de-DE" dirty="0" smtClean="0"/>
+            <a:endParaRPr lang="de-DE" dirty="0"/>
           </a:p>
           <a:p>
             <a:pPr>
@@ -4039,29 +3880,36 @@
               <a:buChar char="-"/>
             </a:pPr>
             <a:r>
-              <a:rPr lang="de-DE" dirty="0" smtClean="0"/>
+              <a:rPr lang="de-DE" dirty="0"/>
               <a:t>Voller JEE 7 Support</a:t>
             </a:r>
           </a:p>
           <a:p>
-            <a:pPr marL="0" indent="0">
-              <a:buNone/>
+            <a:pPr>
+              <a:buFontTx/>
+              <a:buChar char="-"/>
             </a:pPr>
             <a:r>
-              <a:rPr lang="de-DE" dirty="0" smtClean="0"/>
-              <a:t>- </a:t>
-            </a:r>
-            <a:r>
-              <a:rPr lang="de-DE" dirty="0" err="1" smtClean="0"/>
+              <a:rPr lang="de-DE" dirty="0" err="1"/>
               <a:t>Wildfly</a:t>
             </a:r>
             <a:r>
-              <a:rPr lang="de-DE" dirty="0" smtClean="0"/>
-              <a:t> (kaum) </a:t>
-            </a:r>
-            <a:r>
-              <a:rPr lang="de-DE" smtClean="0"/>
-              <a:t>zu konfigurieren</a:t>
+              <a:rPr lang="de-DE" dirty="0"/>
+              <a:t> (kaum) zu konfigurieren</a:t>
+            </a:r>
+          </a:p>
+          <a:p>
+            <a:pPr>
+              <a:buFontTx/>
+              <a:buChar char="-"/>
+            </a:pPr>
+            <a:r>
+              <a:rPr lang="de-DE" dirty="0"/>
+              <a:t>Live-Analyse und Diagramme während Benchmarking </a:t>
+            </a:r>
+            <a:r>
+              <a:rPr lang="de-DE"/>
+              <a:t>+ CSV-Generierung</a:t>
             </a:r>
             <a:endParaRPr lang="de-DE" dirty="0"/>
           </a:p>
@@ -4077,13 +3925,6 @@
   <p:clrMapOvr>
     <a:masterClrMapping/>
   </p:clrMapOvr>
-  <p:timing>
-    <p:tnLst>
-      <p:par>
-        <p:cTn id="1" dur="indefinite" restart="never" nodeType="tmRoot"/>
-      </p:par>
-    </p:tnLst>
-  </p:timing>
 </p:sld>
 </file>
 
@@ -4120,10 +3961,9 @@
           <a:lstStyle/>
           <a:p>
             <a:r>
-              <a:rPr lang="de-DE" dirty="0" smtClean="0"/>
+              <a:rPr lang="de-DE" dirty="0"/>
               <a:t>Vergleich alte/neue Implementierung - Architektur</a:t>
             </a:r>
-            <a:endParaRPr lang="de-DE" dirty="0"/>
           </a:p>
         </p:txBody>
       </p:sp>
@@ -4165,13 +4005,6 @@
   <p:clrMapOvr>
     <a:masterClrMapping/>
   </p:clrMapOvr>
-  <p:timing>
-    <p:tnLst>
-      <p:par>
-        <p:cTn id="1" dur="indefinite" restart="never" nodeType="tmRoot"/>
-      </p:par>
-    </p:tnLst>
-  </p:timing>
 </p:sld>
 </file>
 
@@ -4208,10 +4041,9 @@
           <a:lstStyle/>
           <a:p>
             <a:r>
-              <a:rPr lang="de-DE" dirty="0" smtClean="0"/>
+              <a:rPr lang="de-DE" dirty="0"/>
               <a:t>Vergleich alte/neue Implementierung - Architektur</a:t>
             </a:r>
-            <a:endParaRPr lang="de-DE" dirty="0"/>
           </a:p>
         </p:txBody>
       </p:sp>
@@ -4254,13 +4086,6 @@
   <p:clrMapOvr>
     <a:masterClrMapping/>
   </p:clrMapOvr>
-  <p:timing>
-    <p:tnLst>
-      <p:par>
-        <p:cTn id="1" dur="indefinite" restart="never" nodeType="tmRoot"/>
-      </p:par>
-    </p:tnLst>
-  </p:timing>
 </p:sld>
 </file>
 
@@ -4297,11 +4122,11 @@
           <a:lstStyle/>
           <a:p>
             <a:r>
-              <a:rPr lang="de-DE" dirty="0" smtClean="0"/>
+              <a:rPr lang="de-DE" dirty="0"/>
               <a:t>Vergleich alte/neue Implementierung - </a:t>
             </a:r>
             <a:r>
-              <a:rPr lang="de-DE" dirty="0" err="1" smtClean="0"/>
+              <a:rPr lang="de-DE" dirty="0" err="1"/>
               <a:t>Refactoring</a:t>
             </a:r>
             <a:endParaRPr lang="de-DE" dirty="0"/>
@@ -4406,13 +4231,6 @@
   <p:clrMapOvr>
     <a:masterClrMapping/>
   </p:clrMapOvr>
-  <p:timing>
-    <p:tnLst>
-      <p:par>
-        <p:cTn id="1" dur="indefinite" restart="never" nodeType="tmRoot"/>
-      </p:par>
-    </p:tnLst>
-  </p:timing>
 </p:sld>
 </file>
 

</xml_diff>

<commit_message>
Ergänzung XA und Wildflyupdate
</commit_message>
<xml_diff>
--- a/dokumentation/vortrag.pptx
+++ b/dokumentation/vortrag.pptx
@@ -5,7 +5,7 @@
     <p:sldMasterId id="2147483648" r:id="rId1"/>
   </p:sldMasterIdLst>
   <p:notesMasterIdLst>
-    <p:notesMasterId r:id="rId21"/>
+    <p:notesMasterId r:id="rId22"/>
   </p:notesMasterIdLst>
   <p:sldIdLst>
     <p:sldId id="259" r:id="rId2"/>
@@ -17,16 +17,17 @@
     <p:sldId id="276" r:id="rId8"/>
     <p:sldId id="274" r:id="rId9"/>
     <p:sldId id="267" r:id="rId10"/>
-    <p:sldId id="269" r:id="rId11"/>
-    <p:sldId id="265" r:id="rId12"/>
-    <p:sldId id="266" r:id="rId13"/>
-    <p:sldId id="270" r:id="rId14"/>
-    <p:sldId id="271" r:id="rId15"/>
-    <p:sldId id="272" r:id="rId16"/>
-    <p:sldId id="273" r:id="rId17"/>
-    <p:sldId id="275" r:id="rId18"/>
-    <p:sldId id="264" r:id="rId19"/>
-    <p:sldId id="277" r:id="rId20"/>
+    <p:sldId id="278" r:id="rId11"/>
+    <p:sldId id="269" r:id="rId12"/>
+    <p:sldId id="265" r:id="rId13"/>
+    <p:sldId id="266" r:id="rId14"/>
+    <p:sldId id="270" r:id="rId15"/>
+    <p:sldId id="271" r:id="rId16"/>
+    <p:sldId id="272" r:id="rId17"/>
+    <p:sldId id="273" r:id="rId18"/>
+    <p:sldId id="275" r:id="rId19"/>
+    <p:sldId id="264" r:id="rId20"/>
+    <p:sldId id="277" r:id="rId21"/>
   </p:sldIdLst>
   <p:sldSz cx="12192000" cy="6858000"/>
   <p:notesSz cx="6858000" cy="9144000"/>
@@ -198,7 +199,7 @@
               <a:cs typeface="+mn-cs"/>
             </a:defRPr>
           </a:pPr>
-          <a:endParaRPr lang="de-DE"/>
+          <a:endParaRPr lang="en-US"/>
         </a:p>
       </c:txPr>
     </c:title>
@@ -589,7 +590,7 @@
                 <a:cs typeface="+mn-cs"/>
               </a:defRPr>
             </a:pPr>
-            <a:endParaRPr lang="de-DE"/>
+            <a:endParaRPr lang="en-US"/>
           </a:p>
         </c:txPr>
         <c:crossAx val="559834752"/>
@@ -651,7 +652,7 @@
                 <a:cs typeface="+mn-cs"/>
               </a:defRPr>
             </a:pPr>
-            <a:endParaRPr lang="de-DE"/>
+            <a:endParaRPr lang="en-US"/>
           </a:p>
         </c:txPr>
         <c:crossAx val="559829832"/>
@@ -693,7 +694,7 @@
               <a:cs typeface="+mn-cs"/>
             </a:defRPr>
           </a:pPr>
-          <a:endParaRPr lang="de-DE"/>
+          <a:endParaRPr lang="en-US"/>
         </a:p>
       </c:txPr>
     </c:legend>
@@ -715,7 +716,7 @@
       <a:pPr>
         <a:defRPr sz="1200"/>
       </a:pPr>
-      <a:endParaRPr lang="de-DE"/>
+      <a:endParaRPr lang="en-US"/>
     </a:p>
   </c:txPr>
   <c:externalData r:id="rId3">
@@ -2184,15 +2185,7 @@
         <a:p>
           <a:r>
             <a:rPr lang="de-DE" dirty="0"/>
-            <a:t>Architektur und </a:t>
-          </a:r>
-          <a:r>
-            <a:rPr lang="de-DE" dirty="0"/>
-            <a:t>Fehlersemantik</a:t>
-          </a:r>
-          <a:r>
-            <a:rPr lang="de-DE" dirty="0"/>
-            <a:t>				Max</a:t>
+            <a:t>Architektur und Fehlersemantik				Max</a:t>
           </a:r>
         </a:p>
       </dgm:t>
@@ -2567,24 +2560,24 @@
   </dgm:ptLst>
   <dgm:cxnLst>
     <dgm:cxn modelId="{F5B2425C-9AF9-4886-9B60-D18915CF2897}" srcId="{39FB0F7C-9231-4827-8D8F-FEAA70962B7E}" destId="{6F1AC1F1-5D78-4EB3-85C8-95F6F8083D40}" srcOrd="2" destOrd="0" parTransId="{130A6D74-43B7-4B9E-ADA6-BCCA23BB6320}" sibTransId="{80091640-80B8-4766-BD39-A6B57F0975DA}"/>
+    <dgm:cxn modelId="{80E6F450-F8A4-4C5A-8B31-93AAD22A0066}" type="presOf" srcId="{6F1AC1F1-5D78-4EB3-85C8-95F6F8083D40}" destId="{D91A4525-6767-4B13-BF73-6C4E9887F393}" srcOrd="0" destOrd="0" presId="urn:microsoft.com/office/officeart/2005/8/layout/vList2"/>
+    <dgm:cxn modelId="{C700C563-C2DC-4E9C-B7DC-B577FD76B9B6}" type="presOf" srcId="{C54D4C6E-21B9-44FF-9B41-6ABC6A789B2F}" destId="{2798FA84-A07A-4569-A999-79745A9B7125}" srcOrd="0" destOrd="0" presId="urn:microsoft.com/office/officeart/2005/8/layout/vList2"/>
+    <dgm:cxn modelId="{4D4016C3-EE33-4832-81E3-358AAF3EA3DC}" type="presOf" srcId="{9271CFF7-7D5F-4B01-9C14-8CC91E0EBA0D}" destId="{EAD11714-44C8-419F-8839-32310F3E5E8B}" srcOrd="0" destOrd="0" presId="urn:microsoft.com/office/officeart/2005/8/layout/vList2"/>
     <dgm:cxn modelId="{9E5F8A88-3457-4420-8A19-CB877B65CA4F}" type="presOf" srcId="{4A1D2608-8899-4C41-BB7C-5DB62B093195}" destId="{77EA372F-A118-4568-B539-D9E54E40EFB5}" srcOrd="0" destOrd="0" presId="urn:microsoft.com/office/officeart/2005/8/layout/vList2"/>
-    <dgm:cxn modelId="{6FEE2964-FB95-4A87-A79A-8BA25EB24B34}" srcId="{39FB0F7C-9231-4827-8D8F-FEAA70962B7E}" destId="{5477826B-99CE-4924-9B31-E45A2795FC57}" srcOrd="0" destOrd="0" parTransId="{21CDCDF6-A966-4456-8823-C8733E9BCD88}" sibTransId="{B301980D-FBBC-4176-96C2-45488DBAC7C6}"/>
-    <dgm:cxn modelId="{80E6F450-F8A4-4C5A-8B31-93AAD22A0066}" type="presOf" srcId="{6F1AC1F1-5D78-4EB3-85C8-95F6F8083D40}" destId="{D91A4525-6767-4B13-BF73-6C4E9887F393}" srcOrd="0" destOrd="0" presId="urn:microsoft.com/office/officeart/2005/8/layout/vList2"/>
     <dgm:cxn modelId="{E9861FCA-B48C-4A9E-B4FA-79A5A8CB2CAD}" srcId="{39FB0F7C-9231-4827-8D8F-FEAA70962B7E}" destId="{11B2B49C-2FAF-4A34-8720-205E27E0760B}" srcOrd="1" destOrd="0" parTransId="{9C399C7E-1B79-4F7C-BED5-275984E25CC8}" sibTransId="{30A4B23C-F7F4-455B-A884-79820CA02736}"/>
+    <dgm:cxn modelId="{9C237F58-5AAE-4B8C-8D32-3688467EB2D9}" srcId="{39FB0F7C-9231-4827-8D8F-FEAA70962B7E}" destId="{D36FFB33-8267-4EA4-91CB-2912BEE90F2D}" srcOrd="7" destOrd="0" parTransId="{4ED0BE5D-19C2-4A7D-8695-E3AB67CCB7BB}" sibTransId="{BF816CCE-15A1-4026-ACEB-7A1742D858AE}"/>
+    <dgm:cxn modelId="{EDAF8C4E-C5DC-48CE-B9EE-2ED8FD1B5424}" type="presOf" srcId="{39FB0F7C-9231-4827-8D8F-FEAA70962B7E}" destId="{64A445BC-CA01-4059-A862-C0A969FB9577}" srcOrd="0" destOrd="0" presId="urn:microsoft.com/office/officeart/2005/8/layout/vList2"/>
+    <dgm:cxn modelId="{6B239DEB-8C62-4483-BFD5-14579BFC4ED3}" srcId="{39FB0F7C-9231-4827-8D8F-FEAA70962B7E}" destId="{9271CFF7-7D5F-4B01-9C14-8CC91E0EBA0D}" srcOrd="6" destOrd="0" parTransId="{392DD484-BB00-4961-A51E-036822DE27BE}" sibTransId="{4D3FD8AC-449C-415D-A168-88DCBB7E3A77}"/>
+    <dgm:cxn modelId="{C24F7E8A-D085-423F-9104-538E2A441825}" srcId="{39FB0F7C-9231-4827-8D8F-FEAA70962B7E}" destId="{E81B0125-CAE4-4A83-9496-0B90722794F4}" srcOrd="5" destOrd="0" parTransId="{57892CA3-0950-4E6F-A63C-A726A0A225CC}" sibTransId="{918BF14B-1CDF-48BC-A364-90A9E9B7B94B}"/>
+    <dgm:cxn modelId="{8B58AD67-C011-4870-9348-60C7E8215D4A}" type="presOf" srcId="{E81B0125-CAE4-4A83-9496-0B90722794F4}" destId="{84C53E71-5497-4D4A-B088-901D9B3D83F3}" srcOrd="0" destOrd="0" presId="urn:microsoft.com/office/officeart/2005/8/layout/vList2"/>
+    <dgm:cxn modelId="{90652EB5-3AF6-4392-9A40-6C929B7FF22C}" type="presOf" srcId="{11B2B49C-2FAF-4A34-8720-205E27E0760B}" destId="{BBBF1434-C645-4988-B60D-EE879A008767}" srcOrd="0" destOrd="0" presId="urn:microsoft.com/office/officeart/2005/8/layout/vList2"/>
+    <dgm:cxn modelId="{A5FD842A-8719-4E12-BCCF-A1935F28335B}" type="presOf" srcId="{C9E9D9F9-14A6-4D09-9577-871B92AF4625}" destId="{D16A2D44-A0DA-4F0C-BC0C-C478ABC8DD93}" srcOrd="0" destOrd="0" presId="urn:microsoft.com/office/officeart/2005/8/layout/vList2"/>
     <dgm:cxn modelId="{18F54294-BA38-46B1-8C37-BD5F7AD5211F}" type="presOf" srcId="{5477826B-99CE-4924-9B31-E45A2795FC57}" destId="{A7197620-E677-40EF-B103-97AAFECDCAA5}" srcOrd="0" destOrd="0" presId="urn:microsoft.com/office/officeart/2005/8/layout/vList2"/>
-    <dgm:cxn modelId="{1314A434-294B-4DC1-921C-070EA5F4867F}" srcId="{39FB0F7C-9231-4827-8D8F-FEAA70962B7E}" destId="{C54D4C6E-21B9-44FF-9B41-6ABC6A789B2F}" srcOrd="4" destOrd="0" parTransId="{49658E9A-17E5-40F7-8B08-DCD29EC9A395}" sibTransId="{26B78493-FEE1-43E5-89B4-65368D9CA08C}"/>
-    <dgm:cxn modelId="{A5FD842A-8719-4E12-BCCF-A1935F28335B}" type="presOf" srcId="{C9E9D9F9-14A6-4D09-9577-871B92AF4625}" destId="{D16A2D44-A0DA-4F0C-BC0C-C478ABC8DD93}" srcOrd="0" destOrd="0" presId="urn:microsoft.com/office/officeart/2005/8/layout/vList2"/>
-    <dgm:cxn modelId="{EA7A1558-CDFC-42B7-B404-C36784C92DAD}" type="presOf" srcId="{D36FFB33-8267-4EA4-91CB-2912BEE90F2D}" destId="{F54A9153-ACFF-416A-92A1-701A7EF425F1}" srcOrd="0" destOrd="0" presId="urn:microsoft.com/office/officeart/2005/8/layout/vList2"/>
     <dgm:cxn modelId="{164D4DE2-87BD-4000-B748-C827EBBA4F51}" srcId="{39FB0F7C-9231-4827-8D8F-FEAA70962B7E}" destId="{C9E9D9F9-14A6-4D09-9577-871B92AF4625}" srcOrd="8" destOrd="0" parTransId="{317369DD-15E0-4138-AF46-5644D3ECA9D8}" sibTransId="{92F34BE8-0A0F-47EE-8382-3FD6BB88F8ED}"/>
     <dgm:cxn modelId="{F609F459-A020-47ED-9A2D-C800A2CA2A50}" srcId="{39FB0F7C-9231-4827-8D8F-FEAA70962B7E}" destId="{4A1D2608-8899-4C41-BB7C-5DB62B093195}" srcOrd="3" destOrd="0" parTransId="{C7D0CBD2-8982-4258-8E86-4F3FCD81B0AD}" sibTransId="{649037A6-6529-4805-B159-C20DB1C45A70}"/>
-    <dgm:cxn modelId="{EDAF8C4E-C5DC-48CE-B9EE-2ED8FD1B5424}" type="presOf" srcId="{39FB0F7C-9231-4827-8D8F-FEAA70962B7E}" destId="{64A445BC-CA01-4059-A862-C0A969FB9577}" srcOrd="0" destOrd="0" presId="urn:microsoft.com/office/officeart/2005/8/layout/vList2"/>
-    <dgm:cxn modelId="{C700C563-C2DC-4E9C-B7DC-B577FD76B9B6}" type="presOf" srcId="{C54D4C6E-21B9-44FF-9B41-6ABC6A789B2F}" destId="{2798FA84-A07A-4569-A999-79745A9B7125}" srcOrd="0" destOrd="0" presId="urn:microsoft.com/office/officeart/2005/8/layout/vList2"/>
-    <dgm:cxn modelId="{90652EB5-3AF6-4392-9A40-6C929B7FF22C}" type="presOf" srcId="{11B2B49C-2FAF-4A34-8720-205E27E0760B}" destId="{BBBF1434-C645-4988-B60D-EE879A008767}" srcOrd="0" destOrd="0" presId="urn:microsoft.com/office/officeart/2005/8/layout/vList2"/>
-    <dgm:cxn modelId="{8B58AD67-C011-4870-9348-60C7E8215D4A}" type="presOf" srcId="{E81B0125-CAE4-4A83-9496-0B90722794F4}" destId="{84C53E71-5497-4D4A-B088-901D9B3D83F3}" srcOrd="0" destOrd="0" presId="urn:microsoft.com/office/officeart/2005/8/layout/vList2"/>
-    <dgm:cxn modelId="{4D4016C3-EE33-4832-81E3-358AAF3EA3DC}" type="presOf" srcId="{9271CFF7-7D5F-4B01-9C14-8CC91E0EBA0D}" destId="{EAD11714-44C8-419F-8839-32310F3E5E8B}" srcOrd="0" destOrd="0" presId="urn:microsoft.com/office/officeart/2005/8/layout/vList2"/>
-    <dgm:cxn modelId="{C24F7E8A-D085-423F-9104-538E2A441825}" srcId="{39FB0F7C-9231-4827-8D8F-FEAA70962B7E}" destId="{E81B0125-CAE4-4A83-9496-0B90722794F4}" srcOrd="5" destOrd="0" parTransId="{57892CA3-0950-4E6F-A63C-A726A0A225CC}" sibTransId="{918BF14B-1CDF-48BC-A364-90A9E9B7B94B}"/>
-    <dgm:cxn modelId="{6B239DEB-8C62-4483-BFD5-14579BFC4ED3}" srcId="{39FB0F7C-9231-4827-8D8F-FEAA70962B7E}" destId="{9271CFF7-7D5F-4B01-9C14-8CC91E0EBA0D}" srcOrd="6" destOrd="0" parTransId="{392DD484-BB00-4961-A51E-036822DE27BE}" sibTransId="{4D3FD8AC-449C-415D-A168-88DCBB7E3A77}"/>
-    <dgm:cxn modelId="{9C237F58-5AAE-4B8C-8D32-3688467EB2D9}" srcId="{39FB0F7C-9231-4827-8D8F-FEAA70962B7E}" destId="{D36FFB33-8267-4EA4-91CB-2912BEE90F2D}" srcOrd="7" destOrd="0" parTransId="{4ED0BE5D-19C2-4A7D-8695-E3AB67CCB7BB}" sibTransId="{BF816CCE-15A1-4026-ACEB-7A1742D858AE}"/>
+    <dgm:cxn modelId="{EA7A1558-CDFC-42B7-B404-C36784C92DAD}" type="presOf" srcId="{D36FFB33-8267-4EA4-91CB-2912BEE90F2D}" destId="{F54A9153-ACFF-416A-92A1-701A7EF425F1}" srcOrd="0" destOrd="0" presId="urn:microsoft.com/office/officeart/2005/8/layout/vList2"/>
+    <dgm:cxn modelId="{6FEE2964-FB95-4A87-A79A-8BA25EB24B34}" srcId="{39FB0F7C-9231-4827-8D8F-FEAA70962B7E}" destId="{5477826B-99CE-4924-9B31-E45A2795FC57}" srcOrd="0" destOrd="0" parTransId="{21CDCDF6-A966-4456-8823-C8733E9BCD88}" sibTransId="{B301980D-FBBC-4176-96C2-45488DBAC7C6}"/>
+    <dgm:cxn modelId="{1314A434-294B-4DC1-921C-070EA5F4867F}" srcId="{39FB0F7C-9231-4827-8D8F-FEAA70962B7E}" destId="{C54D4C6E-21B9-44FF-9B41-6ABC6A789B2F}" srcOrd="4" destOrd="0" parTransId="{49658E9A-17E5-40F7-8B08-DCD29EC9A395}" sibTransId="{26B78493-FEE1-43E5-89B4-65368D9CA08C}"/>
     <dgm:cxn modelId="{63E09AEF-A2D2-45CF-8DCE-F65B1F91799F}" type="presParOf" srcId="{64A445BC-CA01-4059-A862-C0A969FB9577}" destId="{A7197620-E677-40EF-B103-97AAFECDCAA5}" srcOrd="0" destOrd="0" presId="urn:microsoft.com/office/officeart/2005/8/layout/vList2"/>
     <dgm:cxn modelId="{B35959AE-0C4C-4757-9E21-BD822A076F5C}" type="presParOf" srcId="{64A445BC-CA01-4059-A862-C0A969FB9577}" destId="{C2FDBC02-1BC1-4B41-9BBA-DC79085DD631}" srcOrd="1" destOrd="0" presId="urn:microsoft.com/office/officeart/2005/8/layout/vList2"/>
     <dgm:cxn modelId="{9149B2FC-7EC1-4E41-BA95-9E44C8FD796E}" type="presParOf" srcId="{64A445BC-CA01-4059-A862-C0A969FB9577}" destId="{BBBF1434-C645-4988-B60D-EE879A008767}" srcOrd="2" destOrd="0" presId="urn:microsoft.com/office/officeart/2005/8/layout/vList2"/>
@@ -2851,15 +2844,7 @@
           </a:pPr>
           <a:r>
             <a:rPr lang="de-DE" sz="2000" kern="1200" dirty="0"/>
-            <a:t>Architektur und </a:t>
-          </a:r>
-          <a:r>
-            <a:rPr lang="de-DE" sz="2000" kern="1200" dirty="0"/>
-            <a:t>Fehlersemantik</a:t>
-          </a:r>
-          <a:r>
-            <a:rPr lang="de-DE" sz="2000" kern="1200" dirty="0"/>
-            <a:t>				Max</a:t>
+            <a:t>Architektur und Fehlersemantik				Max</a:t>
           </a:r>
         </a:p>
       </dsp:txBody>
@@ -4636,7 +4621,7 @@
           <a:p>
             <a:fld id="{C36AE11D-FE92-4C0B-8D85-F5BACF65B397}" type="datetimeFigureOut">
               <a:rPr lang="de-DE" smtClean="0"/>
-              <a:t>05.01.2017</a:t>
+              <a:t>06.01.2017</a:t>
             </a:fld>
             <a:endParaRPr lang="de-DE"/>
           </a:p>
@@ -8001,7 +7986,7 @@
           <a:p>
             <a:fld id="{620CDD3C-54BF-419E-B218-513BAD7E9405}" type="datetimeFigureOut">
               <a:rPr lang="de-DE" smtClean="0"/>
-              <a:t>05.01.2017</a:t>
+              <a:t>06.01.2017</a:t>
             </a:fld>
             <a:endParaRPr lang="de-DE"/>
           </a:p>
@@ -8525,8 +8510,9 @@
           <a:p>
             <a:r>
               <a:rPr lang="de-DE" dirty="0"/>
-              <a:t>Umstieg auf Wildfly 10</a:t>
-            </a:r>
+              <a:t>Verteilte XA-Transaktion</a:t>
+            </a:r>
+            <a:endParaRPr lang="en-US" dirty="0"/>
           </a:p>
         </p:txBody>
       </p:sp>
@@ -8547,15 +8533,94 @@
           <a:p>
             <a:r>
               <a:rPr lang="de-DE" dirty="0"/>
-              <a:t>Liste aus Studienarbeit?</a:t>
-            </a:r>
+              <a:t>Container </a:t>
+            </a:r>
+            <a:r>
+              <a:rPr lang="de-DE" dirty="0" err="1"/>
+              <a:t>Managed</a:t>
+            </a:r>
+            <a:r>
+              <a:rPr lang="de-DE" dirty="0"/>
+              <a:t> Transaction</a:t>
+            </a:r>
+          </a:p>
+          <a:p>
+            <a:r>
+              <a:rPr lang="de-DE" dirty="0"/>
+              <a:t>Koordination der Transaktionen zur </a:t>
+            </a:r>
+            <a:r>
+              <a:rPr lang="de-DE" dirty="0" err="1"/>
+              <a:t>Persistierung</a:t>
+            </a:r>
+            <a:r>
+              <a:rPr lang="de-DE" dirty="0"/>
+              <a:t> in </a:t>
+            </a:r>
+            <a:r>
+              <a:rPr lang="de-DE" dirty="0" err="1"/>
+              <a:t>TraceDB</a:t>
+            </a:r>
+            <a:r>
+              <a:rPr lang="de-DE" dirty="0"/>
+              <a:t> und </a:t>
+            </a:r>
+            <a:r>
+              <a:rPr lang="de-DE" dirty="0" err="1"/>
+              <a:t>CountDB</a:t>
+            </a:r>
+            <a:r>
+              <a:rPr lang="de-DE" dirty="0"/>
+              <a:t> durch EJB Container</a:t>
+            </a:r>
+          </a:p>
+          <a:p>
+            <a:r>
+              <a:rPr lang="de-DE" dirty="0" err="1"/>
+              <a:t>Exceptions</a:t>
+            </a:r>
+            <a:r>
+              <a:rPr lang="de-DE" dirty="0"/>
+              <a:t> werden zur Message-</a:t>
+            </a:r>
+            <a:r>
+              <a:rPr lang="de-DE" dirty="0" err="1"/>
+              <a:t>Driven</a:t>
+            </a:r>
+            <a:r>
+              <a:rPr lang="de-DE" dirty="0"/>
+              <a:t>-Bean gereicht, von dort wird die Transaktion für ein Rollback markiert</a:t>
+            </a:r>
+          </a:p>
+          <a:p>
+            <a:r>
+              <a:rPr lang="de-DE" dirty="0"/>
+              <a:t>Definition der Datenbanken als XA-</a:t>
+            </a:r>
+            <a:r>
+              <a:rPr lang="de-DE" dirty="0" err="1"/>
+              <a:t>Datasources</a:t>
+            </a:r>
+            <a:r>
+              <a:rPr lang="de-DE" dirty="0"/>
+              <a:t> am </a:t>
+            </a:r>
+            <a:r>
+              <a:rPr lang="de-DE" dirty="0" err="1"/>
+              <a:t>Wildfly</a:t>
+            </a:r>
+            <a:r>
+              <a:rPr lang="de-DE" dirty="0"/>
+              <a:t> (dynamisch per mysql-ds.xml)</a:t>
+            </a:r>
+            <a:endParaRPr lang="en-US" dirty="0"/>
           </a:p>
         </p:txBody>
       </p:sp>
     </p:spTree>
     <p:extLst>
       <p:ext uri="{BB962C8B-B14F-4D97-AF65-F5344CB8AC3E}">
-        <p14:creationId xmlns:p14="http://schemas.microsoft.com/office/powerpoint/2010/main" val="3724125338"/>
+        <p14:creationId xmlns:p14="http://schemas.microsoft.com/office/powerpoint/2010/main" val="2050278402"/>
       </p:ext>
     </p:extLst>
   </p:cSld>
@@ -8599,7 +8664,7 @@
           <a:p>
             <a:r>
               <a:rPr lang="de-DE" dirty="0"/>
-              <a:t>Benchmarking - Testspezifikation</a:t>
+              <a:t>Umstieg auf Wildfly 10</a:t>
             </a:r>
           </a:p>
         </p:txBody>
@@ -8616,32 +8681,178 @@
         </p:nvSpPr>
         <p:spPr/>
         <p:txBody>
+          <a:bodyPr>
+            <a:normAutofit/>
+          </a:bodyPr>
+          <a:lstStyle/>
+          <a:p>
+            <a:r>
+              <a:rPr lang="de-DE" dirty="0"/>
+              <a:t>Performancesteigerung durch den Support des aktuelleren Protokolls HTTP/2.5 </a:t>
+            </a:r>
+          </a:p>
+          <a:p>
+            <a:r>
+              <a:rPr lang="de-DE" dirty="0"/>
+              <a:t>Ablösung von </a:t>
+            </a:r>
+            <a:r>
+              <a:rPr lang="de-DE" dirty="0" err="1"/>
+              <a:t>HornetQ</a:t>
+            </a:r>
+            <a:r>
+              <a:rPr lang="de-DE" dirty="0"/>
+              <a:t> durch </a:t>
+            </a:r>
+            <a:r>
+              <a:rPr lang="de-DE" dirty="0" err="1"/>
+              <a:t>ActiveMQ</a:t>
+            </a:r>
+            <a:endParaRPr lang="de-DE" dirty="0"/>
+          </a:p>
+          <a:p>
+            <a:r>
+              <a:rPr lang="de-DE" dirty="0"/>
+              <a:t>Auslauf Sicherheits-Updates für </a:t>
+            </a:r>
+            <a:r>
+              <a:rPr lang="de-DE" dirty="0" err="1"/>
+              <a:t>Wildfly</a:t>
+            </a:r>
+            <a:r>
+              <a:rPr lang="de-DE" dirty="0"/>
+              <a:t> 8</a:t>
+            </a:r>
+          </a:p>
+          <a:p>
+            <a:r>
+              <a:rPr lang="de-DE" dirty="0" err="1"/>
+              <a:t>Wildfly</a:t>
+            </a:r>
+            <a:r>
+              <a:rPr lang="de-DE" dirty="0"/>
+              <a:t> 10 unterstützt Java 9</a:t>
+            </a:r>
+          </a:p>
+          <a:p>
+            <a:r>
+              <a:rPr lang="de-DE" dirty="0"/>
+              <a:t>ORM-Framework </a:t>
+            </a:r>
+            <a:r>
+              <a:rPr lang="de-DE" dirty="0" err="1"/>
+              <a:t>Hibernate</a:t>
+            </a:r>
+            <a:r>
+              <a:rPr lang="de-DE" dirty="0"/>
+              <a:t> in Version 5 wird unterstützt</a:t>
+            </a:r>
+          </a:p>
+          <a:p>
+            <a:r>
+              <a:rPr lang="de-DE" dirty="0"/>
+              <a:t>Einfacheres </a:t>
+            </a:r>
+            <a:r>
+              <a:rPr lang="de-DE" dirty="0" err="1"/>
+              <a:t>Mangement</a:t>
+            </a:r>
+            <a:r>
+              <a:rPr lang="de-DE" dirty="0"/>
+              <a:t> der </a:t>
+            </a:r>
+            <a:r>
+              <a:rPr lang="de-DE" dirty="0" err="1"/>
+              <a:t>Wildfly</a:t>
+            </a:r>
+            <a:r>
+              <a:rPr lang="de-DE" dirty="0"/>
+              <a:t>-Konfiguration, bspw. durch die Bereitstellung vordefinierter Datenbankkonfigurationen</a:t>
+            </a:r>
+          </a:p>
+          <a:p>
+            <a:endParaRPr lang="de-DE" dirty="0"/>
+          </a:p>
+        </p:txBody>
+      </p:sp>
+    </p:spTree>
+    <p:extLst>
+      <p:ext uri="{BB962C8B-B14F-4D97-AF65-F5344CB8AC3E}">
+        <p14:creationId xmlns:p14="http://schemas.microsoft.com/office/powerpoint/2010/main" val="3724125338"/>
+      </p:ext>
+    </p:extLst>
+  </p:cSld>
+  <p:clrMapOvr>
+    <a:masterClrMapping/>
+  </p:clrMapOvr>
+</p:sld>
+</file>
+
+<file path=ppt/slides/slide12.xml><?xml version="1.0" encoding="utf-8"?>
+<p:sld xmlns:a="http://schemas.openxmlformats.org/drawingml/2006/main" xmlns:r="http://schemas.openxmlformats.org/officeDocument/2006/relationships" xmlns:p="http://schemas.openxmlformats.org/presentationml/2006/main">
+  <p:cSld>
+    <p:spTree>
+      <p:nvGrpSpPr>
+        <p:cNvPr id="1" name=""/>
+        <p:cNvGrpSpPr/>
+        <p:nvPr/>
+      </p:nvGrpSpPr>
+      <p:grpSpPr>
+        <a:xfrm>
+          <a:off x="0" y="0"/>
+          <a:ext cx="0" cy="0"/>
+          <a:chOff x="0" y="0"/>
+          <a:chExt cx="0" cy="0"/>
+        </a:xfrm>
+      </p:grpSpPr>
+      <p:sp>
+        <p:nvSpPr>
+          <p:cNvPr id="2" name="Titel 1"/>
+          <p:cNvSpPr>
+            <a:spLocks noGrp="1"/>
+          </p:cNvSpPr>
+          <p:nvPr>
+            <p:ph type="title"/>
+          </p:nvPr>
+        </p:nvSpPr>
+        <p:spPr/>
+        <p:txBody>
           <a:bodyPr/>
           <a:lstStyle/>
           <a:p>
             <a:r>
               <a:rPr lang="de-DE" dirty="0"/>
-              <a:t>2x &lt;</a:t>
-            </a:r>
-            <a:r>
-              <a:rPr lang="de-DE" dirty="0" err="1"/>
-              <a:t>img</a:t>
-            </a:r>
-            <a:r>
-              <a:rPr lang="de-DE" dirty="0"/>
-              <a:t>&gt; Gegenüberstellung alter/neuer Testablauf durch den </a:t>
-            </a:r>
-            <a:r>
-              <a:rPr lang="de-DE" dirty="0" err="1"/>
-              <a:t>Benchmarkclient</a:t>
-            </a:r>
-            <a:endParaRPr lang="de-DE" dirty="0"/>
-          </a:p>
-          <a:p>
-            <a:endParaRPr lang="de-DE" dirty="0"/>
-          </a:p>
-        </p:txBody>
-      </p:sp>
+              <a:t>Benchmarking - Testspezifikation</a:t>
+            </a:r>
+          </a:p>
+        </p:txBody>
+      </p:sp>
+      <p:pic>
+        <p:nvPicPr>
+          <p:cNvPr id="6" name="Inhaltsplatzhalter 5"/>
+          <p:cNvPicPr>
+            <a:picLocks noGrp="1" noChangeAspect="1"/>
+          </p:cNvPicPr>
+          <p:nvPr>
+            <p:ph idx="1"/>
+          </p:nvPr>
+        </p:nvPicPr>
+        <p:blipFill>
+          <a:blip r:embed="rId2"/>
+          <a:stretch>
+            <a:fillRect/>
+          </a:stretch>
+        </p:blipFill>
+        <p:spPr>
+          <a:xfrm>
+            <a:off x="1653187" y="2273300"/>
+            <a:ext cx="8852474" cy="3302333"/>
+          </a:xfrm>
+          <a:prstGeom prst="rect">
+            <a:avLst/>
+          </a:prstGeom>
+        </p:spPr>
+      </p:pic>
     </p:spTree>
     <p:extLst>
       <p:ext uri="{BB962C8B-B14F-4D97-AF65-F5344CB8AC3E}">
@@ -8655,7 +8866,7 @@
 </p:sld>
 </file>
 
-<file path=ppt/slides/slide12.xml><?xml version="1.0" encoding="utf-8"?>
+<file path=ppt/slides/slide13.xml><?xml version="1.0" encoding="utf-8"?>
 <p:sld xmlns:a="http://schemas.openxmlformats.org/drawingml/2006/main" xmlns:r="http://schemas.openxmlformats.org/officeDocument/2006/relationships" xmlns:p="http://schemas.openxmlformats.org/presentationml/2006/main">
   <p:cSld>
     <p:spTree>
@@ -9207,7 +9418,7 @@
 </p:sld>
 </file>
 
-<file path=ppt/slides/slide13.xml><?xml version="1.0" encoding="utf-8"?>
+<file path=ppt/slides/slide14.xml><?xml version="1.0" encoding="utf-8"?>
 <p:sld xmlns:a="http://schemas.openxmlformats.org/drawingml/2006/main" xmlns:r="http://schemas.openxmlformats.org/officeDocument/2006/relationships" xmlns:p="http://schemas.openxmlformats.org/presentationml/2006/main">
   <p:cSld>
     <p:spTree>
@@ -9314,7 +9525,7 @@
 </p:sld>
 </file>
 
-<file path=ppt/slides/slide14.xml><?xml version="1.0" encoding="utf-8"?>
+<file path=ppt/slides/slide15.xml><?xml version="1.0" encoding="utf-8"?>
 <p:sld xmlns:a="http://schemas.openxmlformats.org/drawingml/2006/main" xmlns:r="http://schemas.openxmlformats.org/officeDocument/2006/relationships" xmlns:p="http://schemas.openxmlformats.org/presentationml/2006/main">
   <p:cSld>
     <p:spTree>
@@ -9526,7 +9737,7 @@
 </p:sld>
 </file>
 
-<file path=ppt/slides/slide15.xml><?xml version="1.0" encoding="utf-8"?>
+<file path=ppt/slides/slide16.xml><?xml version="1.0" encoding="utf-8"?>
 <p:sld xmlns:a="http://schemas.openxmlformats.org/drawingml/2006/main" xmlns:r="http://schemas.openxmlformats.org/officeDocument/2006/relationships" xmlns:p="http://schemas.openxmlformats.org/presentationml/2006/main">
   <p:cSld>
     <p:spTree>
@@ -9602,7 +9813,7 @@
       </p:sp>
       <p:pic>
         <p:nvPicPr>
-          <p:cNvPr id="4" name="Grafik 3"/>
+          <p:cNvPr id="7" name="Grafik 6"/>
           <p:cNvPicPr>
             <a:picLocks noChangeAspect="1"/>
           </p:cNvPicPr>
@@ -9622,8 +9833,8 @@
         </p:blipFill>
         <p:spPr>
           <a:xfrm>
-            <a:off x="3700590" y="2005935"/>
-            <a:ext cx="8364117" cy="4763165"/>
+            <a:off x="305093" y="1301467"/>
+            <a:ext cx="6970350" cy="3374283"/>
           </a:xfrm>
           <a:prstGeom prst="rect">
             <a:avLst/>
@@ -9632,7 +9843,7 @@
       </p:pic>
       <p:pic>
         <p:nvPicPr>
-          <p:cNvPr id="7" name="Grafik 6"/>
+          <p:cNvPr id="4" name="Grafik 3"/>
           <p:cNvPicPr>
             <a:picLocks noChangeAspect="1"/>
           </p:cNvPicPr>
@@ -9652,8 +9863,8 @@
         </p:blipFill>
         <p:spPr>
           <a:xfrm>
-            <a:off x="305093" y="1301467"/>
-            <a:ext cx="8383170" cy="4058216"/>
+            <a:off x="3700591" y="2480588"/>
+            <a:ext cx="7530626" cy="4288512"/>
           </a:xfrm>
           <a:prstGeom prst="rect">
             <a:avLst/>
@@ -9673,7 +9884,7 @@
 </p:sld>
 </file>
 
-<file path=ppt/slides/slide16.xml><?xml version="1.0" encoding="utf-8"?>
+<file path=ppt/slides/slide17.xml><?xml version="1.0" encoding="utf-8"?>
 <p:sld xmlns:a="http://schemas.openxmlformats.org/drawingml/2006/main" xmlns:r="http://schemas.openxmlformats.org/officeDocument/2006/relationships" xmlns:p="http://schemas.openxmlformats.org/presentationml/2006/main">
   <p:cSld>
     <p:spTree>
@@ -9790,83 +10001,6 @@
 </p:sld>
 </file>
 
-<file path=ppt/slides/slide17.xml><?xml version="1.0" encoding="utf-8"?>
-<p:sld xmlns:a="http://schemas.openxmlformats.org/drawingml/2006/main" xmlns:r="http://schemas.openxmlformats.org/officeDocument/2006/relationships" xmlns:p="http://schemas.openxmlformats.org/presentationml/2006/main">
-  <p:cSld>
-    <p:spTree>
-      <p:nvGrpSpPr>
-        <p:cNvPr id="1" name=""/>
-        <p:cNvGrpSpPr/>
-        <p:nvPr/>
-      </p:nvGrpSpPr>
-      <p:grpSpPr>
-        <a:xfrm>
-          <a:off x="0" y="0"/>
-          <a:ext cx="0" cy="0"/>
-          <a:chOff x="0" y="0"/>
-          <a:chExt cx="0" cy="0"/>
-        </a:xfrm>
-      </p:grpSpPr>
-      <p:sp>
-        <p:nvSpPr>
-          <p:cNvPr id="2" name="Titel 1"/>
-          <p:cNvSpPr>
-            <a:spLocks noGrp="1"/>
-          </p:cNvSpPr>
-          <p:nvPr>
-            <p:ph type="title"/>
-          </p:nvPr>
-        </p:nvSpPr>
-        <p:spPr/>
-        <p:txBody>
-          <a:bodyPr/>
-          <a:lstStyle/>
-          <a:p>
-            <a:r>
-              <a:rPr lang="de-DE" dirty="0"/>
-              <a:t>Umsetzung des Admin-Client</a:t>
-            </a:r>
-          </a:p>
-        </p:txBody>
-      </p:sp>
-      <p:sp>
-        <p:nvSpPr>
-          <p:cNvPr id="3" name="Inhaltsplatzhalter 2"/>
-          <p:cNvSpPr>
-            <a:spLocks noGrp="1"/>
-          </p:cNvSpPr>
-          <p:nvPr>
-            <p:ph idx="1"/>
-          </p:nvPr>
-        </p:nvSpPr>
-        <p:spPr/>
-        <p:txBody>
-          <a:bodyPr>
-            <a:normAutofit/>
-          </a:bodyPr>
-          <a:lstStyle/>
-          <a:p>
-            <a:pPr>
-              <a:buFontTx/>
-              <a:buChar char="-"/>
-            </a:pPr>
-            <a:endParaRPr lang="de-DE" dirty="0"/>
-          </a:p>
-        </p:txBody>
-      </p:sp>
-    </p:spTree>
-    <p:extLst>
-      <p:ext uri="{BB962C8B-B14F-4D97-AF65-F5344CB8AC3E}">
-        <p14:creationId xmlns:p14="http://schemas.microsoft.com/office/powerpoint/2010/main" val="1332557833"/>
-      </p:ext>
-    </p:extLst>
-  </p:cSld>
-  <p:clrMapOvr>
-    <a:masterClrMapping/>
-  </p:clrMapOvr>
-</p:sld>
-</file>
-
 <file path=ppt/slides/slide18.xml><?xml version="1.0" encoding="utf-8"?>
 <p:sld xmlns:a="http://schemas.openxmlformats.org/drawingml/2006/main" xmlns:r="http://schemas.openxmlformats.org/officeDocument/2006/relationships" xmlns:p="http://schemas.openxmlformats.org/presentationml/2006/main">
   <p:cSld>
@@ -9900,12 +10034,8 @@
           <a:lstStyle/>
           <a:p>
             <a:r>
-              <a:rPr lang="de-DE" dirty="0" err="1"/>
-              <a:t>Benefits</a:t>
-            </a:r>
-            <a:r>
               <a:rPr lang="de-DE" dirty="0"/>
-              <a:t> – Moderne Businessanwendung</a:t>
+              <a:t>Umsetzung des Admin-Client</a:t>
             </a:r>
           </a:p>
         </p:txBody>
@@ -9923,7 +10053,7 @@
         <p:spPr/>
         <p:txBody>
           <a:bodyPr>
-            <a:normAutofit fontScale="92500"/>
+            <a:normAutofit/>
           </a:bodyPr>
           <a:lstStyle/>
           <a:p>
@@ -9931,116 +10061,6 @@
               <a:buFontTx/>
               <a:buChar char="-"/>
             </a:pPr>
-            <a:r>
-              <a:rPr lang="de-DE" dirty="0"/>
-              <a:t>6 austauschbare Projekte mit sehr wenig Abhängigkeiten</a:t>
-            </a:r>
-          </a:p>
-          <a:p>
-            <a:pPr>
-              <a:buFontTx/>
-              <a:buChar char="-"/>
-            </a:pPr>
-            <a:r>
-              <a:rPr lang="de-DE" dirty="0"/>
-              <a:t>Automatische Generierung nativer .exe-Anwendungen zur </a:t>
-            </a:r>
-            <a:r>
-              <a:rPr lang="de-DE" dirty="0" err="1"/>
-              <a:t>Buildzeit</a:t>
-            </a:r>
-            <a:endParaRPr lang="de-DE" dirty="0"/>
-          </a:p>
-          <a:p>
-            <a:pPr>
-              <a:buFontTx/>
-              <a:buChar char="-"/>
-            </a:pPr>
-            <a:r>
-              <a:rPr lang="de-DE" dirty="0"/>
-              <a:t>Setzt auf neusten </a:t>
-            </a:r>
-            <a:r>
-              <a:rPr lang="de-DE" dirty="0" err="1"/>
-              <a:t>Applikationserver</a:t>
-            </a:r>
-            <a:r>
-              <a:rPr lang="de-DE" dirty="0"/>
-              <a:t> (EAP7) und Bibliotheken</a:t>
-            </a:r>
-          </a:p>
-          <a:p>
-            <a:pPr>
-              <a:buFontTx/>
-              <a:buChar char="-"/>
-            </a:pPr>
-            <a:r>
-              <a:rPr lang="de-DE" dirty="0"/>
-              <a:t>Skalierbares, performance-optimiertes Backend</a:t>
-            </a:r>
-          </a:p>
-          <a:p>
-            <a:pPr>
-              <a:buFontTx/>
-              <a:buChar char="-"/>
-            </a:pPr>
-            <a:r>
-              <a:rPr lang="de-DE" dirty="0"/>
-              <a:t>Überarbeitete, benutzerfreundliche und moderne UIs</a:t>
-            </a:r>
-          </a:p>
-          <a:p>
-            <a:pPr>
-              <a:buFontTx/>
-              <a:buChar char="-"/>
-            </a:pPr>
-            <a:r>
-              <a:rPr lang="de-DE" dirty="0"/>
-              <a:t>Automatisierte Unit- und Integrationstests zur </a:t>
-            </a:r>
-            <a:r>
-              <a:rPr lang="de-DE" dirty="0" err="1"/>
-              <a:t>Buildzeit</a:t>
-            </a:r>
-            <a:endParaRPr lang="de-DE" dirty="0"/>
-          </a:p>
-          <a:p>
-            <a:pPr>
-              <a:buFontTx/>
-              <a:buChar char="-"/>
-            </a:pPr>
-            <a:r>
-              <a:rPr lang="de-DE" dirty="0"/>
-              <a:t>Voller JEE 7 Support</a:t>
-            </a:r>
-          </a:p>
-          <a:p>
-            <a:pPr>
-              <a:buFontTx/>
-              <a:buChar char="-"/>
-            </a:pPr>
-            <a:r>
-              <a:rPr lang="de-DE" dirty="0" err="1"/>
-              <a:t>Wildfly</a:t>
-            </a:r>
-            <a:r>
-              <a:rPr lang="de-DE" dirty="0"/>
-              <a:t> (kaum) zu konfigurieren</a:t>
-            </a:r>
-          </a:p>
-          <a:p>
-            <a:pPr>
-              <a:buFontTx/>
-              <a:buChar char="-"/>
-            </a:pPr>
-            <a:r>
-              <a:rPr lang="de-DE" dirty="0"/>
-              <a:t>Live-Analyse und Diagramme während Benchmarking </a:t>
-            </a:r>
-            <a:r>
-              <a:rPr lang="de-DE"/>
-              <a:t>+ CSV-Generierung</a:t>
-            </a:r>
             <a:endParaRPr lang="de-DE" dirty="0"/>
           </a:p>
         </p:txBody>
@@ -10048,7 +10068,7 @@
     </p:spTree>
     <p:extLst>
       <p:ext uri="{BB962C8B-B14F-4D97-AF65-F5344CB8AC3E}">
-        <p14:creationId xmlns:p14="http://schemas.microsoft.com/office/powerpoint/2010/main" val="2656192203"/>
+        <p14:creationId xmlns:p14="http://schemas.microsoft.com/office/powerpoint/2010/main" val="1332557833"/>
       </p:ext>
     </p:extLst>
   </p:cSld>
@@ -10091,8 +10111,12 @@
           <a:lstStyle/>
           <a:p>
             <a:r>
+              <a:rPr lang="de-DE" dirty="0" err="1"/>
+              <a:t>Benefits</a:t>
+            </a:r>
+            <a:r>
               <a:rPr lang="de-DE" dirty="0"/>
-              <a:t>Chatanwendung</a:t>
+              <a:t> – Moderne Businessanwendung</a:t>
             </a:r>
           </a:p>
         </p:txBody>
@@ -10110,42 +10134,132 @@
         <p:spPr/>
         <p:txBody>
           <a:bodyPr>
-            <a:normAutofit/>
+            <a:normAutofit fontScale="92500"/>
           </a:bodyPr>
           <a:lstStyle/>
           <a:p>
-            <a:pPr marL="0" indent="0" algn="ctr">
-              <a:buNone/>
+            <a:pPr>
+              <a:buFontTx/>
+              <a:buChar char="-"/>
             </a:pPr>
+            <a:r>
+              <a:rPr lang="de-DE" dirty="0"/>
+              <a:t>6 austauschbare Projekte mit sehr wenig Abhängigkeiten</a:t>
+            </a:r>
+          </a:p>
+          <a:p>
+            <a:pPr>
+              <a:buFontTx/>
+              <a:buChar char="-"/>
+            </a:pPr>
+            <a:r>
+              <a:rPr lang="de-DE" dirty="0"/>
+              <a:t>Automatische Generierung nativer .exe-Anwendungen zur </a:t>
+            </a:r>
+            <a:r>
+              <a:rPr lang="de-DE" dirty="0" err="1"/>
+              <a:t>Buildzeit</a:t>
+            </a:r>
             <a:endParaRPr lang="de-DE" dirty="0"/>
           </a:p>
           <a:p>
-            <a:pPr marL="0" indent="0" algn="ctr">
-              <a:buNone/>
+            <a:pPr>
+              <a:buFontTx/>
+              <a:buChar char="-"/>
             </a:pPr>
+            <a:r>
+              <a:rPr lang="de-DE" dirty="0"/>
+              <a:t>Setzt auf neusten </a:t>
+            </a:r>
+            <a:r>
+              <a:rPr lang="de-DE" dirty="0" err="1"/>
+              <a:t>Applikationserver</a:t>
+            </a:r>
+            <a:r>
+              <a:rPr lang="de-DE" dirty="0"/>
+              <a:t> (EAP7) und Bibliotheken</a:t>
+            </a:r>
+          </a:p>
+          <a:p>
+            <a:pPr>
+              <a:buFontTx/>
+              <a:buChar char="-"/>
+            </a:pPr>
+            <a:r>
+              <a:rPr lang="de-DE" dirty="0"/>
+              <a:t>Skalierbares, performance-optimiertes Backend</a:t>
+            </a:r>
+          </a:p>
+          <a:p>
+            <a:pPr>
+              <a:buFontTx/>
+              <a:buChar char="-"/>
+            </a:pPr>
+            <a:r>
+              <a:rPr lang="de-DE" dirty="0"/>
+              <a:t>Überarbeitete, benutzerfreundliche und moderne UIs</a:t>
+            </a:r>
+          </a:p>
+          <a:p>
+            <a:pPr>
+              <a:buFontTx/>
+              <a:buChar char="-"/>
+            </a:pPr>
+            <a:r>
+              <a:rPr lang="de-DE" dirty="0"/>
+              <a:t>Automatisierte Unit- und Integrationstests zur </a:t>
+            </a:r>
+            <a:r>
+              <a:rPr lang="de-DE" dirty="0" err="1"/>
+              <a:t>Buildzeit</a:t>
+            </a:r>
             <a:endParaRPr lang="de-DE" dirty="0"/>
           </a:p>
           <a:p>
-            <a:pPr marL="0" indent="0" algn="ctr">
-              <a:buNone/>
+            <a:pPr>
+              <a:buFontTx/>
+              <a:buChar char="-"/>
             </a:pPr>
-            <a:endParaRPr lang="de-DE" sz="1800" dirty="0"/>
-          </a:p>
-          <a:p>
-            <a:pPr marL="0" indent="0" algn="ctr">
-              <a:buNone/>
+            <a:r>
+              <a:rPr lang="de-DE" dirty="0"/>
+              <a:t>Voller JEE 7 Support</a:t>
+            </a:r>
+          </a:p>
+          <a:p>
+            <a:pPr>
+              <a:buFontTx/>
+              <a:buChar char="-"/>
             </a:pPr>
             <a:r>
-              <a:rPr lang="de-DE" sz="6000" dirty="0"/>
-              <a:t>Live Demo</a:t>
-            </a:r>
+              <a:rPr lang="de-DE" dirty="0" err="1"/>
+              <a:t>Wildfly</a:t>
+            </a:r>
+            <a:r>
+              <a:rPr lang="de-DE" dirty="0"/>
+              <a:t> (kaum) zu konfigurieren</a:t>
+            </a:r>
+          </a:p>
+          <a:p>
+            <a:pPr>
+              <a:buFontTx/>
+              <a:buChar char="-"/>
+            </a:pPr>
+            <a:r>
+              <a:rPr lang="de-DE" dirty="0"/>
+              <a:t>Live-Analyse und Diagramme während Benchmarking </a:t>
+            </a:r>
+            <a:r>
+              <a:rPr lang="de-DE"/>
+              <a:t>+ CSV-Generierung</a:t>
+            </a:r>
+            <a:endParaRPr lang="de-DE" dirty="0"/>
           </a:p>
         </p:txBody>
       </p:sp>
     </p:spTree>
     <p:extLst>
       <p:ext uri="{BB962C8B-B14F-4D97-AF65-F5344CB8AC3E}">
-        <p14:creationId xmlns:p14="http://schemas.microsoft.com/office/powerpoint/2010/main" val="3572337126"/>
+        <p14:creationId xmlns:p14="http://schemas.microsoft.com/office/powerpoint/2010/main" val="2656192203"/>
       </p:ext>
     </p:extLst>
   </p:cSld>
@@ -10223,6 +10337,103 @@
     <p:extLst>
       <p:ext uri="{BB962C8B-B14F-4D97-AF65-F5344CB8AC3E}">
         <p14:creationId xmlns:p14="http://schemas.microsoft.com/office/powerpoint/2010/main" val="954630480"/>
+      </p:ext>
+    </p:extLst>
+  </p:cSld>
+  <p:clrMapOvr>
+    <a:masterClrMapping/>
+  </p:clrMapOvr>
+</p:sld>
+</file>
+
+<file path=ppt/slides/slide20.xml><?xml version="1.0" encoding="utf-8"?>
+<p:sld xmlns:a="http://schemas.openxmlformats.org/drawingml/2006/main" xmlns:r="http://schemas.openxmlformats.org/officeDocument/2006/relationships" xmlns:p="http://schemas.openxmlformats.org/presentationml/2006/main">
+  <p:cSld>
+    <p:spTree>
+      <p:nvGrpSpPr>
+        <p:cNvPr id="1" name=""/>
+        <p:cNvGrpSpPr/>
+        <p:nvPr/>
+      </p:nvGrpSpPr>
+      <p:grpSpPr>
+        <a:xfrm>
+          <a:off x="0" y="0"/>
+          <a:ext cx="0" cy="0"/>
+          <a:chOff x="0" y="0"/>
+          <a:chExt cx="0" cy="0"/>
+        </a:xfrm>
+      </p:grpSpPr>
+      <p:sp>
+        <p:nvSpPr>
+          <p:cNvPr id="2" name="Titel 1"/>
+          <p:cNvSpPr>
+            <a:spLocks noGrp="1"/>
+          </p:cNvSpPr>
+          <p:nvPr>
+            <p:ph type="title"/>
+          </p:nvPr>
+        </p:nvSpPr>
+        <p:spPr/>
+        <p:txBody>
+          <a:bodyPr/>
+          <a:lstStyle/>
+          <a:p>
+            <a:r>
+              <a:rPr lang="de-DE" dirty="0"/>
+              <a:t>Chatanwendung</a:t>
+            </a:r>
+          </a:p>
+        </p:txBody>
+      </p:sp>
+      <p:sp>
+        <p:nvSpPr>
+          <p:cNvPr id="3" name="Inhaltsplatzhalter 2"/>
+          <p:cNvSpPr>
+            <a:spLocks noGrp="1"/>
+          </p:cNvSpPr>
+          <p:nvPr>
+            <p:ph idx="1"/>
+          </p:nvPr>
+        </p:nvSpPr>
+        <p:spPr/>
+        <p:txBody>
+          <a:bodyPr>
+            <a:normAutofit/>
+          </a:bodyPr>
+          <a:lstStyle/>
+          <a:p>
+            <a:pPr marL="0" indent="0" algn="ctr">
+              <a:buNone/>
+            </a:pPr>
+            <a:endParaRPr lang="de-DE" dirty="0"/>
+          </a:p>
+          <a:p>
+            <a:pPr marL="0" indent="0" algn="ctr">
+              <a:buNone/>
+            </a:pPr>
+            <a:endParaRPr lang="de-DE" dirty="0"/>
+          </a:p>
+          <a:p>
+            <a:pPr marL="0" indent="0" algn="ctr">
+              <a:buNone/>
+            </a:pPr>
+            <a:endParaRPr lang="de-DE" sz="1800" dirty="0"/>
+          </a:p>
+          <a:p>
+            <a:pPr marL="0" indent="0" algn="ctr">
+              <a:buNone/>
+            </a:pPr>
+            <a:r>
+              <a:rPr lang="de-DE" sz="6000" dirty="0"/>
+              <a:t>Live Demo</a:t>
+            </a:r>
+          </a:p>
+        </p:txBody>
+      </p:sp>
+    </p:spTree>
+    <p:extLst>
+      <p:ext uri="{BB962C8B-B14F-4D97-AF65-F5344CB8AC3E}">
+        <p14:creationId xmlns:p14="http://schemas.microsoft.com/office/powerpoint/2010/main" val="3572337126"/>
       </p:ext>
     </p:extLst>
   </p:cSld>
@@ -14296,7 +14507,6 @@
               <a:rPr lang="de-DE" dirty="0"/>
               <a:t>Nach Schill (2012) </a:t>
             </a:r>
-            <a:endParaRPr lang="de-DE" dirty="0"/>
           </a:p>
         </p:txBody>
       </p:sp>

</xml_diff>

<commit_message>
neue neue neue Version
</commit_message>
<xml_diff>
--- a/dokumentation/vortrag.pptx
+++ b/dokumentation/vortrag.pptx
@@ -5,7 +5,7 @@
     <p:sldMasterId id="2147483648" r:id="rId1"/>
   </p:sldMasterIdLst>
   <p:notesMasterIdLst>
-    <p:notesMasterId r:id="rId22"/>
+    <p:notesMasterId r:id="rId21"/>
   </p:notesMasterIdLst>
   <p:sldIdLst>
     <p:sldId id="259" r:id="rId2"/>
@@ -15,19 +15,18 @@
     <p:sldId id="262" r:id="rId6"/>
     <p:sldId id="263" r:id="rId7"/>
     <p:sldId id="276" r:id="rId8"/>
-    <p:sldId id="274" r:id="rId9"/>
-    <p:sldId id="267" r:id="rId10"/>
-    <p:sldId id="278" r:id="rId11"/>
-    <p:sldId id="269" r:id="rId12"/>
-    <p:sldId id="265" r:id="rId13"/>
-    <p:sldId id="266" r:id="rId14"/>
-    <p:sldId id="270" r:id="rId15"/>
-    <p:sldId id="271" r:id="rId16"/>
-    <p:sldId id="272" r:id="rId17"/>
-    <p:sldId id="273" r:id="rId18"/>
-    <p:sldId id="275" r:id="rId19"/>
-    <p:sldId id="264" r:id="rId20"/>
-    <p:sldId id="277" r:id="rId21"/>
+    <p:sldId id="267" r:id="rId9"/>
+    <p:sldId id="278" r:id="rId10"/>
+    <p:sldId id="269" r:id="rId11"/>
+    <p:sldId id="265" r:id="rId12"/>
+    <p:sldId id="266" r:id="rId13"/>
+    <p:sldId id="270" r:id="rId14"/>
+    <p:sldId id="271" r:id="rId15"/>
+    <p:sldId id="272" r:id="rId16"/>
+    <p:sldId id="273" r:id="rId17"/>
+    <p:sldId id="275" r:id="rId18"/>
+    <p:sldId id="264" r:id="rId19"/>
+    <p:sldId id="277" r:id="rId20"/>
   </p:sldIdLst>
   <p:sldSz cx="12192000" cy="6858000"/>
   <p:notesSz cx="6858000" cy="9144000"/>
@@ -2110,10 +2109,9 @@
         <a:lstStyle/>
         <a:p>
           <a:r>
-            <a:rPr lang="de-DE"/>
-            <a:t>Zielsetzung 						Felix</a:t>
+            <a:rPr lang="de-DE" dirty="0"/>
+            <a:t>Zielsetzung </a:t>
           </a:r>
-          <a:endParaRPr lang="de-DE" dirty="0"/>
         </a:p>
       </dgm:t>
     </dgm:pt>
@@ -2147,10 +2145,9 @@
         <a:lstStyle/>
         <a:p>
           <a:r>
-            <a:rPr lang="de-DE"/>
-            <a:t>Motivation – Java Messaging Service			Felix</a:t>
+            <a:rPr lang="de-DE" dirty="0"/>
+            <a:t>Motivation – Java Messaging Service</a:t>
           </a:r>
-          <a:endParaRPr lang="de-DE" dirty="0"/>
         </a:p>
       </dgm:t>
     </dgm:pt>
@@ -2185,7 +2182,7 @@
         <a:p>
           <a:r>
             <a:rPr lang="de-DE" dirty="0"/>
-            <a:t>Architektur und Fehlersemantik				Max</a:t>
+            <a:t>Architektur und Fehlersemantik</a:t>
           </a:r>
         </a:p>
       </dgm:t>
@@ -2221,7 +2218,7 @@
         <a:p>
           <a:r>
             <a:rPr lang="de-DE" dirty="0"/>
-            <a:t>Verteilte Transaktionen					Chrissi</a:t>
+            <a:t>Verteilte Transaktionen</a:t>
           </a:r>
         </a:p>
       </dgm:t>
@@ -2256,10 +2253,9 @@
         <a:lstStyle/>
         <a:p>
           <a:r>
-            <a:rPr lang="de-DE"/>
-            <a:t>Umstieg auf Wildfly 10					Chrissi</a:t>
+            <a:rPr lang="de-DE" dirty="0"/>
+            <a:t>Umstieg auf Wildfly 10</a:t>
           </a:r>
-          <a:endParaRPr lang="de-DE" dirty="0"/>
         </a:p>
       </dgm:t>
     </dgm:pt>
@@ -2293,10 +2289,9 @@
         <a:lstStyle/>
         <a:p>
           <a:r>
-            <a:rPr lang="de-DE"/>
-            <a:t>Benchmarking						Chrissi David</a:t>
+            <a:rPr lang="de-DE" dirty="0"/>
+            <a:t>Benchmarking</a:t>
           </a:r>
-          <a:endParaRPr lang="de-DE" dirty="0"/>
         </a:p>
       </dgm:t>
     </dgm:pt>
@@ -2330,10 +2325,9 @@
         <a:lstStyle/>
         <a:p>
           <a:r>
-            <a:rPr lang="de-DE"/>
-            <a:t>Umsetzung des Admin-Client				David</a:t>
+            <a:rPr lang="de-DE" dirty="0"/>
+            <a:t>Umsetzung des Admin-Client</a:t>
           </a:r>
-          <a:endParaRPr lang="de-DE" dirty="0"/>
         </a:p>
       </dgm:t>
     </dgm:pt>
@@ -2372,7 +2366,7 @@
           </a:r>
           <a:r>
             <a:rPr lang="de-DE" dirty="0"/>
-            <a:t> – Moderne Businessanwendung			Felix</a:t>
+            <a:t> – Moderne Businessanwendung</a:t>
           </a:r>
         </a:p>
       </dgm:t>
@@ -2683,10 +2677,9 @@
             <a:buNone/>
           </a:pPr>
           <a:r>
-            <a:rPr lang="de-DE" sz="2000" kern="1200"/>
-            <a:t>Zielsetzung 						Felix</a:t>
+            <a:rPr lang="de-DE" sz="2000" kern="1200" dirty="0"/>
+            <a:t>Zielsetzung </a:t>
           </a:r>
-          <a:endParaRPr lang="de-DE" sz="2000" kern="1200" dirty="0"/>
         </a:p>
       </dsp:txBody>
       <dsp:txXfrm>
@@ -2763,10 +2756,9 @@
             <a:buNone/>
           </a:pPr>
           <a:r>
-            <a:rPr lang="de-DE" sz="2000" kern="1200"/>
-            <a:t>Motivation – Java Messaging Service			Felix</a:t>
+            <a:rPr lang="de-DE" sz="2000" kern="1200" dirty="0"/>
+            <a:t>Motivation – Java Messaging Service</a:t>
           </a:r>
-          <a:endParaRPr lang="de-DE" sz="2000" kern="1200" dirty="0"/>
         </a:p>
       </dsp:txBody>
       <dsp:txXfrm>
@@ -2844,7 +2836,7 @@
           </a:pPr>
           <a:r>
             <a:rPr lang="de-DE" sz="2000" kern="1200" dirty="0"/>
-            <a:t>Architektur und Fehlersemantik				Max</a:t>
+            <a:t>Architektur und Fehlersemantik</a:t>
           </a:r>
         </a:p>
       </dsp:txBody>
@@ -2923,7 +2915,7 @@
           </a:pPr>
           <a:r>
             <a:rPr lang="de-DE" sz="2000" kern="1200" dirty="0"/>
-            <a:t>Verteilte Transaktionen					Chrissi</a:t>
+            <a:t>Verteilte Transaktionen</a:t>
           </a:r>
         </a:p>
       </dsp:txBody>
@@ -3001,10 +2993,9 @@
             <a:buNone/>
           </a:pPr>
           <a:r>
-            <a:rPr lang="de-DE" sz="2000" kern="1200"/>
-            <a:t>Umstieg auf Wildfly 10					Chrissi</a:t>
+            <a:rPr lang="de-DE" sz="2000" kern="1200" dirty="0"/>
+            <a:t>Umstieg auf Wildfly 10</a:t>
           </a:r>
-          <a:endParaRPr lang="de-DE" sz="2000" kern="1200" dirty="0"/>
         </a:p>
       </dsp:txBody>
       <dsp:txXfrm>
@@ -3081,10 +3072,9 @@
             <a:buNone/>
           </a:pPr>
           <a:r>
-            <a:rPr lang="de-DE" sz="2000" kern="1200"/>
-            <a:t>Benchmarking						Chrissi David</a:t>
+            <a:rPr lang="de-DE" sz="2000" kern="1200" dirty="0"/>
+            <a:t>Benchmarking</a:t>
           </a:r>
-          <a:endParaRPr lang="de-DE" sz="2000" kern="1200" dirty="0"/>
         </a:p>
       </dsp:txBody>
       <dsp:txXfrm>
@@ -3161,10 +3151,9 @@
             <a:buNone/>
           </a:pPr>
           <a:r>
-            <a:rPr lang="de-DE" sz="2000" kern="1200"/>
-            <a:t>Umsetzung des Admin-Client				David</a:t>
+            <a:rPr lang="de-DE" sz="2000" kern="1200" dirty="0"/>
+            <a:t>Umsetzung des Admin-Client</a:t>
           </a:r>
-          <a:endParaRPr lang="de-DE" sz="2000" kern="1200" dirty="0"/>
         </a:p>
       </dsp:txBody>
       <dsp:txXfrm>
@@ -3246,7 +3235,7 @@
           </a:r>
           <a:r>
             <a:rPr lang="de-DE" sz="2000" kern="1200" dirty="0"/>
-            <a:t> – Moderne Businessanwendung			Felix</a:t>
+            <a:t> – Moderne Businessanwendung</a:t>
           </a:r>
         </a:p>
       </dsp:txBody>
@@ -5151,7 +5140,7 @@
           <a:p>
             <a:fld id="{5C91375F-FED4-471A-ABCE-B8ACD66AB01D}" type="slidenum">
               <a:rPr lang="de-DE" smtClean="0"/>
-              <a:t>9</a:t>
+              <a:t>8</a:t>
             </a:fld>
             <a:endParaRPr lang="de-DE"/>
           </a:p>
@@ -8463,6 +8452,34 @@
           </a:p>
         </p:txBody>
       </p:sp>
+      <p:sp>
+        <p:nvSpPr>
+          <p:cNvPr id="4" name="Foliennummernplatzhalter 5"/>
+          <p:cNvSpPr>
+            <a:spLocks noGrp="1"/>
+          </p:cNvSpPr>
+          <p:nvPr>
+            <p:ph type="sldNum" sz="quarter" idx="12"/>
+          </p:nvPr>
+        </p:nvSpPr>
+        <p:spPr>
+          <a:xfrm>
+            <a:off x="8610600" y="6356350"/>
+            <a:ext cx="2743200" cy="365125"/>
+          </a:xfrm>
+        </p:spPr>
+        <p:txBody>
+          <a:bodyPr/>
+          <a:lstStyle/>
+          <a:p>
+            <a:fld id="{A2E1CED3-FDE9-4250-9543-5276860A4BAA}" type="slidenum">
+              <a:rPr lang="de-DE" smtClean="0"/>
+              <a:t>1</a:t>
+            </a:fld>
+            <a:endParaRPr lang="de-DE"/>
+          </a:p>
+        </p:txBody>
+      </p:sp>
     </p:spTree>
     <p:extLst>
       <p:ext uri="{BB962C8B-B14F-4D97-AF65-F5344CB8AC3E}">
@@ -8510,9 +8527,8 @@
           <a:p>
             <a:r>
               <a:rPr lang="de-DE" dirty="0"/>
-              <a:t>Verteilte XA-Transaktion</a:t>
-            </a:r>
-            <a:endParaRPr lang="en-US" dirty="0"/>
+              <a:t>Umstieg auf Wildfly 10</a:t>
+            </a:r>
           </a:p>
         </p:txBody>
       </p:sp>
@@ -8528,82 +8544,39 @@
         </p:nvSpPr>
         <p:spPr/>
         <p:txBody>
-          <a:bodyPr/>
+          <a:bodyPr>
+            <a:normAutofit/>
+          </a:bodyPr>
           <a:lstStyle/>
           <a:p>
             <a:r>
               <a:rPr lang="de-DE" dirty="0"/>
-              <a:t>Container </a:t>
+              <a:t>Performancesteigerung durch den Support des aktuelleren Protokolls HTTP/2.5 </a:t>
+            </a:r>
+          </a:p>
+          <a:p>
+            <a:r>
+              <a:rPr lang="de-DE" dirty="0"/>
+              <a:t>Ablösung von </a:t>
             </a:r>
             <a:r>
               <a:rPr lang="de-DE" dirty="0" err="1"/>
-              <a:t>Managed</a:t>
+              <a:t>HornetQ</a:t>
             </a:r>
             <a:r>
               <a:rPr lang="de-DE" dirty="0"/>
-              <a:t> Transaction</a:t>
-            </a:r>
+              <a:t> durch </a:t>
+            </a:r>
+            <a:r>
+              <a:rPr lang="de-DE" dirty="0" err="1"/>
+              <a:t>ActiveMQ</a:t>
+            </a:r>
+            <a:endParaRPr lang="de-DE" dirty="0"/>
           </a:p>
           <a:p>
             <a:r>
               <a:rPr lang="de-DE" dirty="0"/>
-              <a:t>Koordination der Transaktionen zur </a:t>
-            </a:r>
-            <a:r>
-              <a:rPr lang="de-DE" dirty="0" err="1"/>
-              <a:t>Persistierung</a:t>
-            </a:r>
-            <a:r>
-              <a:rPr lang="de-DE" dirty="0"/>
-              <a:t> in </a:t>
-            </a:r>
-            <a:r>
-              <a:rPr lang="de-DE" dirty="0" err="1"/>
-              <a:t>TraceDB</a:t>
-            </a:r>
-            <a:r>
-              <a:rPr lang="de-DE" dirty="0"/>
-              <a:t> und </a:t>
-            </a:r>
-            <a:r>
-              <a:rPr lang="de-DE" dirty="0" err="1"/>
-              <a:t>CountDB</a:t>
-            </a:r>
-            <a:r>
-              <a:rPr lang="de-DE" dirty="0"/>
-              <a:t> durch EJB Container</a:t>
-            </a:r>
-          </a:p>
-          <a:p>
-            <a:r>
-              <a:rPr lang="de-DE" dirty="0" err="1"/>
-              <a:t>Exceptions</a:t>
-            </a:r>
-            <a:r>
-              <a:rPr lang="de-DE" dirty="0"/>
-              <a:t> werden zur Message-</a:t>
-            </a:r>
-            <a:r>
-              <a:rPr lang="de-DE" dirty="0" err="1"/>
-              <a:t>Driven</a:t>
-            </a:r>
-            <a:r>
-              <a:rPr lang="de-DE" dirty="0"/>
-              <a:t>-Bean gereicht, von dort wird die Transaktion für ein Rollback markiert</a:t>
-            </a:r>
-          </a:p>
-          <a:p>
-            <a:r>
-              <a:rPr lang="de-DE" dirty="0"/>
-              <a:t>Definition der Datenbanken als XA-</a:t>
-            </a:r>
-            <a:r>
-              <a:rPr lang="de-DE" dirty="0" err="1"/>
-              <a:t>Datasources</a:t>
-            </a:r>
-            <a:r>
-              <a:rPr lang="de-DE" dirty="0"/>
-              <a:t> am </a:t>
+              <a:t>Auslauf Sicherheits-Updates für </a:t>
             </a:r>
             <a:r>
               <a:rPr lang="de-DE" dirty="0" err="1"/>
@@ -8611,16 +8584,92 @@
             </a:r>
             <a:r>
               <a:rPr lang="de-DE" dirty="0"/>
-              <a:t> (dynamisch per mysql-ds.xml)</a:t>
-            </a:r>
-            <a:endParaRPr lang="en-US" dirty="0"/>
+              <a:t> 8</a:t>
+            </a:r>
+          </a:p>
+          <a:p>
+            <a:r>
+              <a:rPr lang="de-DE" dirty="0" err="1"/>
+              <a:t>Wildfly</a:t>
+            </a:r>
+            <a:r>
+              <a:rPr lang="de-DE" dirty="0"/>
+              <a:t> 10 unterstützt Java 9</a:t>
+            </a:r>
+          </a:p>
+          <a:p>
+            <a:r>
+              <a:rPr lang="de-DE" dirty="0"/>
+              <a:t>ORM-Framework </a:t>
+            </a:r>
+            <a:r>
+              <a:rPr lang="de-DE" dirty="0" err="1"/>
+              <a:t>Hibernate</a:t>
+            </a:r>
+            <a:r>
+              <a:rPr lang="de-DE" dirty="0"/>
+              <a:t> in Version 5 wird unterstützt</a:t>
+            </a:r>
+          </a:p>
+          <a:p>
+            <a:r>
+              <a:rPr lang="de-DE" dirty="0"/>
+              <a:t>Einfacheres </a:t>
+            </a:r>
+            <a:r>
+              <a:rPr lang="de-DE" dirty="0" err="1"/>
+              <a:t>Mangement</a:t>
+            </a:r>
+            <a:r>
+              <a:rPr lang="de-DE" dirty="0"/>
+              <a:t> der </a:t>
+            </a:r>
+            <a:r>
+              <a:rPr lang="de-DE" dirty="0" err="1"/>
+              <a:t>Wildfly</a:t>
+            </a:r>
+            <a:r>
+              <a:rPr lang="de-DE" dirty="0"/>
+              <a:t>-Konfiguration, bspw. durch die Bereitstellung vordefinierter Datenbankkonfigurationen</a:t>
+            </a:r>
+          </a:p>
+          <a:p>
+            <a:endParaRPr lang="de-DE" dirty="0"/>
+          </a:p>
+        </p:txBody>
+      </p:sp>
+      <p:sp>
+        <p:nvSpPr>
+          <p:cNvPr id="4" name="Foliennummernplatzhalter 5"/>
+          <p:cNvSpPr>
+            <a:spLocks noGrp="1"/>
+          </p:cNvSpPr>
+          <p:nvPr>
+            <p:ph type="sldNum" sz="quarter" idx="12"/>
+          </p:nvPr>
+        </p:nvSpPr>
+        <p:spPr>
+          <a:xfrm>
+            <a:off x="8610600" y="6356350"/>
+            <a:ext cx="2743200" cy="365125"/>
+          </a:xfrm>
+        </p:spPr>
+        <p:txBody>
+          <a:bodyPr/>
+          <a:lstStyle/>
+          <a:p>
+            <a:fld id="{A2E1CED3-FDE9-4250-9543-5276860A4BAA}" type="slidenum">
+              <a:rPr lang="de-DE" smtClean="0"/>
+              <a:t>10</a:t>
+            </a:fld>
+            <a:endParaRPr lang="de-DE"/>
           </a:p>
         </p:txBody>
       </p:sp>
     </p:spTree>
     <p:extLst>
       <p:ext uri="{BB962C8B-B14F-4D97-AF65-F5344CB8AC3E}">
-        <p14:creationId xmlns:p14="http://schemas.microsoft.com/office/powerpoint/2010/main" val="2050278402"/>
+        <p14:creationId xmlns:p14="http://schemas.microsoft.com/office/powerpoint/2010/main" val="3724125338"/>
       </p:ext>
     </p:extLst>
   </p:cSld>
@@ -8664,164 +8713,6 @@
           <a:p>
             <a:r>
               <a:rPr lang="de-DE" dirty="0"/>
-              <a:t>Umstieg auf Wildfly 10</a:t>
-            </a:r>
-          </a:p>
-        </p:txBody>
-      </p:sp>
-      <p:sp>
-        <p:nvSpPr>
-          <p:cNvPr id="3" name="Inhaltsplatzhalter 2"/>
-          <p:cNvSpPr>
-            <a:spLocks noGrp="1"/>
-          </p:cNvSpPr>
-          <p:nvPr>
-            <p:ph idx="1"/>
-          </p:nvPr>
-        </p:nvSpPr>
-        <p:spPr/>
-        <p:txBody>
-          <a:bodyPr>
-            <a:normAutofit/>
-          </a:bodyPr>
-          <a:lstStyle/>
-          <a:p>
-            <a:r>
-              <a:rPr lang="de-DE" dirty="0"/>
-              <a:t>Performancesteigerung durch den Support des aktuelleren Protokolls HTTP/2.5 </a:t>
-            </a:r>
-          </a:p>
-          <a:p>
-            <a:r>
-              <a:rPr lang="de-DE" dirty="0"/>
-              <a:t>Ablösung von </a:t>
-            </a:r>
-            <a:r>
-              <a:rPr lang="de-DE" dirty="0" err="1"/>
-              <a:t>HornetQ</a:t>
-            </a:r>
-            <a:r>
-              <a:rPr lang="de-DE" dirty="0"/>
-              <a:t> durch </a:t>
-            </a:r>
-            <a:r>
-              <a:rPr lang="de-DE" dirty="0" err="1"/>
-              <a:t>ActiveMQ</a:t>
-            </a:r>
-            <a:endParaRPr lang="de-DE" dirty="0"/>
-          </a:p>
-          <a:p>
-            <a:r>
-              <a:rPr lang="de-DE" dirty="0"/>
-              <a:t>Auslauf Sicherheits-Updates für </a:t>
-            </a:r>
-            <a:r>
-              <a:rPr lang="de-DE" dirty="0" err="1"/>
-              <a:t>Wildfly</a:t>
-            </a:r>
-            <a:r>
-              <a:rPr lang="de-DE" dirty="0"/>
-              <a:t> 8</a:t>
-            </a:r>
-          </a:p>
-          <a:p>
-            <a:r>
-              <a:rPr lang="de-DE" dirty="0" err="1"/>
-              <a:t>Wildfly</a:t>
-            </a:r>
-            <a:r>
-              <a:rPr lang="de-DE" dirty="0"/>
-              <a:t> 10 unterstützt Java 9</a:t>
-            </a:r>
-          </a:p>
-          <a:p>
-            <a:r>
-              <a:rPr lang="de-DE" dirty="0"/>
-              <a:t>ORM-Framework </a:t>
-            </a:r>
-            <a:r>
-              <a:rPr lang="de-DE" dirty="0" err="1"/>
-              <a:t>Hibernate</a:t>
-            </a:r>
-            <a:r>
-              <a:rPr lang="de-DE" dirty="0"/>
-              <a:t> in Version 5 wird unterstützt</a:t>
-            </a:r>
-          </a:p>
-          <a:p>
-            <a:r>
-              <a:rPr lang="de-DE" dirty="0"/>
-              <a:t>Einfacheres </a:t>
-            </a:r>
-            <a:r>
-              <a:rPr lang="de-DE" dirty="0" err="1"/>
-              <a:t>Mangement</a:t>
-            </a:r>
-            <a:r>
-              <a:rPr lang="de-DE" dirty="0"/>
-              <a:t> der </a:t>
-            </a:r>
-            <a:r>
-              <a:rPr lang="de-DE" dirty="0" err="1"/>
-              <a:t>Wildfly</a:t>
-            </a:r>
-            <a:r>
-              <a:rPr lang="de-DE" dirty="0"/>
-              <a:t>-Konfiguration, bspw. durch die Bereitstellung vordefinierter Datenbankkonfigurationen</a:t>
-            </a:r>
-          </a:p>
-          <a:p>
-            <a:endParaRPr lang="de-DE" dirty="0"/>
-          </a:p>
-        </p:txBody>
-      </p:sp>
-    </p:spTree>
-    <p:extLst>
-      <p:ext uri="{BB962C8B-B14F-4D97-AF65-F5344CB8AC3E}">
-        <p14:creationId xmlns:p14="http://schemas.microsoft.com/office/powerpoint/2010/main" val="3724125338"/>
-      </p:ext>
-    </p:extLst>
-  </p:cSld>
-  <p:clrMapOvr>
-    <a:masterClrMapping/>
-  </p:clrMapOvr>
-</p:sld>
-</file>
-
-<file path=ppt/slides/slide12.xml><?xml version="1.0" encoding="utf-8"?>
-<p:sld xmlns:a="http://schemas.openxmlformats.org/drawingml/2006/main" xmlns:r="http://schemas.openxmlformats.org/officeDocument/2006/relationships" xmlns:p="http://schemas.openxmlformats.org/presentationml/2006/main">
-  <p:cSld>
-    <p:spTree>
-      <p:nvGrpSpPr>
-        <p:cNvPr id="1" name=""/>
-        <p:cNvGrpSpPr/>
-        <p:nvPr/>
-      </p:nvGrpSpPr>
-      <p:grpSpPr>
-        <a:xfrm>
-          <a:off x="0" y="0"/>
-          <a:ext cx="0" cy="0"/>
-          <a:chOff x="0" y="0"/>
-          <a:chExt cx="0" cy="0"/>
-        </a:xfrm>
-      </p:grpSpPr>
-      <p:sp>
-        <p:nvSpPr>
-          <p:cNvPr id="2" name="Titel 1"/>
-          <p:cNvSpPr>
-            <a:spLocks noGrp="1"/>
-          </p:cNvSpPr>
-          <p:nvPr>
-            <p:ph type="title"/>
-          </p:nvPr>
-        </p:nvSpPr>
-        <p:spPr/>
-        <p:txBody>
-          <a:bodyPr/>
-          <a:lstStyle/>
-          <a:p>
-            <a:r>
-              <a:rPr lang="de-DE" dirty="0"/>
               <a:t>Benchmarking - Testspezifikation</a:t>
             </a:r>
           </a:p>
@@ -8853,6 +8744,34 @@
           </a:prstGeom>
         </p:spPr>
       </p:pic>
+      <p:sp>
+        <p:nvSpPr>
+          <p:cNvPr id="4" name="Foliennummernplatzhalter 5"/>
+          <p:cNvSpPr>
+            <a:spLocks noGrp="1"/>
+          </p:cNvSpPr>
+          <p:nvPr>
+            <p:ph type="sldNum" sz="quarter" idx="12"/>
+          </p:nvPr>
+        </p:nvSpPr>
+        <p:spPr>
+          <a:xfrm>
+            <a:off x="8610600" y="6356350"/>
+            <a:ext cx="2743200" cy="365125"/>
+          </a:xfrm>
+        </p:spPr>
+        <p:txBody>
+          <a:bodyPr/>
+          <a:lstStyle/>
+          <a:p>
+            <a:fld id="{A2E1CED3-FDE9-4250-9543-5276860A4BAA}" type="slidenum">
+              <a:rPr lang="de-DE" smtClean="0"/>
+              <a:t>11</a:t>
+            </a:fld>
+            <a:endParaRPr lang="de-DE"/>
+          </a:p>
+        </p:txBody>
+      </p:sp>
     </p:spTree>
     <p:extLst>
       <p:ext uri="{BB962C8B-B14F-4D97-AF65-F5344CB8AC3E}">
@@ -8866,7 +8785,7 @@
 </p:sld>
 </file>
 
-<file path=ppt/slides/slide13.xml><?xml version="1.0" encoding="utf-8"?>
+<file path=ppt/slides/slide12.xml><?xml version="1.0" encoding="utf-8"?>
 <p:sld xmlns:a="http://schemas.openxmlformats.org/drawingml/2006/main" xmlns:r="http://schemas.openxmlformats.org/officeDocument/2006/relationships" xmlns:p="http://schemas.openxmlformats.org/presentationml/2006/main">
   <p:cSld>
     <p:spTree>
@@ -9405,6 +9324,34 @@
           </a:p>
         </p:txBody>
       </p:sp>
+      <p:sp>
+        <p:nvSpPr>
+          <p:cNvPr id="17" name="Foliennummernplatzhalter 5"/>
+          <p:cNvSpPr>
+            <a:spLocks noGrp="1"/>
+          </p:cNvSpPr>
+          <p:nvPr>
+            <p:ph type="sldNum" sz="quarter" idx="12"/>
+          </p:nvPr>
+        </p:nvSpPr>
+        <p:spPr>
+          <a:xfrm>
+            <a:off x="8610600" y="6356350"/>
+            <a:ext cx="2743200" cy="365125"/>
+          </a:xfrm>
+        </p:spPr>
+        <p:txBody>
+          <a:bodyPr/>
+          <a:lstStyle/>
+          <a:p>
+            <a:fld id="{A2E1CED3-FDE9-4250-9543-5276860A4BAA}" type="slidenum">
+              <a:rPr lang="de-DE" smtClean="0"/>
+              <a:t>12</a:t>
+            </a:fld>
+            <a:endParaRPr lang="de-DE"/>
+          </a:p>
+        </p:txBody>
+      </p:sp>
     </p:spTree>
     <p:extLst>
       <p:ext uri="{BB962C8B-B14F-4D97-AF65-F5344CB8AC3E}">
@@ -9418,7 +9365,7 @@
 </p:sld>
 </file>
 
-<file path=ppt/slides/slide14.xml><?xml version="1.0" encoding="utf-8"?>
+<file path=ppt/slides/slide13.xml><?xml version="1.0" encoding="utf-8"?>
 <p:sld xmlns:a="http://schemas.openxmlformats.org/drawingml/2006/main" xmlns:r="http://schemas.openxmlformats.org/officeDocument/2006/relationships" xmlns:p="http://schemas.openxmlformats.org/presentationml/2006/main">
   <p:cSld>
     <p:spTree>
@@ -9512,6 +9459,34 @@
           </a:graphicData>
         </a:graphic>
       </p:graphicFrame>
+      <p:sp>
+        <p:nvSpPr>
+          <p:cNvPr id="5" name="Foliennummernplatzhalter 5"/>
+          <p:cNvSpPr>
+            <a:spLocks noGrp="1"/>
+          </p:cNvSpPr>
+          <p:nvPr>
+            <p:ph type="sldNum" sz="quarter" idx="12"/>
+          </p:nvPr>
+        </p:nvSpPr>
+        <p:spPr>
+          <a:xfrm>
+            <a:off x="8610600" y="6356350"/>
+            <a:ext cx="2743200" cy="365125"/>
+          </a:xfrm>
+        </p:spPr>
+        <p:txBody>
+          <a:bodyPr/>
+          <a:lstStyle/>
+          <a:p>
+            <a:fld id="{A2E1CED3-FDE9-4250-9543-5276860A4BAA}" type="slidenum">
+              <a:rPr lang="de-DE" smtClean="0"/>
+              <a:t>13</a:t>
+            </a:fld>
+            <a:endParaRPr lang="de-DE"/>
+          </a:p>
+        </p:txBody>
+      </p:sp>
     </p:spTree>
     <p:extLst>
       <p:ext uri="{BB962C8B-B14F-4D97-AF65-F5344CB8AC3E}">
@@ -9525,7 +9500,7 @@
 </p:sld>
 </file>
 
-<file path=ppt/slides/slide15.xml><?xml version="1.0" encoding="utf-8"?>
+<file path=ppt/slides/slide14.xml><?xml version="1.0" encoding="utf-8"?>
 <p:sld xmlns:a="http://schemas.openxmlformats.org/drawingml/2006/main" xmlns:r="http://schemas.openxmlformats.org/officeDocument/2006/relationships" xmlns:p="http://schemas.openxmlformats.org/presentationml/2006/main">
   <p:cSld>
     <p:spTree>
@@ -9649,6 +9624,34 @@
           </a:prstGeom>
         </p:spPr>
       </p:pic>
+      <p:sp>
+        <p:nvSpPr>
+          <p:cNvPr id="7" name="Foliennummernplatzhalter 5"/>
+          <p:cNvSpPr>
+            <a:spLocks noGrp="1"/>
+          </p:cNvSpPr>
+          <p:nvPr>
+            <p:ph type="sldNum" sz="quarter" idx="12"/>
+          </p:nvPr>
+        </p:nvSpPr>
+        <p:spPr>
+          <a:xfrm>
+            <a:off x="8610600" y="6356350"/>
+            <a:ext cx="2743200" cy="365125"/>
+          </a:xfrm>
+        </p:spPr>
+        <p:txBody>
+          <a:bodyPr/>
+          <a:lstStyle/>
+          <a:p>
+            <a:fld id="{A2E1CED3-FDE9-4250-9543-5276860A4BAA}" type="slidenum">
+              <a:rPr lang="de-DE" smtClean="0"/>
+              <a:t>14</a:t>
+            </a:fld>
+            <a:endParaRPr lang="de-DE"/>
+          </a:p>
+        </p:txBody>
+      </p:sp>
     </p:spTree>
     <p:extLst>
       <p:ext uri="{BB962C8B-B14F-4D97-AF65-F5344CB8AC3E}">
@@ -9737,7 +9740,7 @@
 </p:sld>
 </file>
 
-<file path=ppt/slides/slide16.xml><?xml version="1.0" encoding="utf-8"?>
+<file path=ppt/slides/slide15.xml><?xml version="1.0" encoding="utf-8"?>
 <p:sld xmlns:a="http://schemas.openxmlformats.org/drawingml/2006/main" xmlns:r="http://schemas.openxmlformats.org/officeDocument/2006/relationships" xmlns:p="http://schemas.openxmlformats.org/presentationml/2006/main">
   <p:cSld>
     <p:spTree>
@@ -9871,6 +9874,34 @@
           </a:prstGeom>
         </p:spPr>
       </p:pic>
+      <p:sp>
+        <p:nvSpPr>
+          <p:cNvPr id="6" name="Foliennummernplatzhalter 5"/>
+          <p:cNvSpPr>
+            <a:spLocks noGrp="1"/>
+          </p:cNvSpPr>
+          <p:nvPr>
+            <p:ph type="sldNum" sz="quarter" idx="12"/>
+          </p:nvPr>
+        </p:nvSpPr>
+        <p:spPr>
+          <a:xfrm>
+            <a:off x="8610600" y="6356350"/>
+            <a:ext cx="2743200" cy="365125"/>
+          </a:xfrm>
+        </p:spPr>
+        <p:txBody>
+          <a:bodyPr/>
+          <a:lstStyle/>
+          <a:p>
+            <a:fld id="{A2E1CED3-FDE9-4250-9543-5276860A4BAA}" type="slidenum">
+              <a:rPr lang="de-DE" smtClean="0"/>
+              <a:t>15</a:t>
+            </a:fld>
+            <a:endParaRPr lang="de-DE"/>
+          </a:p>
+        </p:txBody>
+      </p:sp>
     </p:spTree>
     <p:extLst>
       <p:ext uri="{BB962C8B-B14F-4D97-AF65-F5344CB8AC3E}">
@@ -9884,7 +9915,7 @@
 </p:sld>
 </file>
 
-<file path=ppt/slides/slide17.xml><?xml version="1.0" encoding="utf-8"?>
+<file path=ppt/slides/slide16.xml><?xml version="1.0" encoding="utf-8"?>
 <p:sld xmlns:a="http://schemas.openxmlformats.org/drawingml/2006/main" xmlns:r="http://schemas.openxmlformats.org/officeDocument/2006/relationships" xmlns:p="http://schemas.openxmlformats.org/presentationml/2006/main">
   <p:cSld>
     <p:spTree>
@@ -9988,10 +10019,143 @@
           </a:prstGeom>
         </p:spPr>
       </p:pic>
+      <p:sp>
+        <p:nvSpPr>
+          <p:cNvPr id="6" name="Foliennummernplatzhalter 5"/>
+          <p:cNvSpPr>
+            <a:spLocks noGrp="1"/>
+          </p:cNvSpPr>
+          <p:nvPr>
+            <p:ph type="sldNum" sz="quarter" idx="12"/>
+          </p:nvPr>
+        </p:nvSpPr>
+        <p:spPr>
+          <a:xfrm>
+            <a:off x="8610600" y="6356350"/>
+            <a:ext cx="2743200" cy="365125"/>
+          </a:xfrm>
+        </p:spPr>
+        <p:txBody>
+          <a:bodyPr/>
+          <a:lstStyle/>
+          <a:p>
+            <a:fld id="{A2E1CED3-FDE9-4250-9543-5276860A4BAA}" type="slidenum">
+              <a:rPr lang="de-DE" smtClean="0"/>
+              <a:t>16</a:t>
+            </a:fld>
+            <a:endParaRPr lang="de-DE"/>
+          </a:p>
+        </p:txBody>
+      </p:sp>
     </p:spTree>
     <p:extLst>
       <p:ext uri="{BB962C8B-B14F-4D97-AF65-F5344CB8AC3E}">
         <p14:creationId xmlns:p14="http://schemas.microsoft.com/office/powerpoint/2010/main" val="3871385953"/>
+      </p:ext>
+    </p:extLst>
+  </p:cSld>
+  <p:clrMapOvr>
+    <a:masterClrMapping/>
+  </p:clrMapOvr>
+</p:sld>
+</file>
+
+<file path=ppt/slides/slide17.xml><?xml version="1.0" encoding="utf-8"?>
+<p:sld xmlns:a="http://schemas.openxmlformats.org/drawingml/2006/main" xmlns:r="http://schemas.openxmlformats.org/officeDocument/2006/relationships" xmlns:p="http://schemas.openxmlformats.org/presentationml/2006/main">
+  <p:cSld>
+    <p:spTree>
+      <p:nvGrpSpPr>
+        <p:cNvPr id="1" name=""/>
+        <p:cNvGrpSpPr/>
+        <p:nvPr/>
+      </p:nvGrpSpPr>
+      <p:grpSpPr>
+        <a:xfrm>
+          <a:off x="0" y="0"/>
+          <a:ext cx="0" cy="0"/>
+          <a:chOff x="0" y="0"/>
+          <a:chExt cx="0" cy="0"/>
+        </a:xfrm>
+      </p:grpSpPr>
+      <p:sp>
+        <p:nvSpPr>
+          <p:cNvPr id="2" name="Titel 1"/>
+          <p:cNvSpPr>
+            <a:spLocks noGrp="1"/>
+          </p:cNvSpPr>
+          <p:nvPr>
+            <p:ph type="title"/>
+          </p:nvPr>
+        </p:nvSpPr>
+        <p:spPr/>
+        <p:txBody>
+          <a:bodyPr/>
+          <a:lstStyle/>
+          <a:p>
+            <a:r>
+              <a:rPr lang="de-DE" dirty="0"/>
+              <a:t>Umsetzung des Admin-Client</a:t>
+            </a:r>
+          </a:p>
+        </p:txBody>
+      </p:sp>
+      <p:sp>
+        <p:nvSpPr>
+          <p:cNvPr id="3" name="Inhaltsplatzhalter 2"/>
+          <p:cNvSpPr>
+            <a:spLocks noGrp="1"/>
+          </p:cNvSpPr>
+          <p:nvPr>
+            <p:ph idx="1"/>
+          </p:nvPr>
+        </p:nvSpPr>
+        <p:spPr/>
+        <p:txBody>
+          <a:bodyPr>
+            <a:normAutofit/>
+          </a:bodyPr>
+          <a:lstStyle/>
+          <a:p>
+            <a:pPr>
+              <a:buFontTx/>
+              <a:buChar char="-"/>
+            </a:pPr>
+            <a:endParaRPr lang="de-DE" dirty="0"/>
+          </a:p>
+        </p:txBody>
+      </p:sp>
+      <p:sp>
+        <p:nvSpPr>
+          <p:cNvPr id="4" name="Foliennummernplatzhalter 5"/>
+          <p:cNvSpPr>
+            <a:spLocks noGrp="1"/>
+          </p:cNvSpPr>
+          <p:nvPr>
+            <p:ph type="sldNum" sz="quarter" idx="12"/>
+          </p:nvPr>
+        </p:nvSpPr>
+        <p:spPr>
+          <a:xfrm>
+            <a:off x="8610600" y="6356350"/>
+            <a:ext cx="2743200" cy="365125"/>
+          </a:xfrm>
+        </p:spPr>
+        <p:txBody>
+          <a:bodyPr/>
+          <a:lstStyle/>
+          <a:p>
+            <a:fld id="{A2E1CED3-FDE9-4250-9543-5276860A4BAA}" type="slidenum">
+              <a:rPr lang="de-DE" smtClean="0"/>
+              <a:t>17</a:t>
+            </a:fld>
+            <a:endParaRPr lang="de-DE"/>
+          </a:p>
+        </p:txBody>
+      </p:sp>
+    </p:spTree>
+    <p:extLst>
+      <p:ext uri="{BB962C8B-B14F-4D97-AF65-F5344CB8AC3E}">
+        <p14:creationId xmlns:p14="http://schemas.microsoft.com/office/powerpoint/2010/main" val="1332557833"/>
       </p:ext>
     </p:extLst>
   </p:cSld>
@@ -10034,8 +10198,12 @@
           <a:lstStyle/>
           <a:p>
             <a:r>
+              <a:rPr lang="de-DE" dirty="0" err="1"/>
+              <a:t>Benefits</a:t>
+            </a:r>
+            <a:r>
               <a:rPr lang="de-DE" dirty="0"/>
-              <a:t>Umsetzung des Admin-Client</a:t>
+              <a:t> – Moderne Businessanwendung</a:t>
             </a:r>
           </a:p>
         </p:txBody>
@@ -10053,7 +10221,7 @@
         <p:spPr/>
         <p:txBody>
           <a:bodyPr>
-            <a:normAutofit/>
+            <a:normAutofit fontScale="92500"/>
           </a:bodyPr>
           <a:lstStyle/>
           <a:p>
@@ -10061,14 +10229,152 @@
               <a:buFontTx/>
               <a:buChar char="-"/>
             </a:pPr>
+            <a:r>
+              <a:rPr lang="de-DE" dirty="0"/>
+              <a:t>6 austauschbare Projekte mit sehr wenig Abhängigkeiten</a:t>
+            </a:r>
+          </a:p>
+          <a:p>
+            <a:pPr>
+              <a:buFontTx/>
+              <a:buChar char="-"/>
+            </a:pPr>
+            <a:r>
+              <a:rPr lang="de-DE" dirty="0"/>
+              <a:t>Automatische Generierung nativer .exe-Anwendungen zur </a:t>
+            </a:r>
+            <a:r>
+              <a:rPr lang="de-DE" dirty="0" err="1"/>
+              <a:t>Buildzeit</a:t>
+            </a:r>
             <a:endParaRPr lang="de-DE" dirty="0"/>
+          </a:p>
+          <a:p>
+            <a:pPr>
+              <a:buFontTx/>
+              <a:buChar char="-"/>
+            </a:pPr>
+            <a:r>
+              <a:rPr lang="de-DE" dirty="0"/>
+              <a:t>Setzt auf neusten </a:t>
+            </a:r>
+            <a:r>
+              <a:rPr lang="de-DE" dirty="0" err="1"/>
+              <a:t>Applikationserver</a:t>
+            </a:r>
+            <a:r>
+              <a:rPr lang="de-DE" dirty="0"/>
+              <a:t> (EAP7) und Bibliotheken</a:t>
+            </a:r>
+          </a:p>
+          <a:p>
+            <a:pPr>
+              <a:buFontTx/>
+              <a:buChar char="-"/>
+            </a:pPr>
+            <a:r>
+              <a:rPr lang="de-DE" dirty="0"/>
+              <a:t>Skalierbares, performance-optimiertes Backend</a:t>
+            </a:r>
+          </a:p>
+          <a:p>
+            <a:pPr>
+              <a:buFontTx/>
+              <a:buChar char="-"/>
+            </a:pPr>
+            <a:r>
+              <a:rPr lang="de-DE" dirty="0"/>
+              <a:t>Überarbeitete, benutzerfreundliche und moderne UIs</a:t>
+            </a:r>
+          </a:p>
+          <a:p>
+            <a:pPr>
+              <a:buFontTx/>
+              <a:buChar char="-"/>
+            </a:pPr>
+            <a:r>
+              <a:rPr lang="de-DE" dirty="0"/>
+              <a:t>Automatisierte Unit- und Integrationstests zur </a:t>
+            </a:r>
+            <a:r>
+              <a:rPr lang="de-DE" dirty="0" err="1"/>
+              <a:t>Buildzeit</a:t>
+            </a:r>
+            <a:endParaRPr lang="de-DE" dirty="0"/>
+          </a:p>
+          <a:p>
+            <a:pPr>
+              <a:buFontTx/>
+              <a:buChar char="-"/>
+            </a:pPr>
+            <a:r>
+              <a:rPr lang="de-DE" dirty="0"/>
+              <a:t>Voller JEE 7 Support</a:t>
+            </a:r>
+          </a:p>
+          <a:p>
+            <a:pPr>
+              <a:buFontTx/>
+              <a:buChar char="-"/>
+            </a:pPr>
+            <a:r>
+              <a:rPr lang="de-DE" dirty="0" err="1"/>
+              <a:t>Wildfly</a:t>
+            </a:r>
+            <a:r>
+              <a:rPr lang="de-DE" dirty="0"/>
+              <a:t> (kaum) zu konfigurieren</a:t>
+            </a:r>
+          </a:p>
+          <a:p>
+            <a:pPr>
+              <a:buFontTx/>
+              <a:buChar char="-"/>
+            </a:pPr>
+            <a:r>
+              <a:rPr lang="de-DE" dirty="0"/>
+              <a:t>Live-Analyse und Diagramme während Benchmarking </a:t>
+            </a:r>
+            <a:r>
+              <a:rPr lang="de-DE"/>
+              <a:t>+ CSV-Generierung</a:t>
+            </a:r>
+            <a:endParaRPr lang="de-DE" dirty="0"/>
+          </a:p>
+        </p:txBody>
+      </p:sp>
+      <p:sp>
+        <p:nvSpPr>
+          <p:cNvPr id="4" name="Foliennummernplatzhalter 5"/>
+          <p:cNvSpPr>
+            <a:spLocks noGrp="1"/>
+          </p:cNvSpPr>
+          <p:nvPr>
+            <p:ph type="sldNum" sz="quarter" idx="12"/>
+          </p:nvPr>
+        </p:nvSpPr>
+        <p:spPr>
+          <a:xfrm>
+            <a:off x="8610600" y="6356350"/>
+            <a:ext cx="2743200" cy="365125"/>
+          </a:xfrm>
+        </p:spPr>
+        <p:txBody>
+          <a:bodyPr/>
+          <a:lstStyle/>
+          <a:p>
+            <a:fld id="{A2E1CED3-FDE9-4250-9543-5276860A4BAA}" type="slidenum">
+              <a:rPr lang="de-DE" smtClean="0"/>
+              <a:t>18</a:t>
+            </a:fld>
+            <a:endParaRPr lang="de-DE"/>
           </a:p>
         </p:txBody>
       </p:sp>
     </p:spTree>
     <p:extLst>
       <p:ext uri="{BB962C8B-B14F-4D97-AF65-F5344CB8AC3E}">
-        <p14:creationId xmlns:p14="http://schemas.microsoft.com/office/powerpoint/2010/main" val="1332557833"/>
+        <p14:creationId xmlns:p14="http://schemas.microsoft.com/office/powerpoint/2010/main" val="2656192203"/>
       </p:ext>
     </p:extLst>
   </p:cSld>
@@ -10111,12 +10417,8 @@
           <a:lstStyle/>
           <a:p>
             <a:r>
-              <a:rPr lang="de-DE" dirty="0" err="1"/>
-              <a:t>Benefits</a:t>
-            </a:r>
-            <a:r>
               <a:rPr lang="de-DE" dirty="0"/>
-              <a:t> – Moderne Businessanwendung</a:t>
+              <a:t>Chatanwendung</a:t>
             </a:r>
           </a:p>
         </p:txBody>
@@ -10134,132 +10436,70 @@
         <p:spPr/>
         <p:txBody>
           <a:bodyPr>
-            <a:normAutofit fontScale="92500"/>
+            <a:normAutofit/>
           </a:bodyPr>
           <a:lstStyle/>
           <a:p>
-            <a:pPr>
-              <a:buFontTx/>
-              <a:buChar char="-"/>
+            <a:pPr marL="0" indent="0" algn="ctr">
+              <a:buNone/>
             </a:pPr>
-            <a:r>
-              <a:rPr lang="de-DE" dirty="0"/>
-              <a:t>6 austauschbare Projekte mit sehr wenig Abhängigkeiten</a:t>
-            </a:r>
-          </a:p>
-          <a:p>
-            <a:pPr>
-              <a:buFontTx/>
-              <a:buChar char="-"/>
+            <a:endParaRPr lang="de-DE" dirty="0"/>
+          </a:p>
+          <a:p>
+            <a:pPr marL="0" indent="0" algn="ctr">
+              <a:buNone/>
             </a:pPr>
-            <a:r>
-              <a:rPr lang="de-DE" dirty="0"/>
-              <a:t>Automatische Generierung nativer .exe-Anwendungen zur </a:t>
-            </a:r>
-            <a:r>
-              <a:rPr lang="de-DE" dirty="0" err="1"/>
-              <a:t>Buildzeit</a:t>
-            </a:r>
             <a:endParaRPr lang="de-DE" dirty="0"/>
           </a:p>
           <a:p>
-            <a:pPr>
-              <a:buFontTx/>
-              <a:buChar char="-"/>
+            <a:pPr marL="0" indent="0" algn="ctr">
+              <a:buNone/>
             </a:pPr>
-            <a:r>
-              <a:rPr lang="de-DE" dirty="0"/>
-              <a:t>Setzt auf neusten </a:t>
-            </a:r>
-            <a:r>
-              <a:rPr lang="de-DE" dirty="0" err="1"/>
-              <a:t>Applikationserver</a:t>
-            </a:r>
-            <a:r>
-              <a:rPr lang="de-DE" dirty="0"/>
-              <a:t> (EAP7) und Bibliotheken</a:t>
-            </a:r>
-          </a:p>
-          <a:p>
-            <a:pPr>
-              <a:buFontTx/>
-              <a:buChar char="-"/>
+            <a:endParaRPr lang="de-DE" sz="1800" dirty="0"/>
+          </a:p>
+          <a:p>
+            <a:pPr marL="0" indent="0" algn="ctr">
+              <a:buNone/>
             </a:pPr>
             <a:r>
-              <a:rPr lang="de-DE" dirty="0"/>
-              <a:t>Skalierbares, performance-optimiertes Backend</a:t>
-            </a:r>
-          </a:p>
-          <a:p>
-            <a:pPr>
-              <a:buFontTx/>
-              <a:buChar char="-"/>
-            </a:pPr>
-            <a:r>
-              <a:rPr lang="de-DE" dirty="0"/>
-              <a:t>Überarbeitete, benutzerfreundliche und moderne UIs</a:t>
-            </a:r>
-          </a:p>
-          <a:p>
-            <a:pPr>
-              <a:buFontTx/>
-              <a:buChar char="-"/>
-            </a:pPr>
-            <a:r>
-              <a:rPr lang="de-DE" dirty="0"/>
-              <a:t>Automatisierte Unit- und Integrationstests zur </a:t>
-            </a:r>
-            <a:r>
-              <a:rPr lang="de-DE" dirty="0" err="1"/>
-              <a:t>Buildzeit</a:t>
-            </a:r>
-            <a:endParaRPr lang="de-DE" dirty="0"/>
-          </a:p>
-          <a:p>
-            <a:pPr>
-              <a:buFontTx/>
-              <a:buChar char="-"/>
-            </a:pPr>
-            <a:r>
-              <a:rPr lang="de-DE" dirty="0"/>
-              <a:t>Voller JEE 7 Support</a:t>
-            </a:r>
-          </a:p>
-          <a:p>
-            <a:pPr>
-              <a:buFontTx/>
-              <a:buChar char="-"/>
-            </a:pPr>
-            <a:r>
-              <a:rPr lang="de-DE" dirty="0" err="1"/>
-              <a:t>Wildfly</a:t>
-            </a:r>
-            <a:r>
-              <a:rPr lang="de-DE" dirty="0"/>
-              <a:t> (kaum) zu konfigurieren</a:t>
-            </a:r>
-          </a:p>
-          <a:p>
-            <a:pPr>
-              <a:buFontTx/>
-              <a:buChar char="-"/>
-            </a:pPr>
-            <a:r>
-              <a:rPr lang="de-DE" dirty="0"/>
-              <a:t>Live-Analyse und Diagramme während Benchmarking </a:t>
-            </a:r>
-            <a:r>
-              <a:rPr lang="de-DE"/>
-              <a:t>+ CSV-Generierung</a:t>
-            </a:r>
-            <a:endParaRPr lang="de-DE" dirty="0"/>
+              <a:rPr lang="de-DE" sz="6000" dirty="0"/>
+              <a:t>Live Demo</a:t>
+            </a:r>
+          </a:p>
+        </p:txBody>
+      </p:sp>
+      <p:sp>
+        <p:nvSpPr>
+          <p:cNvPr id="4" name="Foliennummernplatzhalter 5"/>
+          <p:cNvSpPr>
+            <a:spLocks noGrp="1"/>
+          </p:cNvSpPr>
+          <p:nvPr>
+            <p:ph type="sldNum" sz="quarter" idx="12"/>
+          </p:nvPr>
+        </p:nvSpPr>
+        <p:spPr>
+          <a:xfrm>
+            <a:off x="8610600" y="6356350"/>
+            <a:ext cx="2743200" cy="365125"/>
+          </a:xfrm>
+        </p:spPr>
+        <p:txBody>
+          <a:bodyPr/>
+          <a:lstStyle/>
+          <a:p>
+            <a:fld id="{A2E1CED3-FDE9-4250-9543-5276860A4BAA}" type="slidenum">
+              <a:rPr lang="de-DE" smtClean="0"/>
+              <a:t>19</a:t>
+            </a:fld>
+            <a:endParaRPr lang="de-DE"/>
           </a:p>
         </p:txBody>
       </p:sp>
     </p:spTree>
     <p:extLst>
       <p:ext uri="{BB962C8B-B14F-4D97-AF65-F5344CB8AC3E}">
-        <p14:creationId xmlns:p14="http://schemas.microsoft.com/office/powerpoint/2010/main" val="2656192203"/>
+        <p14:creationId xmlns:p14="http://schemas.microsoft.com/office/powerpoint/2010/main" val="3572337126"/>
       </p:ext>
     </p:extLst>
   </p:cSld>
@@ -10318,7 +10558,7 @@
             <p:ph idx="1"/>
             <p:extLst>
               <p:ext uri="{D42A27DB-BD31-4B8C-83A1-F6EECF244321}">
-                <p14:modId xmlns:p14="http://schemas.microsoft.com/office/powerpoint/2010/main" val="615517478"/>
+                <p14:modId xmlns:p14="http://schemas.microsoft.com/office/powerpoint/2010/main" val="1057670738"/>
               </p:ext>
             </p:extLst>
           </p:nvPr>
@@ -10333,107 +10573,38 @@
           </a:graphicData>
         </a:graphic>
       </p:graphicFrame>
+      <p:sp>
+        <p:nvSpPr>
+          <p:cNvPr id="4" name="Foliennummernplatzhalter 5"/>
+          <p:cNvSpPr>
+            <a:spLocks noGrp="1"/>
+          </p:cNvSpPr>
+          <p:nvPr>
+            <p:ph type="sldNum" sz="quarter" idx="12"/>
+          </p:nvPr>
+        </p:nvSpPr>
+        <p:spPr>
+          <a:xfrm>
+            <a:off x="8610600" y="6356350"/>
+            <a:ext cx="2743200" cy="365125"/>
+          </a:xfrm>
+        </p:spPr>
+        <p:txBody>
+          <a:bodyPr/>
+          <a:lstStyle/>
+          <a:p>
+            <a:fld id="{A2E1CED3-FDE9-4250-9543-5276860A4BAA}" type="slidenum">
+              <a:rPr lang="de-DE" smtClean="0"/>
+              <a:t>2</a:t>
+            </a:fld>
+            <a:endParaRPr lang="de-DE"/>
+          </a:p>
+        </p:txBody>
+      </p:sp>
     </p:spTree>
     <p:extLst>
       <p:ext uri="{BB962C8B-B14F-4D97-AF65-F5344CB8AC3E}">
         <p14:creationId xmlns:p14="http://schemas.microsoft.com/office/powerpoint/2010/main" val="954630480"/>
-      </p:ext>
-    </p:extLst>
-  </p:cSld>
-  <p:clrMapOvr>
-    <a:masterClrMapping/>
-  </p:clrMapOvr>
-</p:sld>
-</file>
-
-<file path=ppt/slides/slide20.xml><?xml version="1.0" encoding="utf-8"?>
-<p:sld xmlns:a="http://schemas.openxmlformats.org/drawingml/2006/main" xmlns:r="http://schemas.openxmlformats.org/officeDocument/2006/relationships" xmlns:p="http://schemas.openxmlformats.org/presentationml/2006/main">
-  <p:cSld>
-    <p:spTree>
-      <p:nvGrpSpPr>
-        <p:cNvPr id="1" name=""/>
-        <p:cNvGrpSpPr/>
-        <p:nvPr/>
-      </p:nvGrpSpPr>
-      <p:grpSpPr>
-        <a:xfrm>
-          <a:off x="0" y="0"/>
-          <a:ext cx="0" cy="0"/>
-          <a:chOff x="0" y="0"/>
-          <a:chExt cx="0" cy="0"/>
-        </a:xfrm>
-      </p:grpSpPr>
-      <p:sp>
-        <p:nvSpPr>
-          <p:cNvPr id="2" name="Titel 1"/>
-          <p:cNvSpPr>
-            <a:spLocks noGrp="1"/>
-          </p:cNvSpPr>
-          <p:nvPr>
-            <p:ph type="title"/>
-          </p:nvPr>
-        </p:nvSpPr>
-        <p:spPr/>
-        <p:txBody>
-          <a:bodyPr/>
-          <a:lstStyle/>
-          <a:p>
-            <a:r>
-              <a:rPr lang="de-DE" dirty="0"/>
-              <a:t>Chatanwendung</a:t>
-            </a:r>
-          </a:p>
-        </p:txBody>
-      </p:sp>
-      <p:sp>
-        <p:nvSpPr>
-          <p:cNvPr id="3" name="Inhaltsplatzhalter 2"/>
-          <p:cNvSpPr>
-            <a:spLocks noGrp="1"/>
-          </p:cNvSpPr>
-          <p:nvPr>
-            <p:ph idx="1"/>
-          </p:nvPr>
-        </p:nvSpPr>
-        <p:spPr/>
-        <p:txBody>
-          <a:bodyPr>
-            <a:normAutofit/>
-          </a:bodyPr>
-          <a:lstStyle/>
-          <a:p>
-            <a:pPr marL="0" indent="0" algn="ctr">
-              <a:buNone/>
-            </a:pPr>
-            <a:endParaRPr lang="de-DE" dirty="0"/>
-          </a:p>
-          <a:p>
-            <a:pPr marL="0" indent="0" algn="ctr">
-              <a:buNone/>
-            </a:pPr>
-            <a:endParaRPr lang="de-DE" dirty="0"/>
-          </a:p>
-          <a:p>
-            <a:pPr marL="0" indent="0" algn="ctr">
-              <a:buNone/>
-            </a:pPr>
-            <a:endParaRPr lang="de-DE" sz="1800" dirty="0"/>
-          </a:p>
-          <a:p>
-            <a:pPr marL="0" indent="0" algn="ctr">
-              <a:buNone/>
-            </a:pPr>
-            <a:r>
-              <a:rPr lang="de-DE" sz="6000" dirty="0"/>
-              <a:t>Live Demo</a:t>
-            </a:r>
-          </a:p>
-        </p:txBody>
-      </p:sp>
-    </p:spTree>
-    <p:extLst>
-      <p:ext uri="{BB962C8B-B14F-4D97-AF65-F5344CB8AC3E}">
-        <p14:creationId xmlns:p14="http://schemas.microsoft.com/office/powerpoint/2010/main" val="3572337126"/>
       </p:ext>
     </p:extLst>
   </p:cSld>
@@ -10500,6 +10671,34 @@
           <a:lstStyle/>
           <a:p>
             <a:endParaRPr lang="de-DE" dirty="0"/>
+          </a:p>
+        </p:txBody>
+      </p:sp>
+      <p:sp>
+        <p:nvSpPr>
+          <p:cNvPr id="4" name="Foliennummernplatzhalter 5"/>
+          <p:cNvSpPr>
+            <a:spLocks noGrp="1"/>
+          </p:cNvSpPr>
+          <p:nvPr>
+            <p:ph type="sldNum" sz="quarter" idx="12"/>
+          </p:nvPr>
+        </p:nvSpPr>
+        <p:spPr>
+          <a:xfrm>
+            <a:off x="8610600" y="6356350"/>
+            <a:ext cx="2743200" cy="365125"/>
+          </a:xfrm>
+        </p:spPr>
+        <p:txBody>
+          <a:bodyPr/>
+          <a:lstStyle/>
+          <a:p>
+            <a:fld id="{A2E1CED3-FDE9-4250-9543-5276860A4BAA}" type="slidenum">
+              <a:rPr lang="de-DE" smtClean="0"/>
+              <a:t>3</a:t>
+            </a:fld>
+            <a:endParaRPr lang="de-DE"/>
           </a:p>
         </p:txBody>
       </p:sp>
@@ -10663,6 +10862,34 @@
               <a:rPr lang="de-DE" dirty="0"/>
               <a:t> </a:t>
             </a:r>
+          </a:p>
+        </p:txBody>
+      </p:sp>
+      <p:sp>
+        <p:nvSpPr>
+          <p:cNvPr id="6" name="Foliennummernplatzhalter 5"/>
+          <p:cNvSpPr>
+            <a:spLocks noGrp="1"/>
+          </p:cNvSpPr>
+          <p:nvPr>
+            <p:ph type="sldNum" sz="quarter" idx="12"/>
+          </p:nvPr>
+        </p:nvSpPr>
+        <p:spPr>
+          <a:xfrm>
+            <a:off x="8610600" y="6356350"/>
+            <a:ext cx="2743200" cy="365125"/>
+          </a:xfrm>
+        </p:spPr>
+        <p:txBody>
+          <a:bodyPr/>
+          <a:lstStyle/>
+          <a:p>
+            <a:fld id="{A2E1CED3-FDE9-4250-9543-5276860A4BAA}" type="slidenum">
+              <a:rPr lang="de-DE" smtClean="0"/>
+              <a:t>4</a:t>
+            </a:fld>
+            <a:endParaRPr lang="de-DE"/>
           </a:p>
         </p:txBody>
       </p:sp>
@@ -11421,7 +11648,7 @@
         <p:spPr>
           <a:xfrm>
             <a:off x="333375" y="1292200"/>
-            <a:ext cx="2064604" cy="523220"/>
+            <a:ext cx="2857500" cy="523220"/>
           </a:xfrm>
           <a:prstGeom prst="rect">
             <a:avLst/>
@@ -11436,7 +11663,7 @@
           <a:p>
             <a:r>
               <a:rPr lang="de-DE" sz="2800" dirty="0"/>
-              <a:t>???</a:t>
+              <a:t>Verteiltes System</a:t>
             </a:r>
           </a:p>
         </p:txBody>
@@ -11575,9 +11802,10 @@
           <a:lstStyle/>
           <a:p>
             <a:r>
-              <a:rPr lang="de-DE" sz="2800" dirty="0"/>
-              <a:t>???</a:t>
-            </a:r>
+              <a:rPr lang="de-DE" sz="2800" dirty="0" err="1"/>
+              <a:t>Stateless</a:t>
+            </a:r>
+            <a:endParaRPr lang="de-DE" sz="2800" dirty="0"/>
           </a:p>
         </p:txBody>
       </p:sp>
@@ -11589,8 +11817,8 @@
         </p:nvSpPr>
         <p:spPr>
           <a:xfrm>
-            <a:off x="361950" y="3077049"/>
-            <a:ext cx="2629246" cy="369332"/>
+            <a:off x="361949" y="3077049"/>
+            <a:ext cx="2905849" cy="369332"/>
           </a:xfrm>
           <a:prstGeom prst="rect">
             <a:avLst/>
@@ -11605,7 +11833,7 @@
           <a:p>
             <a:r>
               <a:rPr lang="de-DE" dirty="0"/>
-              <a:t>???</a:t>
+              <a:t>Skalierbarkeit</a:t>
             </a:r>
           </a:p>
         </p:txBody>
@@ -11853,6 +12081,319 @@
           </a:prstGeom>
         </p:spPr>
       </p:pic>
+      <p:sp>
+        <p:nvSpPr>
+          <p:cNvPr id="32" name="Rechteck 31"/>
+          <p:cNvSpPr/>
+          <p:nvPr/>
+        </p:nvSpPr>
+        <p:spPr>
+          <a:xfrm>
+            <a:off x="11518041" y="534148"/>
+            <a:ext cx="3623239" cy="925637"/>
+          </a:xfrm>
+          <a:prstGeom prst="rect">
+            <a:avLst/>
+          </a:prstGeom>
+          <a:noFill/>
+        </p:spPr>
+        <p:style>
+          <a:lnRef idx="2">
+            <a:schemeClr val="accent1">
+              <a:shade val="50000"/>
+            </a:schemeClr>
+          </a:lnRef>
+          <a:fillRef idx="1">
+            <a:schemeClr val="accent1"/>
+          </a:fillRef>
+          <a:effectRef idx="0">
+            <a:schemeClr val="accent1"/>
+          </a:effectRef>
+          <a:fontRef idx="minor">
+            <a:schemeClr val="lt1"/>
+          </a:fontRef>
+        </p:style>
+        <p:txBody>
+          <a:bodyPr rtlCol="0" anchor="ctr"/>
+          <a:lstStyle/>
+          <a:p>
+            <a:pPr algn="ctr"/>
+            <a:endParaRPr lang="de-DE"/>
+          </a:p>
+        </p:txBody>
+      </p:sp>
+      <p:sp>
+        <p:nvSpPr>
+          <p:cNvPr id="33" name="Textfeld 32"/>
+          <p:cNvSpPr txBox="1"/>
+          <p:nvPr/>
+        </p:nvSpPr>
+        <p:spPr>
+          <a:xfrm>
+            <a:off x="11594241" y="538658"/>
+            <a:ext cx="2229906" cy="523220"/>
+          </a:xfrm>
+          <a:prstGeom prst="rect">
+            <a:avLst/>
+          </a:prstGeom>
+          <a:noFill/>
+        </p:spPr>
+        <p:txBody>
+          <a:bodyPr wrap="none" rtlCol="0">
+            <a:spAutoFit/>
+          </a:bodyPr>
+          <a:lstStyle/>
+          <a:p>
+            <a:r>
+              <a:rPr lang="de-DE" sz="2800" dirty="0"/>
+              <a:t>Lastverteilung</a:t>
+            </a:r>
+          </a:p>
+        </p:txBody>
+      </p:sp>
+      <p:sp>
+        <p:nvSpPr>
+          <p:cNvPr id="34" name="Textfeld 33"/>
+          <p:cNvSpPr txBox="1"/>
+          <p:nvPr/>
+        </p:nvSpPr>
+        <p:spPr>
+          <a:xfrm>
+            <a:off x="11518040" y="1061878"/>
+            <a:ext cx="3623239" cy="369332"/>
+          </a:xfrm>
+          <a:prstGeom prst="rect">
+            <a:avLst/>
+          </a:prstGeom>
+          <a:noFill/>
+        </p:spPr>
+        <p:txBody>
+          <a:bodyPr wrap="square" rtlCol="0">
+            <a:spAutoFit/>
+          </a:bodyPr>
+          <a:lstStyle/>
+          <a:p>
+            <a:r>
+              <a:rPr lang="de-DE" dirty="0"/>
+              <a:t>Durch </a:t>
+            </a:r>
+            <a:r>
+              <a:rPr lang="de-DE" dirty="0" err="1"/>
+              <a:t>Loadbalancing</a:t>
+            </a:r>
+            <a:r>
+              <a:rPr lang="de-DE" dirty="0"/>
+              <a:t> Arbeitsteilung</a:t>
+            </a:r>
+          </a:p>
+        </p:txBody>
+      </p:sp>
+      <p:sp>
+        <p:nvSpPr>
+          <p:cNvPr id="35" name="Rechteck 34"/>
+          <p:cNvSpPr/>
+          <p:nvPr/>
+        </p:nvSpPr>
+        <p:spPr>
+          <a:xfrm>
+            <a:off x="11518041" y="1692353"/>
+            <a:ext cx="3623239" cy="925637"/>
+          </a:xfrm>
+          <a:prstGeom prst="rect">
+            <a:avLst/>
+          </a:prstGeom>
+          <a:noFill/>
+        </p:spPr>
+        <p:style>
+          <a:lnRef idx="2">
+            <a:schemeClr val="accent1">
+              <a:shade val="50000"/>
+            </a:schemeClr>
+          </a:lnRef>
+          <a:fillRef idx="1">
+            <a:schemeClr val="accent1"/>
+          </a:fillRef>
+          <a:effectRef idx="0">
+            <a:schemeClr val="accent1"/>
+          </a:effectRef>
+          <a:fontRef idx="minor">
+            <a:schemeClr val="lt1"/>
+          </a:fontRef>
+        </p:style>
+        <p:txBody>
+          <a:bodyPr rtlCol="0" anchor="ctr"/>
+          <a:lstStyle/>
+          <a:p>
+            <a:pPr algn="ctr"/>
+            <a:endParaRPr lang="de-DE"/>
+          </a:p>
+        </p:txBody>
+      </p:sp>
+      <p:sp>
+        <p:nvSpPr>
+          <p:cNvPr id="36" name="Textfeld 35"/>
+          <p:cNvSpPr txBox="1"/>
+          <p:nvPr/>
+        </p:nvSpPr>
+        <p:spPr>
+          <a:xfrm>
+            <a:off x="11594241" y="1696863"/>
+            <a:ext cx="2593274" cy="523220"/>
+          </a:xfrm>
+          <a:prstGeom prst="rect">
+            <a:avLst/>
+          </a:prstGeom>
+          <a:noFill/>
+        </p:spPr>
+        <p:txBody>
+          <a:bodyPr wrap="none" rtlCol="0">
+            <a:spAutoFit/>
+          </a:bodyPr>
+          <a:lstStyle/>
+          <a:p>
+            <a:r>
+              <a:rPr lang="de-DE" sz="2800" dirty="0"/>
+              <a:t>Ausfallsicherheit</a:t>
+            </a:r>
+          </a:p>
+        </p:txBody>
+      </p:sp>
+      <p:sp>
+        <p:nvSpPr>
+          <p:cNvPr id="37" name="Textfeld 36"/>
+          <p:cNvSpPr txBox="1"/>
+          <p:nvPr/>
+        </p:nvSpPr>
+        <p:spPr>
+          <a:xfrm>
+            <a:off x="11518040" y="2220083"/>
+            <a:ext cx="3623239" cy="369332"/>
+          </a:xfrm>
+          <a:prstGeom prst="rect">
+            <a:avLst/>
+          </a:prstGeom>
+          <a:noFill/>
+        </p:spPr>
+        <p:txBody>
+          <a:bodyPr wrap="square" rtlCol="0">
+            <a:spAutoFit/>
+          </a:bodyPr>
+          <a:lstStyle/>
+          <a:p>
+            <a:r>
+              <a:rPr lang="de-DE" dirty="0"/>
+              <a:t>Mehrere Instanzen sichern Ausfall</a:t>
+            </a:r>
+          </a:p>
+        </p:txBody>
+      </p:sp>
+      <p:sp>
+        <p:nvSpPr>
+          <p:cNvPr id="38" name="Rechteck 37"/>
+          <p:cNvSpPr/>
+          <p:nvPr/>
+        </p:nvSpPr>
+        <p:spPr>
+          <a:xfrm>
+            <a:off x="11518040" y="2821983"/>
+            <a:ext cx="3623239" cy="925637"/>
+          </a:xfrm>
+          <a:prstGeom prst="rect">
+            <a:avLst/>
+          </a:prstGeom>
+          <a:noFill/>
+        </p:spPr>
+        <p:style>
+          <a:lnRef idx="2">
+            <a:schemeClr val="accent1">
+              <a:shade val="50000"/>
+            </a:schemeClr>
+          </a:lnRef>
+          <a:fillRef idx="1">
+            <a:schemeClr val="accent1"/>
+          </a:fillRef>
+          <a:effectRef idx="0">
+            <a:schemeClr val="accent1"/>
+          </a:effectRef>
+          <a:fontRef idx="minor">
+            <a:schemeClr val="lt1"/>
+          </a:fontRef>
+        </p:style>
+        <p:txBody>
+          <a:bodyPr rtlCol="0" anchor="ctr"/>
+          <a:lstStyle/>
+          <a:p>
+            <a:pPr algn="ctr"/>
+            <a:endParaRPr lang="de-DE"/>
+          </a:p>
+        </p:txBody>
+      </p:sp>
+      <p:sp>
+        <p:nvSpPr>
+          <p:cNvPr id="39" name="Textfeld 38"/>
+          <p:cNvSpPr txBox="1"/>
+          <p:nvPr/>
+        </p:nvSpPr>
+        <p:spPr>
+          <a:xfrm>
+            <a:off x="11594240" y="2826493"/>
+            <a:ext cx="2162708" cy="523220"/>
+          </a:xfrm>
+          <a:prstGeom prst="rect">
+            <a:avLst/>
+          </a:prstGeom>
+          <a:noFill/>
+        </p:spPr>
+        <p:txBody>
+          <a:bodyPr wrap="none" rtlCol="0">
+            <a:spAutoFit/>
+          </a:bodyPr>
+          <a:lstStyle/>
+          <a:p>
+            <a:r>
+              <a:rPr lang="de-DE" sz="2800" dirty="0"/>
+              <a:t>Skalierbarkeit</a:t>
+            </a:r>
+          </a:p>
+        </p:txBody>
+      </p:sp>
+      <p:sp>
+        <p:nvSpPr>
+          <p:cNvPr id="40" name="Textfeld 39"/>
+          <p:cNvSpPr txBox="1"/>
+          <p:nvPr/>
+        </p:nvSpPr>
+        <p:spPr>
+          <a:xfrm>
+            <a:off x="11518039" y="3349713"/>
+            <a:ext cx="3623239" cy="369332"/>
+          </a:xfrm>
+          <a:prstGeom prst="rect">
+            <a:avLst/>
+          </a:prstGeom>
+          <a:noFill/>
+        </p:spPr>
+        <p:txBody>
+          <a:bodyPr wrap="square" rtlCol="0">
+            <a:spAutoFit/>
+          </a:bodyPr>
+          <a:lstStyle/>
+          <a:p>
+            <a:r>
+              <a:rPr lang="de-DE" dirty="0"/>
+              <a:t>Horizontal (</a:t>
+            </a:r>
+            <a:r>
+              <a:rPr lang="de-DE" dirty="0" err="1"/>
+              <a:t>Scale</a:t>
+            </a:r>
+            <a:r>
+              <a:rPr lang="de-DE" dirty="0"/>
+              <a:t> out)</a:t>
+            </a:r>
+          </a:p>
+        </p:txBody>
+      </p:sp>
     </p:spTree>
     <p:extLst>
       <p:ext uri="{BB962C8B-B14F-4D97-AF65-F5344CB8AC3E}">
@@ -12609,6 +13150,34 @@
           </a:p>
         </p:txBody>
       </p:sp>
+      <p:sp>
+        <p:nvSpPr>
+          <p:cNvPr id="28" name="Foliennummernplatzhalter 5"/>
+          <p:cNvSpPr>
+            <a:spLocks noGrp="1"/>
+          </p:cNvSpPr>
+          <p:nvPr>
+            <p:ph type="sldNum" sz="quarter" idx="12"/>
+          </p:nvPr>
+        </p:nvSpPr>
+        <p:spPr>
+          <a:xfrm>
+            <a:off x="8610600" y="6356350"/>
+            <a:ext cx="2743200" cy="365125"/>
+          </a:xfrm>
+        </p:spPr>
+        <p:txBody>
+          <a:bodyPr/>
+          <a:lstStyle/>
+          <a:p>
+            <a:fld id="{A2E1CED3-FDE9-4250-9543-5276860A4BAA}" type="slidenum">
+              <a:rPr lang="de-DE" smtClean="0"/>
+              <a:t>7</a:t>
+            </a:fld>
+            <a:endParaRPr lang="de-DE"/>
+          </a:p>
+        </p:txBody>
+      </p:sp>
     </p:spTree>
     <p:extLst>
       <p:ext uri="{BB962C8B-B14F-4D97-AF65-F5344CB8AC3E}">
@@ -12623,416 +13192,6 @@
 </file>
 
 <file path=ppt/slides/slide8.xml><?xml version="1.0" encoding="utf-8"?>
-<p:sld xmlns:a="http://schemas.openxmlformats.org/drawingml/2006/main" xmlns:r="http://schemas.openxmlformats.org/officeDocument/2006/relationships" xmlns:p="http://schemas.openxmlformats.org/presentationml/2006/main">
-  <p:cSld>
-    <p:spTree>
-      <p:nvGrpSpPr>
-        <p:cNvPr id="1" name=""/>
-        <p:cNvGrpSpPr/>
-        <p:nvPr/>
-      </p:nvGrpSpPr>
-      <p:grpSpPr>
-        <a:xfrm>
-          <a:off x="0" y="0"/>
-          <a:ext cx="0" cy="0"/>
-          <a:chOff x="0" y="0"/>
-          <a:chExt cx="0" cy="0"/>
-        </a:xfrm>
-      </p:grpSpPr>
-      <p:sp>
-        <p:nvSpPr>
-          <p:cNvPr id="2" name="Titel 1"/>
-          <p:cNvSpPr>
-            <a:spLocks noGrp="1"/>
-          </p:cNvSpPr>
-          <p:nvPr>
-            <p:ph type="title"/>
-          </p:nvPr>
-        </p:nvSpPr>
-        <p:spPr/>
-        <p:txBody>
-          <a:bodyPr/>
-          <a:lstStyle/>
-          <a:p>
-            <a:r>
-              <a:rPr lang="de-DE" dirty="0"/>
-              <a:t>Architekturverbesserungen – Zustandslos</a:t>
-            </a:r>
-          </a:p>
-        </p:txBody>
-      </p:sp>
-      <p:sp>
-        <p:nvSpPr>
-          <p:cNvPr id="5" name="Rechteck 4"/>
-          <p:cNvSpPr/>
-          <p:nvPr/>
-        </p:nvSpPr>
-        <p:spPr>
-          <a:xfrm>
-            <a:off x="7730561" y="2963491"/>
-            <a:ext cx="3623239" cy="925637"/>
-          </a:xfrm>
-          <a:prstGeom prst="rect">
-            <a:avLst/>
-          </a:prstGeom>
-          <a:noFill/>
-        </p:spPr>
-        <p:style>
-          <a:lnRef idx="2">
-            <a:schemeClr val="accent1">
-              <a:shade val="50000"/>
-            </a:schemeClr>
-          </a:lnRef>
-          <a:fillRef idx="1">
-            <a:schemeClr val="accent1"/>
-          </a:fillRef>
-          <a:effectRef idx="0">
-            <a:schemeClr val="accent1"/>
-          </a:effectRef>
-          <a:fontRef idx="minor">
-            <a:schemeClr val="lt1"/>
-          </a:fontRef>
-        </p:style>
-        <p:txBody>
-          <a:bodyPr rtlCol="0" anchor="ctr"/>
-          <a:lstStyle/>
-          <a:p>
-            <a:pPr algn="ctr"/>
-            <a:endParaRPr lang="de-DE"/>
-          </a:p>
-        </p:txBody>
-      </p:sp>
-      <p:sp>
-        <p:nvSpPr>
-          <p:cNvPr id="6" name="Textfeld 5"/>
-          <p:cNvSpPr txBox="1"/>
-          <p:nvPr/>
-        </p:nvSpPr>
-        <p:spPr>
-          <a:xfrm>
-            <a:off x="7806761" y="2968001"/>
-            <a:ext cx="2229906" cy="523220"/>
-          </a:xfrm>
-          <a:prstGeom prst="rect">
-            <a:avLst/>
-          </a:prstGeom>
-          <a:noFill/>
-        </p:spPr>
-        <p:txBody>
-          <a:bodyPr wrap="none" rtlCol="0">
-            <a:spAutoFit/>
-          </a:bodyPr>
-          <a:lstStyle/>
-          <a:p>
-            <a:r>
-              <a:rPr lang="de-DE" sz="2800" dirty="0"/>
-              <a:t>Lastverteilung</a:t>
-            </a:r>
-          </a:p>
-        </p:txBody>
-      </p:sp>
-      <p:sp>
-        <p:nvSpPr>
-          <p:cNvPr id="7" name="Textfeld 6"/>
-          <p:cNvSpPr txBox="1"/>
-          <p:nvPr/>
-        </p:nvSpPr>
-        <p:spPr>
-          <a:xfrm>
-            <a:off x="7730560" y="3491221"/>
-            <a:ext cx="3623239" cy="369332"/>
-          </a:xfrm>
-          <a:prstGeom prst="rect">
-            <a:avLst/>
-          </a:prstGeom>
-          <a:noFill/>
-        </p:spPr>
-        <p:txBody>
-          <a:bodyPr wrap="square" rtlCol="0">
-            <a:spAutoFit/>
-          </a:bodyPr>
-          <a:lstStyle/>
-          <a:p>
-            <a:r>
-              <a:rPr lang="de-DE" dirty="0"/>
-              <a:t>Durch </a:t>
-            </a:r>
-            <a:r>
-              <a:rPr lang="de-DE" dirty="0" err="1"/>
-              <a:t>Loadbalancing</a:t>
-            </a:r>
-            <a:r>
-              <a:rPr lang="de-DE" dirty="0"/>
-              <a:t> Arbeitsteilung</a:t>
-            </a:r>
-          </a:p>
-        </p:txBody>
-      </p:sp>
-      <p:sp>
-        <p:nvSpPr>
-          <p:cNvPr id="17" name="Inhaltsplatzhalter 16"/>
-          <p:cNvSpPr>
-            <a:spLocks noGrp="1"/>
-          </p:cNvSpPr>
-          <p:nvPr>
-            <p:ph idx="1"/>
-          </p:nvPr>
-        </p:nvSpPr>
-        <p:spPr>
-          <a:xfrm>
-            <a:off x="838200" y="1684962"/>
-            <a:ext cx="6819900" cy="4492001"/>
-          </a:xfrm>
-        </p:spPr>
-        <p:txBody>
-          <a:bodyPr/>
-          <a:lstStyle/>
-          <a:p>
-            <a:r>
-              <a:rPr lang="de-DE" dirty="0"/>
-              <a:t>Nicht </a:t>
-            </a:r>
-            <a:r>
-              <a:rPr lang="de-DE" dirty="0" err="1"/>
-              <a:t>Stateful</a:t>
-            </a:r>
-            <a:endParaRPr lang="de-DE" dirty="0"/>
-          </a:p>
-          <a:p>
-            <a:r>
-              <a:rPr lang="de-DE" dirty="0" err="1"/>
-              <a:t>Stateless</a:t>
-            </a:r>
-            <a:endParaRPr lang="de-DE" dirty="0"/>
-          </a:p>
-          <a:p>
-            <a:r>
-              <a:rPr lang="de-DE" dirty="0"/>
-              <a:t>Warum? -------------------------------&gt;</a:t>
-            </a:r>
-          </a:p>
-        </p:txBody>
-      </p:sp>
-      <p:sp>
-        <p:nvSpPr>
-          <p:cNvPr id="28" name="Rechteck 27"/>
-          <p:cNvSpPr/>
-          <p:nvPr/>
-        </p:nvSpPr>
-        <p:spPr>
-          <a:xfrm>
-            <a:off x="7730561" y="4121696"/>
-            <a:ext cx="3623239" cy="925637"/>
-          </a:xfrm>
-          <a:prstGeom prst="rect">
-            <a:avLst/>
-          </a:prstGeom>
-          <a:noFill/>
-        </p:spPr>
-        <p:style>
-          <a:lnRef idx="2">
-            <a:schemeClr val="accent1">
-              <a:shade val="50000"/>
-            </a:schemeClr>
-          </a:lnRef>
-          <a:fillRef idx="1">
-            <a:schemeClr val="accent1"/>
-          </a:fillRef>
-          <a:effectRef idx="0">
-            <a:schemeClr val="accent1"/>
-          </a:effectRef>
-          <a:fontRef idx="minor">
-            <a:schemeClr val="lt1"/>
-          </a:fontRef>
-        </p:style>
-        <p:txBody>
-          <a:bodyPr rtlCol="0" anchor="ctr"/>
-          <a:lstStyle/>
-          <a:p>
-            <a:pPr algn="ctr"/>
-            <a:endParaRPr lang="de-DE"/>
-          </a:p>
-        </p:txBody>
-      </p:sp>
-      <p:sp>
-        <p:nvSpPr>
-          <p:cNvPr id="29" name="Textfeld 28"/>
-          <p:cNvSpPr txBox="1"/>
-          <p:nvPr/>
-        </p:nvSpPr>
-        <p:spPr>
-          <a:xfrm>
-            <a:off x="7806761" y="4126206"/>
-            <a:ext cx="2593274" cy="523220"/>
-          </a:xfrm>
-          <a:prstGeom prst="rect">
-            <a:avLst/>
-          </a:prstGeom>
-          <a:noFill/>
-        </p:spPr>
-        <p:txBody>
-          <a:bodyPr wrap="none" rtlCol="0">
-            <a:spAutoFit/>
-          </a:bodyPr>
-          <a:lstStyle/>
-          <a:p>
-            <a:r>
-              <a:rPr lang="de-DE" sz="2800" dirty="0"/>
-              <a:t>Ausfallsicherheit</a:t>
-            </a:r>
-          </a:p>
-        </p:txBody>
-      </p:sp>
-      <p:sp>
-        <p:nvSpPr>
-          <p:cNvPr id="30" name="Textfeld 29"/>
-          <p:cNvSpPr txBox="1"/>
-          <p:nvPr/>
-        </p:nvSpPr>
-        <p:spPr>
-          <a:xfrm>
-            <a:off x="7730560" y="4649426"/>
-            <a:ext cx="3623239" cy="369332"/>
-          </a:xfrm>
-          <a:prstGeom prst="rect">
-            <a:avLst/>
-          </a:prstGeom>
-          <a:noFill/>
-        </p:spPr>
-        <p:txBody>
-          <a:bodyPr wrap="square" rtlCol="0">
-            <a:spAutoFit/>
-          </a:bodyPr>
-          <a:lstStyle/>
-          <a:p>
-            <a:r>
-              <a:rPr lang="de-DE" dirty="0"/>
-              <a:t>Mehrere Instanzen sichern Ausfall</a:t>
-            </a:r>
-          </a:p>
-        </p:txBody>
-      </p:sp>
-      <p:sp>
-        <p:nvSpPr>
-          <p:cNvPr id="31" name="Rechteck 30"/>
-          <p:cNvSpPr/>
-          <p:nvPr/>
-        </p:nvSpPr>
-        <p:spPr>
-          <a:xfrm>
-            <a:off x="7730560" y="5251326"/>
-            <a:ext cx="3623239" cy="925637"/>
-          </a:xfrm>
-          <a:prstGeom prst="rect">
-            <a:avLst/>
-          </a:prstGeom>
-          <a:noFill/>
-        </p:spPr>
-        <p:style>
-          <a:lnRef idx="2">
-            <a:schemeClr val="accent1">
-              <a:shade val="50000"/>
-            </a:schemeClr>
-          </a:lnRef>
-          <a:fillRef idx="1">
-            <a:schemeClr val="accent1"/>
-          </a:fillRef>
-          <a:effectRef idx="0">
-            <a:schemeClr val="accent1"/>
-          </a:effectRef>
-          <a:fontRef idx="minor">
-            <a:schemeClr val="lt1"/>
-          </a:fontRef>
-        </p:style>
-        <p:txBody>
-          <a:bodyPr rtlCol="0" anchor="ctr"/>
-          <a:lstStyle/>
-          <a:p>
-            <a:pPr algn="ctr"/>
-            <a:endParaRPr lang="de-DE"/>
-          </a:p>
-        </p:txBody>
-      </p:sp>
-      <p:sp>
-        <p:nvSpPr>
-          <p:cNvPr id="32" name="Textfeld 31"/>
-          <p:cNvSpPr txBox="1"/>
-          <p:nvPr/>
-        </p:nvSpPr>
-        <p:spPr>
-          <a:xfrm>
-            <a:off x="7806760" y="5255836"/>
-            <a:ext cx="2162708" cy="523220"/>
-          </a:xfrm>
-          <a:prstGeom prst="rect">
-            <a:avLst/>
-          </a:prstGeom>
-          <a:noFill/>
-        </p:spPr>
-        <p:txBody>
-          <a:bodyPr wrap="none" rtlCol="0">
-            <a:spAutoFit/>
-          </a:bodyPr>
-          <a:lstStyle/>
-          <a:p>
-            <a:r>
-              <a:rPr lang="de-DE" sz="2800" dirty="0"/>
-              <a:t>Skalierbarkeit</a:t>
-            </a:r>
-          </a:p>
-        </p:txBody>
-      </p:sp>
-      <p:sp>
-        <p:nvSpPr>
-          <p:cNvPr id="33" name="Textfeld 32"/>
-          <p:cNvSpPr txBox="1"/>
-          <p:nvPr/>
-        </p:nvSpPr>
-        <p:spPr>
-          <a:xfrm>
-            <a:off x="7730559" y="5779056"/>
-            <a:ext cx="3623239" cy="369332"/>
-          </a:xfrm>
-          <a:prstGeom prst="rect">
-            <a:avLst/>
-          </a:prstGeom>
-          <a:noFill/>
-        </p:spPr>
-        <p:txBody>
-          <a:bodyPr wrap="square" rtlCol="0">
-            <a:spAutoFit/>
-          </a:bodyPr>
-          <a:lstStyle/>
-          <a:p>
-            <a:r>
-              <a:rPr lang="de-DE" dirty="0"/>
-              <a:t>Horizontal (</a:t>
-            </a:r>
-            <a:r>
-              <a:rPr lang="de-DE" dirty="0" err="1"/>
-              <a:t>Scale</a:t>
-            </a:r>
-            <a:r>
-              <a:rPr lang="de-DE" dirty="0"/>
-              <a:t> out)</a:t>
-            </a:r>
-          </a:p>
-        </p:txBody>
-      </p:sp>
-    </p:spTree>
-    <p:extLst>
-      <p:ext uri="{BB962C8B-B14F-4D97-AF65-F5344CB8AC3E}">
-        <p14:creationId xmlns:p14="http://schemas.microsoft.com/office/powerpoint/2010/main" val="2935307033"/>
-      </p:ext>
-    </p:extLst>
-  </p:cSld>
-  <p:clrMapOvr>
-    <a:masterClrMapping/>
-  </p:clrMapOvr>
-</p:sld>
-</file>
-
-<file path=ppt/slides/slide9.xml><?xml version="1.0" encoding="utf-8"?>
 <p:sld xmlns:a="http://schemas.openxmlformats.org/drawingml/2006/main" xmlns:r="http://schemas.openxmlformats.org/officeDocument/2006/relationships" xmlns:p="http://schemas.openxmlformats.org/presentationml/2006/main">
   <p:cSld>
     <p:spTree>
@@ -14556,6 +14715,34 @@
           </a:p>
         </p:txBody>
       </p:sp>
+      <p:sp>
+        <p:nvSpPr>
+          <p:cNvPr id="17" name="Foliennummernplatzhalter 5"/>
+          <p:cNvSpPr>
+            <a:spLocks noGrp="1"/>
+          </p:cNvSpPr>
+          <p:nvPr>
+            <p:ph type="sldNum" sz="quarter" idx="12"/>
+          </p:nvPr>
+        </p:nvSpPr>
+        <p:spPr>
+          <a:xfrm>
+            <a:off x="8610600" y="6356350"/>
+            <a:ext cx="2743200" cy="365125"/>
+          </a:xfrm>
+        </p:spPr>
+        <p:txBody>
+          <a:bodyPr/>
+          <a:lstStyle/>
+          <a:p>
+            <a:fld id="{A2E1CED3-FDE9-4250-9543-5276860A4BAA}" type="slidenum">
+              <a:rPr lang="de-DE" smtClean="0"/>
+              <a:t>8</a:t>
+            </a:fld>
+            <a:endParaRPr lang="de-DE"/>
+          </a:p>
+        </p:txBody>
+      </p:sp>
     </p:spTree>
     <p:extLst>
       <p:ext uri="{BB962C8B-B14F-4D97-AF65-F5344CB8AC3E}">
@@ -14672,6 +14859,188 @@
       <p:bldP spid="16" grpId="0"/>
     </p:bldLst>
   </p:timing>
+</p:sld>
+</file>
+
+<file path=ppt/slides/slide9.xml><?xml version="1.0" encoding="utf-8"?>
+<p:sld xmlns:a="http://schemas.openxmlformats.org/drawingml/2006/main" xmlns:r="http://schemas.openxmlformats.org/officeDocument/2006/relationships" xmlns:p="http://schemas.openxmlformats.org/presentationml/2006/main">
+  <p:cSld>
+    <p:spTree>
+      <p:nvGrpSpPr>
+        <p:cNvPr id="1" name=""/>
+        <p:cNvGrpSpPr/>
+        <p:nvPr/>
+      </p:nvGrpSpPr>
+      <p:grpSpPr>
+        <a:xfrm>
+          <a:off x="0" y="0"/>
+          <a:ext cx="0" cy="0"/>
+          <a:chOff x="0" y="0"/>
+          <a:chExt cx="0" cy="0"/>
+        </a:xfrm>
+      </p:grpSpPr>
+      <p:sp>
+        <p:nvSpPr>
+          <p:cNvPr id="2" name="Titel 1"/>
+          <p:cNvSpPr>
+            <a:spLocks noGrp="1"/>
+          </p:cNvSpPr>
+          <p:nvPr>
+            <p:ph type="title"/>
+          </p:nvPr>
+        </p:nvSpPr>
+        <p:spPr/>
+        <p:txBody>
+          <a:bodyPr/>
+          <a:lstStyle/>
+          <a:p>
+            <a:r>
+              <a:rPr lang="de-DE" dirty="0"/>
+              <a:t>Verteilte XA-Transaktion</a:t>
+            </a:r>
+            <a:endParaRPr lang="en-US" dirty="0"/>
+          </a:p>
+        </p:txBody>
+      </p:sp>
+      <p:sp>
+        <p:nvSpPr>
+          <p:cNvPr id="3" name="Inhaltsplatzhalter 2"/>
+          <p:cNvSpPr>
+            <a:spLocks noGrp="1"/>
+          </p:cNvSpPr>
+          <p:nvPr>
+            <p:ph idx="1"/>
+          </p:nvPr>
+        </p:nvSpPr>
+        <p:spPr/>
+        <p:txBody>
+          <a:bodyPr/>
+          <a:lstStyle/>
+          <a:p>
+            <a:r>
+              <a:rPr lang="de-DE" dirty="0"/>
+              <a:t>Container </a:t>
+            </a:r>
+            <a:r>
+              <a:rPr lang="de-DE" dirty="0" err="1"/>
+              <a:t>Managed</a:t>
+            </a:r>
+            <a:r>
+              <a:rPr lang="de-DE" dirty="0"/>
+              <a:t> Transaction</a:t>
+            </a:r>
+          </a:p>
+          <a:p>
+            <a:r>
+              <a:rPr lang="de-DE" dirty="0"/>
+              <a:t>Koordination der Transaktionen zur </a:t>
+            </a:r>
+            <a:r>
+              <a:rPr lang="de-DE" dirty="0" err="1"/>
+              <a:t>Persistierung</a:t>
+            </a:r>
+            <a:r>
+              <a:rPr lang="de-DE" dirty="0"/>
+              <a:t> in </a:t>
+            </a:r>
+            <a:r>
+              <a:rPr lang="de-DE" dirty="0" err="1"/>
+              <a:t>TraceDB</a:t>
+            </a:r>
+            <a:r>
+              <a:rPr lang="de-DE" dirty="0"/>
+              <a:t> und </a:t>
+            </a:r>
+            <a:r>
+              <a:rPr lang="de-DE" dirty="0" err="1"/>
+              <a:t>CountDB</a:t>
+            </a:r>
+            <a:r>
+              <a:rPr lang="de-DE" dirty="0"/>
+              <a:t> durch EJB Container</a:t>
+            </a:r>
+          </a:p>
+          <a:p>
+            <a:r>
+              <a:rPr lang="de-DE" dirty="0" err="1"/>
+              <a:t>Exceptions</a:t>
+            </a:r>
+            <a:r>
+              <a:rPr lang="de-DE" dirty="0"/>
+              <a:t> werden zur Message-</a:t>
+            </a:r>
+            <a:r>
+              <a:rPr lang="de-DE" dirty="0" err="1"/>
+              <a:t>Driven</a:t>
+            </a:r>
+            <a:r>
+              <a:rPr lang="de-DE" dirty="0"/>
+              <a:t>-Bean gereicht, von dort wird die Transaktion für ein Rollback markiert</a:t>
+            </a:r>
+          </a:p>
+          <a:p>
+            <a:r>
+              <a:rPr lang="de-DE" dirty="0"/>
+              <a:t>Definition der Datenbanken als XA-</a:t>
+            </a:r>
+            <a:r>
+              <a:rPr lang="de-DE" dirty="0" err="1"/>
+              <a:t>Datasources</a:t>
+            </a:r>
+            <a:r>
+              <a:rPr lang="de-DE" dirty="0"/>
+              <a:t> am </a:t>
+            </a:r>
+            <a:r>
+              <a:rPr lang="de-DE" dirty="0" err="1"/>
+              <a:t>Wildfly</a:t>
+            </a:r>
+            <a:r>
+              <a:rPr lang="de-DE" dirty="0"/>
+              <a:t> (dynamisch per mysql-ds.xml)</a:t>
+            </a:r>
+            <a:endParaRPr lang="en-US" dirty="0"/>
+          </a:p>
+        </p:txBody>
+      </p:sp>
+      <p:sp>
+        <p:nvSpPr>
+          <p:cNvPr id="4" name="Foliennummernplatzhalter 5"/>
+          <p:cNvSpPr>
+            <a:spLocks noGrp="1"/>
+          </p:cNvSpPr>
+          <p:nvPr>
+            <p:ph type="sldNum" sz="quarter" idx="12"/>
+          </p:nvPr>
+        </p:nvSpPr>
+        <p:spPr>
+          <a:xfrm>
+            <a:off x="8610600" y="6356350"/>
+            <a:ext cx="2743200" cy="365125"/>
+          </a:xfrm>
+        </p:spPr>
+        <p:txBody>
+          <a:bodyPr/>
+          <a:lstStyle/>
+          <a:p>
+            <a:fld id="{A2E1CED3-FDE9-4250-9543-5276860A4BAA}" type="slidenum">
+              <a:rPr lang="de-DE" smtClean="0"/>
+              <a:t>9</a:t>
+            </a:fld>
+            <a:endParaRPr lang="de-DE"/>
+          </a:p>
+        </p:txBody>
+      </p:sp>
+    </p:spTree>
+    <p:extLst>
+      <p:ext uri="{BB962C8B-B14F-4D97-AF65-F5344CB8AC3E}">
+        <p14:creationId xmlns:p14="http://schemas.microsoft.com/office/powerpoint/2010/main" val="2050278402"/>
+      </p:ext>
+    </p:extLst>
+  </p:cSld>
+  <p:clrMapOvr>
+    <a:masterClrMapping/>
+  </p:clrMapOvr>
 </p:sld>
 </file>
 

</xml_diff>

<commit_message>
neue neue neue neue Version
</commit_message>
<xml_diff>
--- a/dokumentation/vortrag.pptx
+++ b/dokumentation/vortrag.pptx
@@ -198,7 +198,7 @@
               <a:cs typeface="+mn-cs"/>
             </a:defRPr>
           </a:pPr>
-          <a:endParaRPr lang="en-US"/>
+          <a:endParaRPr lang="de-DE"/>
         </a:p>
       </c:txPr>
     </c:title>
@@ -589,7 +589,7 @@
                 <a:cs typeface="+mn-cs"/>
               </a:defRPr>
             </a:pPr>
-            <a:endParaRPr lang="en-US"/>
+            <a:endParaRPr lang="de-DE"/>
           </a:p>
         </c:txPr>
         <c:crossAx val="559834752"/>
@@ -651,7 +651,7 @@
                 <a:cs typeface="+mn-cs"/>
               </a:defRPr>
             </a:pPr>
-            <a:endParaRPr lang="en-US"/>
+            <a:endParaRPr lang="de-DE"/>
           </a:p>
         </c:txPr>
         <c:crossAx val="559829832"/>
@@ -693,7 +693,7 @@
               <a:cs typeface="+mn-cs"/>
             </a:defRPr>
           </a:pPr>
-          <a:endParaRPr lang="en-US"/>
+          <a:endParaRPr lang="de-DE"/>
         </a:p>
       </c:txPr>
     </c:legend>
@@ -715,7 +715,7 @@
       <a:pPr>
         <a:defRPr sz="1200"/>
       </a:pPr>
-      <a:endParaRPr lang="en-US"/>
+      <a:endParaRPr lang="de-DE"/>
     </a:p>
   </c:txPr>
   <c:externalData r:id="rId3">
@@ -11700,7 +11700,7 @@
       </p:grpSpPr>
       <p:grpSp>
         <p:nvGrpSpPr>
-          <p:cNvPr id="6" name="Gruppieren 5"/>
+          <p:cNvPr id="41" name="Gruppieren 40"/>
           <p:cNvGrpSpPr/>
           <p:nvPr/>
         </p:nvGrpSpPr>
@@ -11714,7 +11714,7 @@
         </p:grpSpPr>
         <p:pic>
           <p:nvPicPr>
-            <p:cNvPr id="3" name="Grafik 2"/>
+            <p:cNvPr id="42" name="Grafik 41"/>
             <p:cNvPicPr>
               <a:picLocks noChangeAspect="1"/>
             </p:cNvPicPr>
@@ -11743,7 +11743,7 @@
         </p:pic>
         <p:sp>
           <p:nvSpPr>
-            <p:cNvPr id="5" name="Rechteck 4"/>
+            <p:cNvPr id="43" name="Rechteck 42"/>
             <p:cNvSpPr/>
             <p:nvPr/>
           </p:nvSpPr>
@@ -11792,7 +11792,7 @@
       </p:grpSp>
       <p:sp>
         <p:nvSpPr>
-          <p:cNvPr id="7" name="Rechteck 6"/>
+          <p:cNvPr id="44" name="Rechteck 43"/>
           <p:cNvSpPr/>
           <p:nvPr/>
         </p:nvSpPr>
@@ -11840,7 +11840,7 @@
       </p:sp>
       <p:sp>
         <p:nvSpPr>
-          <p:cNvPr id="2" name="Titel 1"/>
+          <p:cNvPr id="45" name="Titel 1"/>
           <p:cNvSpPr>
             <a:spLocks noGrp="1"/>
           </p:cNvSpPr>
@@ -11848,7 +11848,12 @@
             <p:ph type="title"/>
           </p:nvPr>
         </p:nvSpPr>
-        <p:spPr/>
+        <p:spPr>
+          <a:xfrm>
+            <a:off x="838200" y="211015"/>
+            <a:ext cx="10515600" cy="1325563"/>
+          </a:xfrm>
+        </p:spPr>
         <p:txBody>
           <a:bodyPr/>
           <a:lstStyle/>
@@ -11862,7 +11867,7 @@
       </p:sp>
       <p:sp>
         <p:nvSpPr>
-          <p:cNvPr id="18" name="Rechteck 17"/>
+          <p:cNvPr id="46" name="Rechteck 45"/>
           <p:cNvSpPr/>
           <p:nvPr/>
         </p:nvSpPr>
@@ -11903,7 +11908,7 @@
       </p:sp>
       <p:sp>
         <p:nvSpPr>
-          <p:cNvPr id="19" name="Textfeld 18"/>
+          <p:cNvPr id="47" name="Textfeld 46"/>
           <p:cNvSpPr txBox="1"/>
           <p:nvPr/>
         </p:nvSpPr>
@@ -11932,7 +11937,7 @@
       </p:sp>
       <p:sp>
         <p:nvSpPr>
-          <p:cNvPr id="20" name="Rechteck 19"/>
+          <p:cNvPr id="48" name="Rechteck 47"/>
           <p:cNvSpPr/>
           <p:nvPr/>
         </p:nvSpPr>
@@ -11973,7 +11978,7 @@
       </p:sp>
       <p:sp>
         <p:nvSpPr>
-          <p:cNvPr id="21" name="Textfeld 20"/>
+          <p:cNvPr id="49" name="Textfeld 48"/>
           <p:cNvSpPr txBox="1"/>
           <p:nvPr/>
         </p:nvSpPr>
@@ -12002,7 +12007,7 @@
       </p:sp>
       <p:sp>
         <p:nvSpPr>
-          <p:cNvPr id="22" name="Rechteck 21"/>
+          <p:cNvPr id="50" name="Rechteck 49"/>
           <p:cNvSpPr/>
           <p:nvPr/>
         </p:nvSpPr>
@@ -12043,7 +12048,7 @@
       </p:sp>
       <p:sp>
         <p:nvSpPr>
-          <p:cNvPr id="23" name="Textfeld 22"/>
+          <p:cNvPr id="51" name="Textfeld 50"/>
           <p:cNvSpPr txBox="1"/>
           <p:nvPr/>
         </p:nvSpPr>
@@ -12073,7 +12078,7 @@
       </p:sp>
       <p:sp>
         <p:nvSpPr>
-          <p:cNvPr id="24" name="Textfeld 23"/>
+          <p:cNvPr id="52" name="Textfeld 51"/>
           <p:cNvSpPr txBox="1"/>
           <p:nvPr/>
         </p:nvSpPr>
@@ -12102,7 +12107,7 @@
       </p:sp>
       <p:sp>
         <p:nvSpPr>
-          <p:cNvPr id="25" name="Rechteck 24"/>
+          <p:cNvPr id="53" name="Rechteck 52"/>
           <p:cNvSpPr/>
           <p:nvPr/>
         </p:nvSpPr>
@@ -12143,14 +12148,14 @@
       </p:sp>
       <p:sp>
         <p:nvSpPr>
-          <p:cNvPr id="26" name="Textfeld 25"/>
+          <p:cNvPr id="54" name="Textfeld 53"/>
           <p:cNvSpPr txBox="1"/>
           <p:nvPr/>
         </p:nvSpPr>
         <p:spPr>
           <a:xfrm>
-            <a:off x="333375" y="3770905"/>
-            <a:ext cx="2064604" cy="523220"/>
+            <a:off x="333374" y="3770905"/>
+            <a:ext cx="2934423" cy="523220"/>
           </a:xfrm>
           <a:prstGeom prst="rect">
             <a:avLst/>
@@ -12165,14 +12170,14 @@
           <a:p>
             <a:r>
               <a:rPr lang="de-DE" sz="2800" dirty="0"/>
-              <a:t>???</a:t>
-            </a:r>
-          </a:p>
-        </p:txBody>
-      </p:sp>
-      <p:sp>
-        <p:nvSpPr>
-          <p:cNvPr id="27" name="Textfeld 26"/>
+              <a:t>Modern</a:t>
+            </a:r>
+          </a:p>
+        </p:txBody>
+      </p:sp>
+      <p:sp>
+        <p:nvSpPr>
+          <p:cNvPr id="55" name="Textfeld 54"/>
           <p:cNvSpPr txBox="1"/>
           <p:nvPr/>
         </p:nvSpPr>
@@ -12194,21 +12199,21 @@
           <a:p>
             <a:r>
               <a:rPr lang="de-DE" dirty="0"/>
-              <a:t>???</a:t>
-            </a:r>
-          </a:p>
-        </p:txBody>
-      </p:sp>
-      <p:sp>
-        <p:nvSpPr>
-          <p:cNvPr id="28" name="Textfeld 27"/>
+              <a:t>Aktuelle Frameworks</a:t>
+            </a:r>
+          </a:p>
+        </p:txBody>
+      </p:sp>
+      <p:sp>
+        <p:nvSpPr>
+          <p:cNvPr id="56" name="Textfeld 55"/>
           <p:cNvSpPr txBox="1"/>
           <p:nvPr/>
         </p:nvSpPr>
         <p:spPr>
           <a:xfrm>
             <a:off x="333375" y="5060566"/>
-            <a:ext cx="2064604" cy="523220"/>
+            <a:ext cx="2934422" cy="523220"/>
           </a:xfrm>
           <a:prstGeom prst="rect">
             <a:avLst/>
@@ -12223,21 +12228,21 @@
           <a:p>
             <a:r>
               <a:rPr lang="de-DE" sz="2800" dirty="0"/>
-              <a:t>???</a:t>
-            </a:r>
-          </a:p>
-        </p:txBody>
-      </p:sp>
-      <p:sp>
-        <p:nvSpPr>
-          <p:cNvPr id="29" name="Textfeld 28"/>
+              <a:t>Umsetzung SOLID</a:t>
+            </a:r>
+          </a:p>
+        </p:txBody>
+      </p:sp>
+      <p:sp>
+        <p:nvSpPr>
+          <p:cNvPr id="57" name="Textfeld 56"/>
           <p:cNvSpPr txBox="1"/>
           <p:nvPr/>
         </p:nvSpPr>
         <p:spPr>
           <a:xfrm>
-            <a:off x="361950" y="5612361"/>
-            <a:ext cx="2629246" cy="369332"/>
+            <a:off x="361949" y="5612361"/>
+            <a:ext cx="2828925" cy="369332"/>
           </a:xfrm>
           <a:prstGeom prst="rect">
             <a:avLst/>
@@ -12252,14 +12257,14 @@
           <a:p>
             <a:r>
               <a:rPr lang="de-DE" dirty="0"/>
-              <a:t>???</a:t>
+              <a:t>Prinzipien strikt umgesetzt</a:t>
             </a:r>
           </a:p>
         </p:txBody>
       </p:sp>
       <p:pic>
         <p:nvPicPr>
-          <p:cNvPr id="12" name="Inhaltsplatzhalter 11"/>
+          <p:cNvPr id="58" name="Inhaltsplatzhalter 11"/>
           <p:cNvPicPr>
             <a:picLocks noGrp="1" noChangeAspect="1"/>
           </p:cNvPicPr>
@@ -12287,7 +12292,7 @@
       </p:pic>
       <p:sp>
         <p:nvSpPr>
-          <p:cNvPr id="30" name="Textfeld 29"/>
+          <p:cNvPr id="59" name="Textfeld 58"/>
           <p:cNvSpPr txBox="1"/>
           <p:nvPr/>
         </p:nvSpPr>
@@ -12309,14 +12314,14 @@
           <a:p>
             <a:r>
               <a:rPr lang="de-DE" dirty="0"/>
-              <a:t>???</a:t>
+              <a:t>Modularer Aufbau</a:t>
             </a:r>
           </a:p>
         </p:txBody>
       </p:sp>
       <p:pic>
         <p:nvPicPr>
-          <p:cNvPr id="4" name="Grafik 3"/>
+          <p:cNvPr id="60" name="Grafik 59"/>
           <p:cNvPicPr>
             <a:picLocks noChangeAspect="1"/>
           </p:cNvPicPr>
@@ -12343,319 +12348,6 @@
           </a:prstGeom>
         </p:spPr>
       </p:pic>
-      <p:sp>
-        <p:nvSpPr>
-          <p:cNvPr id="32" name="Rechteck 31"/>
-          <p:cNvSpPr/>
-          <p:nvPr/>
-        </p:nvSpPr>
-        <p:spPr>
-          <a:xfrm>
-            <a:off x="11518041" y="534148"/>
-            <a:ext cx="3623239" cy="925637"/>
-          </a:xfrm>
-          <a:prstGeom prst="rect">
-            <a:avLst/>
-          </a:prstGeom>
-          <a:noFill/>
-        </p:spPr>
-        <p:style>
-          <a:lnRef idx="2">
-            <a:schemeClr val="accent1">
-              <a:shade val="50000"/>
-            </a:schemeClr>
-          </a:lnRef>
-          <a:fillRef idx="1">
-            <a:schemeClr val="accent1"/>
-          </a:fillRef>
-          <a:effectRef idx="0">
-            <a:schemeClr val="accent1"/>
-          </a:effectRef>
-          <a:fontRef idx="minor">
-            <a:schemeClr val="lt1"/>
-          </a:fontRef>
-        </p:style>
-        <p:txBody>
-          <a:bodyPr rtlCol="0" anchor="ctr"/>
-          <a:lstStyle/>
-          <a:p>
-            <a:pPr algn="ctr"/>
-            <a:endParaRPr lang="de-DE"/>
-          </a:p>
-        </p:txBody>
-      </p:sp>
-      <p:sp>
-        <p:nvSpPr>
-          <p:cNvPr id="33" name="Textfeld 32"/>
-          <p:cNvSpPr txBox="1"/>
-          <p:nvPr/>
-        </p:nvSpPr>
-        <p:spPr>
-          <a:xfrm>
-            <a:off x="11594241" y="538658"/>
-            <a:ext cx="2229906" cy="523220"/>
-          </a:xfrm>
-          <a:prstGeom prst="rect">
-            <a:avLst/>
-          </a:prstGeom>
-          <a:noFill/>
-        </p:spPr>
-        <p:txBody>
-          <a:bodyPr wrap="none" rtlCol="0">
-            <a:spAutoFit/>
-          </a:bodyPr>
-          <a:lstStyle/>
-          <a:p>
-            <a:r>
-              <a:rPr lang="de-DE" sz="2800" dirty="0"/>
-              <a:t>Lastverteilung</a:t>
-            </a:r>
-          </a:p>
-        </p:txBody>
-      </p:sp>
-      <p:sp>
-        <p:nvSpPr>
-          <p:cNvPr id="34" name="Textfeld 33"/>
-          <p:cNvSpPr txBox="1"/>
-          <p:nvPr/>
-        </p:nvSpPr>
-        <p:spPr>
-          <a:xfrm>
-            <a:off x="11518040" y="1061878"/>
-            <a:ext cx="3623239" cy="369332"/>
-          </a:xfrm>
-          <a:prstGeom prst="rect">
-            <a:avLst/>
-          </a:prstGeom>
-          <a:noFill/>
-        </p:spPr>
-        <p:txBody>
-          <a:bodyPr wrap="square" rtlCol="0">
-            <a:spAutoFit/>
-          </a:bodyPr>
-          <a:lstStyle/>
-          <a:p>
-            <a:r>
-              <a:rPr lang="de-DE" dirty="0"/>
-              <a:t>Durch </a:t>
-            </a:r>
-            <a:r>
-              <a:rPr lang="de-DE" dirty="0" err="1"/>
-              <a:t>Loadbalancing</a:t>
-            </a:r>
-            <a:r>
-              <a:rPr lang="de-DE" dirty="0"/>
-              <a:t> Arbeitsteilung</a:t>
-            </a:r>
-          </a:p>
-        </p:txBody>
-      </p:sp>
-      <p:sp>
-        <p:nvSpPr>
-          <p:cNvPr id="35" name="Rechteck 34"/>
-          <p:cNvSpPr/>
-          <p:nvPr/>
-        </p:nvSpPr>
-        <p:spPr>
-          <a:xfrm>
-            <a:off x="11518041" y="1692353"/>
-            <a:ext cx="3623239" cy="925637"/>
-          </a:xfrm>
-          <a:prstGeom prst="rect">
-            <a:avLst/>
-          </a:prstGeom>
-          <a:noFill/>
-        </p:spPr>
-        <p:style>
-          <a:lnRef idx="2">
-            <a:schemeClr val="accent1">
-              <a:shade val="50000"/>
-            </a:schemeClr>
-          </a:lnRef>
-          <a:fillRef idx="1">
-            <a:schemeClr val="accent1"/>
-          </a:fillRef>
-          <a:effectRef idx="0">
-            <a:schemeClr val="accent1"/>
-          </a:effectRef>
-          <a:fontRef idx="minor">
-            <a:schemeClr val="lt1"/>
-          </a:fontRef>
-        </p:style>
-        <p:txBody>
-          <a:bodyPr rtlCol="0" anchor="ctr"/>
-          <a:lstStyle/>
-          <a:p>
-            <a:pPr algn="ctr"/>
-            <a:endParaRPr lang="de-DE"/>
-          </a:p>
-        </p:txBody>
-      </p:sp>
-      <p:sp>
-        <p:nvSpPr>
-          <p:cNvPr id="36" name="Textfeld 35"/>
-          <p:cNvSpPr txBox="1"/>
-          <p:nvPr/>
-        </p:nvSpPr>
-        <p:spPr>
-          <a:xfrm>
-            <a:off x="11594241" y="1696863"/>
-            <a:ext cx="2593274" cy="523220"/>
-          </a:xfrm>
-          <a:prstGeom prst="rect">
-            <a:avLst/>
-          </a:prstGeom>
-          <a:noFill/>
-        </p:spPr>
-        <p:txBody>
-          <a:bodyPr wrap="none" rtlCol="0">
-            <a:spAutoFit/>
-          </a:bodyPr>
-          <a:lstStyle/>
-          <a:p>
-            <a:r>
-              <a:rPr lang="de-DE" sz="2800" dirty="0"/>
-              <a:t>Ausfallsicherheit</a:t>
-            </a:r>
-          </a:p>
-        </p:txBody>
-      </p:sp>
-      <p:sp>
-        <p:nvSpPr>
-          <p:cNvPr id="37" name="Textfeld 36"/>
-          <p:cNvSpPr txBox="1"/>
-          <p:nvPr/>
-        </p:nvSpPr>
-        <p:spPr>
-          <a:xfrm>
-            <a:off x="11518040" y="2220083"/>
-            <a:ext cx="3623239" cy="369332"/>
-          </a:xfrm>
-          <a:prstGeom prst="rect">
-            <a:avLst/>
-          </a:prstGeom>
-          <a:noFill/>
-        </p:spPr>
-        <p:txBody>
-          <a:bodyPr wrap="square" rtlCol="0">
-            <a:spAutoFit/>
-          </a:bodyPr>
-          <a:lstStyle/>
-          <a:p>
-            <a:r>
-              <a:rPr lang="de-DE" dirty="0"/>
-              <a:t>Mehrere Instanzen sichern Ausfall</a:t>
-            </a:r>
-          </a:p>
-        </p:txBody>
-      </p:sp>
-      <p:sp>
-        <p:nvSpPr>
-          <p:cNvPr id="38" name="Rechteck 37"/>
-          <p:cNvSpPr/>
-          <p:nvPr/>
-        </p:nvSpPr>
-        <p:spPr>
-          <a:xfrm>
-            <a:off x="11518040" y="2821983"/>
-            <a:ext cx="3623239" cy="925637"/>
-          </a:xfrm>
-          <a:prstGeom prst="rect">
-            <a:avLst/>
-          </a:prstGeom>
-          <a:noFill/>
-        </p:spPr>
-        <p:style>
-          <a:lnRef idx="2">
-            <a:schemeClr val="accent1">
-              <a:shade val="50000"/>
-            </a:schemeClr>
-          </a:lnRef>
-          <a:fillRef idx="1">
-            <a:schemeClr val="accent1"/>
-          </a:fillRef>
-          <a:effectRef idx="0">
-            <a:schemeClr val="accent1"/>
-          </a:effectRef>
-          <a:fontRef idx="minor">
-            <a:schemeClr val="lt1"/>
-          </a:fontRef>
-        </p:style>
-        <p:txBody>
-          <a:bodyPr rtlCol="0" anchor="ctr"/>
-          <a:lstStyle/>
-          <a:p>
-            <a:pPr algn="ctr"/>
-            <a:endParaRPr lang="de-DE"/>
-          </a:p>
-        </p:txBody>
-      </p:sp>
-      <p:sp>
-        <p:nvSpPr>
-          <p:cNvPr id="39" name="Textfeld 38"/>
-          <p:cNvSpPr txBox="1"/>
-          <p:nvPr/>
-        </p:nvSpPr>
-        <p:spPr>
-          <a:xfrm>
-            <a:off x="11594240" y="2826493"/>
-            <a:ext cx="2162708" cy="523220"/>
-          </a:xfrm>
-          <a:prstGeom prst="rect">
-            <a:avLst/>
-          </a:prstGeom>
-          <a:noFill/>
-        </p:spPr>
-        <p:txBody>
-          <a:bodyPr wrap="none" rtlCol="0">
-            <a:spAutoFit/>
-          </a:bodyPr>
-          <a:lstStyle/>
-          <a:p>
-            <a:r>
-              <a:rPr lang="de-DE" sz="2800" dirty="0"/>
-              <a:t>Skalierbarkeit</a:t>
-            </a:r>
-          </a:p>
-        </p:txBody>
-      </p:sp>
-      <p:sp>
-        <p:nvSpPr>
-          <p:cNvPr id="40" name="Textfeld 39"/>
-          <p:cNvSpPr txBox="1"/>
-          <p:nvPr/>
-        </p:nvSpPr>
-        <p:spPr>
-          <a:xfrm>
-            <a:off x="11518039" y="3349713"/>
-            <a:ext cx="3623239" cy="369332"/>
-          </a:xfrm>
-          <a:prstGeom prst="rect">
-            <a:avLst/>
-          </a:prstGeom>
-          <a:noFill/>
-        </p:spPr>
-        <p:txBody>
-          <a:bodyPr wrap="square" rtlCol="0">
-            <a:spAutoFit/>
-          </a:bodyPr>
-          <a:lstStyle/>
-          <a:p>
-            <a:r>
-              <a:rPr lang="de-DE" dirty="0"/>
-              <a:t>Horizontal (</a:t>
-            </a:r>
-            <a:r>
-              <a:rPr lang="de-DE" dirty="0" err="1"/>
-              <a:t>Scale</a:t>
-            </a:r>
-            <a:r>
-              <a:rPr lang="de-DE" dirty="0"/>
-              <a:t> out)</a:t>
-            </a:r>
-          </a:p>
-        </p:txBody>
-      </p:sp>
     </p:spTree>
     <p:extLst>
       <p:ext uri="{BB962C8B-B14F-4D97-AF65-F5344CB8AC3E}">
@@ -12703,7 +12395,7 @@
                                           </p:stCondLst>
                                         </p:cTn>
                                         <p:tgtEl>
-                                          <p:spTgt spid="7"/>
+                                          <p:spTgt spid="44"/>
                                         </p:tgtEl>
                                         <p:attrNameLst>
                                           <p:attrName>style.visibility</p:attrName>
@@ -12748,7 +12440,7 @@
                                           </p:stCondLst>
                                         </p:cTn>
                                         <p:tgtEl>
-                                          <p:spTgt spid="4"/>
+                                          <p:spTgt spid="60"/>
                                         </p:tgtEl>
                                         <p:attrNameLst>
                                           <p:attrName>style.visibility</p:attrName>
@@ -12789,7 +12481,7 @@
       </p:par>
     </p:tnLst>
     <p:bldLst>
-      <p:bldP spid="7" grpId="0" animBg="1"/>
+      <p:bldP spid="44" grpId="0" animBg="1"/>
     </p:bldLst>
   </p:timing>
 </p:sld>

</xml_diff>

<commit_message>
praesi mit aenderungen am abend
</commit_message>
<xml_diff>
--- a/dokumentation/vortrag.pptx
+++ b/dokumentation/vortrag.pptx
@@ -9350,7 +9350,7 @@
           <a:p>
             <a:r>
               <a:rPr lang="de-DE" dirty="0"/>
-              <a:t>Performancesteigerung durch den Support des aktuelleren Protokolls HTTP/2.5 </a:t>
+              <a:t>Performancesteigerung durch den Support des aktuelleren Protokolls HTTP/2.0</a:t>
             </a:r>
           </a:p>
           <a:p>
@@ -9370,7 +9370,10 @@
               <a:rPr lang="de-DE" dirty="0" err="1"/>
               <a:t>ActiveMQ</a:t>
             </a:r>
-            <a:endParaRPr lang="de-DE" dirty="0"/>
+            <a:r>
+              <a:rPr lang="de-DE" dirty="0"/>
+              <a:t> Artemis</a:t>
+            </a:r>
           </a:p>
           <a:p>
             <a:r>
@@ -9894,7 +9897,7 @@
       </p:sp>
       <p:pic>
         <p:nvPicPr>
-          <p:cNvPr id="6" name="Grafik 5"/>
+          <p:cNvPr id="5" name="Grafik 4"/>
           <p:cNvPicPr>
             <a:picLocks noChangeAspect="1"/>
           </p:cNvPicPr>
@@ -9914,37 +9917,7 @@
         </p:blipFill>
         <p:spPr>
           <a:xfrm>
-            <a:off x="1520825" y="1204602"/>
-            <a:ext cx="10395519" cy="5133446"/>
-          </a:xfrm>
-          <a:prstGeom prst="rect">
-            <a:avLst/>
-          </a:prstGeom>
-        </p:spPr>
-      </p:pic>
-      <p:pic>
-        <p:nvPicPr>
-          <p:cNvPr id="5" name="Grafik 4"/>
-          <p:cNvPicPr>
-            <a:picLocks noChangeAspect="1"/>
-          </p:cNvPicPr>
-          <p:nvPr/>
-        </p:nvPicPr>
-        <p:blipFill>
-          <a:blip r:embed="rId3">
-            <a:extLst>
-              <a:ext uri="{28A0092B-C50C-407E-A947-70E740481C1C}">
-                <a14:useLocalDpi xmlns:a14="http://schemas.microsoft.com/office/drawing/2010/main" val="0"/>
-              </a:ext>
-            </a:extLst>
-          </a:blip>
-          <a:stretch>
-            <a:fillRect/>
-          </a:stretch>
-        </p:blipFill>
-        <p:spPr>
-          <a:xfrm>
-            <a:off x="1520825" y="1209869"/>
+            <a:off x="958281" y="1122711"/>
             <a:ext cx="10395519" cy="5128180"/>
           </a:xfrm>
           <a:prstGeom prst="rect">
@@ -10817,7 +10790,7 @@
           <a:p>
             <a:r>
               <a:rPr lang="de-DE" dirty="0"/>
-              <a:t>7 austauschbare Projekte</a:t>
+              <a:t>Lose Kopplung durch starke Modularisierung</a:t>
             </a:r>
           </a:p>
           <a:p>
@@ -11220,7 +11193,7 @@
             </a:pPr>
             <a:r>
               <a:rPr lang="de-DE" dirty="0"/>
-              <a:t>Umbau eines Vorhandenen Chatsystems in ein verteiltes System</a:t>
+              <a:t>Optimierung einer vorhandenen Chatanwendung als verteiltes System</a:t>
             </a:r>
           </a:p>
           <a:p>
@@ -11271,7 +11244,7 @@
             </a:pPr>
             <a:r>
               <a:rPr lang="de-DE" sz="2400" dirty="0"/>
-              <a:t>Login </a:t>
+              <a:t>Login/</a:t>
             </a:r>
             <a:r>
               <a:rPr lang="de-DE" sz="2400" dirty="0" err="1"/>
@@ -15104,47 +15077,6 @@
       </p:sp>
       <p:sp>
         <p:nvSpPr>
-          <p:cNvPr id="9" name="Rechteck 8"/>
-          <p:cNvSpPr/>
-          <p:nvPr/>
-        </p:nvSpPr>
-        <p:spPr>
-          <a:xfrm>
-            <a:off x="370167" y="4695167"/>
-            <a:ext cx="4169681" cy="528581"/>
-          </a:xfrm>
-          <a:prstGeom prst="rect">
-            <a:avLst/>
-          </a:prstGeom>
-          <a:noFill/>
-        </p:spPr>
-        <p:style>
-          <a:lnRef idx="2">
-            <a:schemeClr val="accent1">
-              <a:shade val="50000"/>
-            </a:schemeClr>
-          </a:lnRef>
-          <a:fillRef idx="1">
-            <a:schemeClr val="accent1"/>
-          </a:fillRef>
-          <a:effectRef idx="0">
-            <a:schemeClr val="accent1"/>
-          </a:effectRef>
-          <a:fontRef idx="minor">
-            <a:schemeClr val="lt1"/>
-          </a:fontRef>
-        </p:style>
-        <p:txBody>
-          <a:bodyPr rtlCol="0" anchor="ctr"/>
-          <a:lstStyle/>
-          <a:p>
-            <a:pPr algn="ctr"/>
-            <a:endParaRPr lang="de-DE"/>
-          </a:p>
-        </p:txBody>
-      </p:sp>
-      <p:sp>
-        <p:nvSpPr>
           <p:cNvPr id="10" name="Textfeld 9"/>
           <p:cNvSpPr txBox="1"/>
           <p:nvPr/>
@@ -15168,35 +15100,6 @@
             <a:r>
               <a:rPr lang="de-DE" sz="2800" dirty="0"/>
               <a:t> </a:t>
-            </a:r>
-          </a:p>
-        </p:txBody>
-      </p:sp>
-      <p:sp>
-        <p:nvSpPr>
-          <p:cNvPr id="11" name="Textfeld 10"/>
-          <p:cNvSpPr txBox="1"/>
-          <p:nvPr/>
-        </p:nvSpPr>
-        <p:spPr>
-          <a:xfrm>
-            <a:off x="446368" y="4700528"/>
-            <a:ext cx="2064604" cy="523220"/>
-          </a:xfrm>
-          <a:prstGeom prst="rect">
-            <a:avLst/>
-          </a:prstGeom>
-          <a:noFill/>
-        </p:spPr>
-        <p:txBody>
-          <a:bodyPr wrap="square" rtlCol="0">
-            <a:spAutoFit/>
-          </a:bodyPr>
-          <a:lstStyle/>
-          <a:p>
-            <a:r>
-              <a:rPr lang="de-DE" sz="2800" dirty="0"/>
-              <a:t>REST-Login</a:t>
             </a:r>
           </a:p>
         </p:txBody>
@@ -15273,82 +15176,6 @@
       </p:sp>
       <p:sp>
         <p:nvSpPr>
-          <p:cNvPr id="15" name="Pfeil: nach unten 14"/>
-          <p:cNvSpPr/>
-          <p:nvPr/>
-        </p:nvSpPr>
-        <p:spPr>
-          <a:xfrm>
-            <a:off x="1074059" y="2695317"/>
-            <a:ext cx="2032000" cy="871243"/>
-          </a:xfrm>
-          <a:prstGeom prst="downArrow">
-            <a:avLst/>
-          </a:prstGeom>
-        </p:spPr>
-        <p:style>
-          <a:lnRef idx="1">
-            <a:schemeClr val="accent1"/>
-          </a:lnRef>
-          <a:fillRef idx="3">
-            <a:schemeClr val="accent1"/>
-          </a:fillRef>
-          <a:effectRef idx="2">
-            <a:schemeClr val="accent1"/>
-          </a:effectRef>
-          <a:fontRef idx="minor">
-            <a:schemeClr val="lt1"/>
-          </a:fontRef>
-        </p:style>
-        <p:txBody>
-          <a:bodyPr rtlCol="0" anchor="ctr"/>
-          <a:lstStyle/>
-          <a:p>
-            <a:pPr algn="ctr"/>
-            <a:endParaRPr lang="de-DE"/>
-          </a:p>
-        </p:txBody>
-      </p:sp>
-      <p:sp>
-        <p:nvSpPr>
-          <p:cNvPr id="16" name="Textfeld 15"/>
-          <p:cNvSpPr txBox="1"/>
-          <p:nvPr/>
-        </p:nvSpPr>
-        <p:spPr>
-          <a:xfrm>
-            <a:off x="1607964" y="2792690"/>
-            <a:ext cx="1277257" cy="523220"/>
-          </a:xfrm>
-          <a:prstGeom prst="rect">
-            <a:avLst/>
-          </a:prstGeom>
-          <a:noFill/>
-        </p:spPr>
-        <p:txBody>
-          <a:bodyPr wrap="square" rtlCol="0">
-            <a:spAutoFit/>
-          </a:bodyPr>
-          <a:lstStyle/>
-          <a:p>
-            <a:r>
-              <a:rPr lang="de-DE" sz="2800" dirty="0" err="1">
-                <a:solidFill>
-                  <a:schemeClr val="bg1"/>
-                </a:solidFill>
-              </a:rPr>
-              <a:t>Retry</a:t>
-            </a:r>
-            <a:endParaRPr lang="de-DE" sz="2800" dirty="0">
-              <a:solidFill>
-                <a:schemeClr val="bg1"/>
-              </a:solidFill>
-            </a:endParaRPr>
-          </a:p>
-        </p:txBody>
-      </p:sp>
-      <p:sp>
-        <p:nvSpPr>
           <p:cNvPr id="3" name="Textfeld 2"/>
           <p:cNvSpPr txBox="1"/>
           <p:nvPr/>
@@ -15405,47 +15232,6 @@
           </a:p>
         </p:txBody>
       </p:sp>
-      <p:sp>
-        <p:nvSpPr>
-          <p:cNvPr id="18" name="Pfeil: nach unten 17"/>
-          <p:cNvSpPr/>
-          <p:nvPr/>
-        </p:nvSpPr>
-        <p:spPr>
-          <a:xfrm>
-            <a:off x="1074059" y="3988552"/>
-            <a:ext cx="2032000" cy="871243"/>
-          </a:xfrm>
-          <a:prstGeom prst="downArrow">
-            <a:avLst/>
-          </a:prstGeom>
-        </p:spPr>
-        <p:style>
-          <a:lnRef idx="1">
-            <a:schemeClr val="accent1"/>
-          </a:lnRef>
-          <a:fillRef idx="3">
-            <a:schemeClr val="accent1"/>
-          </a:fillRef>
-          <a:effectRef idx="2">
-            <a:schemeClr val="accent1"/>
-          </a:effectRef>
-          <a:fontRef idx="minor">
-            <a:schemeClr val="lt1"/>
-          </a:fontRef>
-        </p:style>
-        <p:txBody>
-          <a:bodyPr rtlCol="0" anchor="ctr"/>
-          <a:lstStyle/>
-          <a:p>
-            <a:pPr algn="ctr"/>
-            <a:r>
-              <a:rPr lang="de-DE" sz="2800" dirty="0"/>
-              <a:t>Filter</a:t>
-            </a:r>
-          </a:p>
-        </p:txBody>
-      </p:sp>
     </p:spTree>
     <p:extLst>
       <p:ext uri="{BB962C8B-B14F-4D97-AF65-F5344CB8AC3E}">
@@ -15456,196 +15242,6 @@
   <p:clrMapOvr>
     <a:masterClrMapping/>
   </p:clrMapOvr>
-  <p:timing>
-    <p:tnLst>
-      <p:par>
-        <p:cTn id="1" dur="indefinite" restart="never" nodeType="tmRoot">
-          <p:childTnLst>
-            <p:seq concurrent="1" nextAc="seek">
-              <p:cTn id="2" dur="indefinite" nodeType="mainSeq">
-                <p:childTnLst>
-                  <p:par>
-                    <p:cTn id="3" fill="hold">
-                      <p:stCondLst>
-                        <p:cond delay="indefinite"/>
-                      </p:stCondLst>
-                      <p:childTnLst>
-                        <p:par>
-                          <p:cTn id="4" fill="hold">
-                            <p:stCondLst>
-                              <p:cond delay="0"/>
-                            </p:stCondLst>
-                            <p:childTnLst>
-                              <p:par>
-                                <p:cTn id="5" presetID="1" presetClass="entr" presetSubtype="0" fill="hold" grpId="0" nodeType="clickEffect">
-                                  <p:stCondLst>
-                                    <p:cond delay="0"/>
-                                  </p:stCondLst>
-                                  <p:childTnLst>
-                                    <p:set>
-                                      <p:cBhvr>
-                                        <p:cTn id="6" dur="1" fill="hold">
-                                          <p:stCondLst>
-                                            <p:cond delay="0"/>
-                                          </p:stCondLst>
-                                        </p:cTn>
-                                        <p:tgtEl>
-                                          <p:spTgt spid="16"/>
-                                        </p:tgtEl>
-                                        <p:attrNameLst>
-                                          <p:attrName>style.visibility</p:attrName>
-                                        </p:attrNameLst>
-                                      </p:cBhvr>
-                                      <p:to>
-                                        <p:strVal val="visible"/>
-                                      </p:to>
-                                    </p:set>
-                                  </p:childTnLst>
-                                </p:cTn>
-                              </p:par>
-                              <p:par>
-                                <p:cTn id="7" presetID="1" presetClass="entr" presetSubtype="0" fill="hold" grpId="0" nodeType="withEffect">
-                                  <p:stCondLst>
-                                    <p:cond delay="0"/>
-                                  </p:stCondLst>
-                                  <p:childTnLst>
-                                    <p:set>
-                                      <p:cBhvr>
-                                        <p:cTn id="8" dur="1" fill="hold">
-                                          <p:stCondLst>
-                                            <p:cond delay="0"/>
-                                          </p:stCondLst>
-                                        </p:cTn>
-                                        <p:tgtEl>
-                                          <p:spTgt spid="15"/>
-                                        </p:tgtEl>
-                                        <p:attrNameLst>
-                                          <p:attrName>style.visibility</p:attrName>
-                                        </p:attrNameLst>
-                                      </p:cBhvr>
-                                      <p:to>
-                                        <p:strVal val="visible"/>
-                                      </p:to>
-                                    </p:set>
-                                  </p:childTnLst>
-                                </p:cTn>
-                              </p:par>
-                              <p:par>
-                                <p:cTn id="9" presetID="1" presetClass="entr" presetSubtype="0" fill="hold" grpId="0" nodeType="withEffect">
-                                  <p:stCondLst>
-                                    <p:cond delay="0"/>
-                                  </p:stCondLst>
-                                  <p:childTnLst>
-                                    <p:set>
-                                      <p:cBhvr>
-                                        <p:cTn id="10" dur="1" fill="hold">
-                                          <p:stCondLst>
-                                            <p:cond delay="0"/>
-                                          </p:stCondLst>
-                                        </p:cTn>
-                                        <p:tgtEl>
-                                          <p:spTgt spid="18"/>
-                                        </p:tgtEl>
-                                        <p:attrNameLst>
-                                          <p:attrName>style.visibility</p:attrName>
-                                        </p:attrNameLst>
-                                      </p:cBhvr>
-                                      <p:to>
-                                        <p:strVal val="visible"/>
-                                      </p:to>
-                                    </p:set>
-                                  </p:childTnLst>
-                                </p:cTn>
-                              </p:par>
-                              <p:par>
-                                <p:cTn id="11" presetID="1" presetClass="entr" presetSubtype="0" fill="hold" grpId="0" nodeType="withEffect">
-                                  <p:stCondLst>
-                                    <p:cond delay="0"/>
-                                  </p:stCondLst>
-                                  <p:childTnLst>
-                                    <p:set>
-                                      <p:cBhvr>
-                                        <p:cTn id="12" dur="1" fill="hold">
-                                          <p:stCondLst>
-                                            <p:cond delay="0"/>
-                                          </p:stCondLst>
-                                        </p:cTn>
-                                        <p:tgtEl>
-                                          <p:spTgt spid="11"/>
-                                        </p:tgtEl>
-                                        <p:attrNameLst>
-                                          <p:attrName>style.visibility</p:attrName>
-                                        </p:attrNameLst>
-                                      </p:cBhvr>
-                                      <p:to>
-                                        <p:strVal val="visible"/>
-                                      </p:to>
-                                    </p:set>
-                                  </p:childTnLst>
-                                </p:cTn>
-                              </p:par>
-                              <p:par>
-                                <p:cTn id="13" presetID="1" presetClass="entr" presetSubtype="0" fill="hold" grpId="0" nodeType="withEffect">
-                                  <p:stCondLst>
-                                    <p:cond delay="0"/>
-                                  </p:stCondLst>
-                                  <p:childTnLst>
-                                    <p:set>
-                                      <p:cBhvr>
-                                        <p:cTn id="14" dur="1" fill="hold">
-                                          <p:stCondLst>
-                                            <p:cond delay="0"/>
-                                          </p:stCondLst>
-                                        </p:cTn>
-                                        <p:tgtEl>
-                                          <p:spTgt spid="9"/>
-                                        </p:tgtEl>
-                                        <p:attrNameLst>
-                                          <p:attrName>style.visibility</p:attrName>
-                                        </p:attrNameLst>
-                                      </p:cBhvr>
-                                      <p:to>
-                                        <p:strVal val="visible"/>
-                                      </p:to>
-                                    </p:set>
-                                  </p:childTnLst>
-                                </p:cTn>
-                              </p:par>
-                            </p:childTnLst>
-                          </p:cTn>
-                        </p:par>
-                      </p:childTnLst>
-                    </p:cTn>
-                  </p:par>
-                </p:childTnLst>
-              </p:cTn>
-              <p:prevCondLst>
-                <p:cond evt="onPrev" delay="0">
-                  <p:tgtEl>
-                    <p:sldTgt/>
-                  </p:tgtEl>
-                </p:cond>
-              </p:prevCondLst>
-              <p:nextCondLst>
-                <p:cond evt="onNext" delay="0">
-                  <p:tgtEl>
-                    <p:sldTgt/>
-                  </p:tgtEl>
-                </p:cond>
-              </p:nextCondLst>
-            </p:seq>
-          </p:childTnLst>
-        </p:cTn>
-      </p:par>
-    </p:tnLst>
-    <p:bldLst>
-      <p:bldP spid="9" grpId="0" animBg="1"/>
-      <p:bldP spid="11" grpId="0"/>
-      <p:bldP spid="15" grpId="0" animBg="1"/>
-      <p:bldP spid="16" grpId="0"/>
-      <p:bldP spid="18" grpId="0" animBg="1"/>
-    </p:bldLst>
-  </p:timing>
 </p:sld>
 </file>
 
@@ -15706,6 +15302,37 @@
           <a:p>
             <a:r>
               <a:rPr lang="de-DE" dirty="0"/>
+              <a:t>Koordination der Transaktionen zur </a:t>
+            </a:r>
+            <a:r>
+              <a:rPr lang="de-DE" dirty="0" err="1"/>
+              <a:t>Persistierung</a:t>
+            </a:r>
+            <a:r>
+              <a:rPr lang="de-DE" dirty="0"/>
+              <a:t> in </a:t>
+            </a:r>
+            <a:r>
+              <a:rPr lang="de-DE" dirty="0" err="1"/>
+              <a:t>TraceDB</a:t>
+            </a:r>
+            <a:r>
+              <a:rPr lang="de-DE" dirty="0"/>
+              <a:t> und </a:t>
+            </a:r>
+            <a:r>
+              <a:rPr lang="de-DE" dirty="0" err="1"/>
+              <a:t>CountDB</a:t>
+            </a:r>
+            <a:r>
+              <a:rPr lang="de-DE" dirty="0"/>
+              <a:t> durch XA (2PC-Protokoll)</a:t>
+            </a:r>
+            <a:endParaRPr lang="de-DE" dirty="0"/>
+          </a:p>
+          <a:p>
+            <a:r>
+              <a:rPr lang="de-DE" dirty="0"/>
               <a:t>Container </a:t>
             </a:r>
             <a:r>
@@ -15719,36 +15346,6 @@
           </a:p>
           <a:p>
             <a:r>
-              <a:rPr lang="de-DE" dirty="0"/>
-              <a:t>Koordination der Transaktionen zur </a:t>
-            </a:r>
-            <a:r>
-              <a:rPr lang="de-DE" dirty="0" err="1"/>
-              <a:t>Persistierung</a:t>
-            </a:r>
-            <a:r>
-              <a:rPr lang="de-DE" dirty="0"/>
-              <a:t> in </a:t>
-            </a:r>
-            <a:r>
-              <a:rPr lang="de-DE" dirty="0" err="1"/>
-              <a:t>TraceDB</a:t>
-            </a:r>
-            <a:r>
-              <a:rPr lang="de-DE" dirty="0"/>
-              <a:t> und </a:t>
-            </a:r>
-            <a:r>
-              <a:rPr lang="de-DE" dirty="0" err="1"/>
-              <a:t>CountDB</a:t>
-            </a:r>
-            <a:r>
-              <a:rPr lang="de-DE" dirty="0"/>
-              <a:t> durch XA (2PC-Protokoll)</a:t>
-            </a:r>
-          </a:p>
-          <a:p>
-            <a:r>
               <a:rPr lang="de-DE" dirty="0" err="1"/>
               <a:t>Exceptions</a:t>
             </a:r>
@@ -15786,7 +15383,7 @@
               <a:rPr lang="de-DE" dirty="0"/>
               <a:t> (dynamisch per mysql-ds.xml)</a:t>
             </a:r>
-            <a:endParaRPr lang="en-US"/>
+            <a:endParaRPr lang="en-US" dirty="0"/>
           </a:p>
           <a:p>
             <a:pPr marL="0" indent="0">

</xml_diff>